<commit_message>
Powerpoint example-based gedeelte vervolledigd
</commit_message>
<xml_diff>
--- a/Opdracht 2/Literatuurstudie.pptx
+++ b/Opdracht 2/Literatuurstudie.pptx
@@ -13,11 +13,11 @@
     <p:sldId id="262" r:id="rId7"/>
     <p:sldId id="264" r:id="rId8"/>
     <p:sldId id="265" r:id="rId9"/>
-    <p:sldId id="266" r:id="rId10"/>
-    <p:sldId id="267" r:id="rId11"/>
-    <p:sldId id="268" r:id="rId12"/>
-    <p:sldId id="269" r:id="rId13"/>
-    <p:sldId id="271" r:id="rId14"/>
+    <p:sldId id="271" r:id="rId10"/>
+    <p:sldId id="266" r:id="rId11"/>
+    <p:sldId id="267" r:id="rId12"/>
+    <p:sldId id="268" r:id="rId13"/>
+    <p:sldId id="269" r:id="rId14"/>
     <p:sldId id="272" r:id="rId15"/>
     <p:sldId id="270" r:id="rId16"/>
     <p:sldId id="273" r:id="rId17"/>
@@ -3950,12 +3950,19 @@
           <a:lstStyle/>
           <a:p>
             <a:r>
+              <a:rPr lang="nl-BE" dirty="0" smtClean="0"/>
+              <a:t>Overzicht: </a:t>
+            </a:r>
+            <a:br>
+              <a:rPr lang="nl-BE" dirty="0" smtClean="0"/>
+            </a:br>
+            <a:r>
+              <a:rPr lang="nl-BE" dirty="0" smtClean="0"/>
+              <a:t>Spreadsheet </a:t>
+            </a:r>
+            <a:r>
               <a:rPr lang="nl-BE" dirty="0"/>
-              <a:t>Concept oplossing </a:t>
-            </a:r>
-            <a:r>
-              <a:rPr lang="nl-BE" dirty="0" smtClean="0"/>
-              <a:t>generatie</a:t>
+              <a:t>tabel transformaties</a:t>
             </a:r>
             <a:endParaRPr lang="en-US" dirty="0"/>
           </a:p>
@@ -3976,14 +3983,82 @@
           <a:bodyPr/>
           <a:lstStyle/>
           <a:p>
-            <a:endParaRPr lang="en-US"/>
+            <a:pPr>
+              <a:buFont typeface="Arial" panose="020B0604020202020204" pitchFamily="34" charset="0"/>
+              <a:buChar char="•"/>
+            </a:pPr>
+            <a:r>
+              <a:rPr lang="nl-BE" dirty="0" smtClean="0"/>
+              <a:t>  Concept oplossing generatie</a:t>
+            </a:r>
+          </a:p>
+          <a:p>
+            <a:pPr>
+              <a:buFont typeface="Arial" panose="020B0604020202020204" pitchFamily="34" charset="0"/>
+              <a:buChar char="•"/>
+            </a:pPr>
+            <a:r>
+              <a:rPr lang="nl-BE" dirty="0"/>
+              <a:t> </a:t>
+            </a:r>
+            <a:r>
+              <a:rPr lang="nl-BE" dirty="0" smtClean="0"/>
+              <a:t> Domein kennis</a:t>
+            </a:r>
+            <a:r>
+              <a:rPr lang="nl-BE" dirty="0" smtClean="0">
+                <a:solidFill>
+                  <a:srgbClr val="FF0000"/>
+                </a:solidFill>
+              </a:rPr>
+              <a:t>(&lt;- vertalen?)</a:t>
+            </a:r>
+          </a:p>
+          <a:p>
+            <a:pPr>
+              <a:buFont typeface="Arial" panose="020B0604020202020204" pitchFamily="34" charset="0"/>
+              <a:buChar char="•"/>
+            </a:pPr>
+            <a:r>
+              <a:rPr lang="nl-BE" dirty="0"/>
+              <a:t> </a:t>
+            </a:r>
+            <a:r>
+              <a:rPr lang="nl-BE" dirty="0" smtClean="0"/>
+              <a:t> Programming </a:t>
+            </a:r>
+            <a:r>
+              <a:rPr lang="nl-BE" dirty="0" err="1" smtClean="0"/>
+              <a:t>by</a:t>
+            </a:r>
+            <a:r>
+              <a:rPr lang="nl-BE" dirty="0" smtClean="0"/>
+              <a:t> </a:t>
+            </a:r>
+            <a:r>
+              <a:rPr lang="nl-BE" dirty="0" err="1" smtClean="0"/>
+              <a:t>example</a:t>
+            </a:r>
+            <a:r>
+              <a:rPr lang="nl-BE" dirty="0" smtClean="0"/>
+              <a:t> </a:t>
+            </a:r>
+            <a:r>
+              <a:rPr lang="nl-BE" dirty="0">
+                <a:solidFill>
+                  <a:srgbClr val="FF0000"/>
+                </a:solidFill>
+              </a:rPr>
+              <a:t>(&lt;- vertalen?)</a:t>
+            </a:r>
+            <a:endParaRPr lang="en-US" dirty="0"/>
           </a:p>
         </p:txBody>
       </p:sp>
     </p:spTree>
     <p:extLst>
       <p:ext uri="{BB962C8B-B14F-4D97-AF65-F5344CB8AC3E}">
-        <p14:creationId xmlns:p14="http://schemas.microsoft.com/office/powerpoint/2010/main" val="3225734019"/>
+        <p14:creationId xmlns:p14="http://schemas.microsoft.com/office/powerpoint/2010/main" val="848964369"/>
       </p:ext>
     </p:extLst>
   </p:cSld>
@@ -4026,32 +4101,12 @@
           <a:lstStyle/>
           <a:p>
             <a:r>
-              <a:rPr lang="nl-BE" dirty="0" smtClean="0"/>
-              <a:t>Domein kennis </a:t>
-            </a:r>
-            <a:r>
-              <a:rPr lang="nl-BE" dirty="0" smtClean="0">
-                <a:solidFill>
-                  <a:srgbClr val="FF0000"/>
-                </a:solidFill>
-              </a:rPr>
-              <a:t>(&lt;- </a:t>
-            </a:r>
-            <a:r>
-              <a:rPr lang="nl-BE" dirty="0">
-                <a:solidFill>
-                  <a:srgbClr val="FF0000"/>
-                </a:solidFill>
-              </a:rPr>
-              <a:t>vertalen</a:t>
-            </a:r>
-            <a:r>
-              <a:rPr lang="nl-BE" dirty="0" smtClean="0">
-                <a:solidFill>
-                  <a:srgbClr val="FF0000"/>
-                </a:solidFill>
-              </a:rPr>
-              <a:t>?)</a:t>
+              <a:rPr lang="nl-BE" dirty="0"/>
+              <a:t>Concept oplossing </a:t>
+            </a:r>
+            <a:r>
+              <a:rPr lang="nl-BE" dirty="0" smtClean="0"/>
+              <a:t>generatie</a:t>
             </a:r>
             <a:endParaRPr lang="en-US" dirty="0"/>
           </a:p>
@@ -4079,7 +4134,7 @@
     </p:spTree>
     <p:extLst>
       <p:ext uri="{BB962C8B-B14F-4D97-AF65-F5344CB8AC3E}">
-        <p14:creationId xmlns:p14="http://schemas.microsoft.com/office/powerpoint/2010/main" val="401413552"/>
+        <p14:creationId xmlns:p14="http://schemas.microsoft.com/office/powerpoint/2010/main" val="3225734019"/>
       </p:ext>
     </p:extLst>
   </p:cSld>
@@ -4122,24 +4177,16 @@
           <a:lstStyle/>
           <a:p>
             <a:r>
-              <a:rPr lang="nl-BE" dirty="0"/>
-              <a:t>Programming </a:t>
-            </a:r>
-            <a:r>
-              <a:rPr lang="nl-BE" dirty="0" err="1"/>
-              <a:t>by</a:t>
-            </a:r>
-            <a:r>
-              <a:rPr lang="nl-BE" dirty="0"/>
-              <a:t> </a:t>
-            </a:r>
-            <a:r>
-              <a:rPr lang="nl-BE" dirty="0" err="1"/>
-              <a:t>example</a:t>
-            </a:r>
-            <a:r>
-              <a:rPr lang="nl-BE" dirty="0"/>
-              <a:t> </a:t>
+              <a:rPr lang="nl-BE" dirty="0" smtClean="0"/>
+              <a:t>Domein kennis </a:t>
+            </a:r>
+            <a:r>
+              <a:rPr lang="nl-BE" dirty="0" smtClean="0">
+                <a:solidFill>
+                  <a:srgbClr val="FF0000"/>
+                </a:solidFill>
+              </a:rPr>
+              <a:t>(&lt;- </a:t>
             </a:r>
             <a:r>
               <a:rPr lang="nl-BE" dirty="0">
@@ -4147,7 +4194,7 @@
                   <a:srgbClr val="FF0000"/>
                 </a:solidFill>
               </a:rPr>
-              <a:t>(&lt;- vertalen</a:t>
+              <a:t>vertalen</a:t>
             </a:r>
             <a:r>
               <a:rPr lang="nl-BE" dirty="0" smtClean="0">
@@ -4176,14 +4223,14 @@
           <a:bodyPr/>
           <a:lstStyle/>
           <a:p>
-            <a:endParaRPr lang="en-US" dirty="0"/>
+            <a:endParaRPr lang="en-US"/>
           </a:p>
         </p:txBody>
       </p:sp>
     </p:spTree>
     <p:extLst>
       <p:ext uri="{BB962C8B-B14F-4D97-AF65-F5344CB8AC3E}">
-        <p14:creationId xmlns:p14="http://schemas.microsoft.com/office/powerpoint/2010/main" val="239212845"/>
+        <p14:creationId xmlns:p14="http://schemas.microsoft.com/office/powerpoint/2010/main" val="401413552"/>
       </p:ext>
     </p:extLst>
   </p:cSld>
@@ -4225,7 +4272,43 @@
           <a:bodyPr/>
           <a:lstStyle/>
           <a:p>
-            <a:endParaRPr lang="en-US"/>
+            <a:r>
+              <a:rPr lang="nl-BE" dirty="0"/>
+              <a:t>Programming </a:t>
+            </a:r>
+            <a:r>
+              <a:rPr lang="nl-BE" dirty="0" err="1"/>
+              <a:t>by</a:t>
+            </a:r>
+            <a:r>
+              <a:rPr lang="nl-BE" dirty="0"/>
+              <a:t> </a:t>
+            </a:r>
+            <a:r>
+              <a:rPr lang="nl-BE" dirty="0" err="1"/>
+              <a:t>example</a:t>
+            </a:r>
+            <a:r>
+              <a:rPr lang="nl-BE" dirty="0"/>
+              <a:t> </a:t>
+            </a:r>
+            <a:r>
+              <a:rPr lang="nl-BE" dirty="0">
+                <a:solidFill>
+                  <a:srgbClr val="FF0000"/>
+                </a:solidFill>
+              </a:rPr>
+              <a:t>(&lt;- vertalen</a:t>
+            </a:r>
+            <a:r>
+              <a:rPr lang="nl-BE" dirty="0" smtClean="0">
+                <a:solidFill>
+                  <a:srgbClr val="FF0000"/>
+                </a:solidFill>
+              </a:rPr>
+              <a:t>?)</a:t>
+            </a:r>
+            <a:endParaRPr lang="en-US" dirty="0"/>
           </a:p>
         </p:txBody>
       </p:sp>
@@ -4244,14 +4327,14 @@
           <a:bodyPr/>
           <a:lstStyle/>
           <a:p>
-            <a:endParaRPr lang="en-US"/>
+            <a:endParaRPr lang="en-US" dirty="0"/>
           </a:p>
         </p:txBody>
       </p:sp>
     </p:spTree>
     <p:extLst>
       <p:ext uri="{BB962C8B-B14F-4D97-AF65-F5344CB8AC3E}">
-        <p14:creationId xmlns:p14="http://schemas.microsoft.com/office/powerpoint/2010/main" val="174650717"/>
+        <p14:creationId xmlns:p14="http://schemas.microsoft.com/office/powerpoint/2010/main" val="239212845"/>
       </p:ext>
     </p:extLst>
   </p:cSld>
@@ -4369,8 +4452,8 @@
           </a:p>
         </p:txBody>
       </p:sp>
-      <mc:AlternateContent xmlns:mc="http://schemas.openxmlformats.org/markup-compatibility/2006">
-        <mc:Choice xmlns:a14="http://schemas.microsoft.com/office/drawing/2010/main" Requires="a14">
+      <mc:AlternateContent xmlns:mc="http://schemas.openxmlformats.org/markup-compatibility/2006" xmlns:a14="http://schemas.microsoft.com/office/drawing/2010/main">
+        <mc:Choice Requires="a14">
           <p:sp>
             <p:nvSpPr>
               <p:cNvPr id="3" name="Content Placeholder 2"/>
@@ -4513,7 +4596,7 @@
             </p:txBody>
           </p:sp>
         </mc:Choice>
-        <mc:Fallback>
+        <mc:Fallback xmlns="">
           <p:sp>
             <p:nvSpPr>
               <p:cNvPr id="3" name="Content Placeholder 2"/>
@@ -7123,13 +7206,8 @@
             </a:r>
             <a:r>
               <a:rPr lang="nl-BE" dirty="0" smtClean="0"/>
-              <a:t> </a:t>
-            </a:r>
-            <a:r>
-              <a:rPr lang="nl-BE" dirty="0" smtClean="0"/>
-              <a:t>Ons doel</a:t>
-            </a:r>
-            <a:endParaRPr lang="nl-BE" dirty="0" smtClean="0"/>
+              <a:t> Ons doel</a:t>
+            </a:r>
           </a:p>
           <a:p>
             <a:pPr>
@@ -7255,50 +7333,58 @@
             </a:pPr>
             <a:r>
               <a:rPr lang="nl-BE" dirty="0" smtClean="0"/>
-              <a:t>  Voorbeeld </a:t>
-            </a:r>
-            <a:r>
-              <a:rPr lang="nl-BE" dirty="0" smtClean="0">
-                <a:solidFill>
-                  <a:srgbClr val="FF0000"/>
-                </a:solidFill>
-              </a:rPr>
-              <a:t>(&lt;- betere titel)</a:t>
-            </a:r>
-          </a:p>
-          <a:p>
-            <a:pPr lvl="1">
+              <a:t>  Probleem </a:t>
+            </a:r>
+            <a:r>
+              <a:rPr lang="nl-BE" dirty="0" smtClean="0"/>
+              <a:t>generatie</a:t>
+            </a:r>
+          </a:p>
+          <a:p>
+            <a:pPr>
               <a:buFont typeface="Arial" panose="020B0604020202020204" pitchFamily="34" charset="0"/>
               <a:buChar char="•"/>
             </a:pPr>
             <a:r>
               <a:rPr lang="nl-BE" dirty="0" smtClean="0"/>
-              <a:t>Probleem generatie</a:t>
-            </a:r>
-          </a:p>
-          <a:p>
-            <a:pPr lvl="1">
+              <a:t>  Oplossing </a:t>
+            </a:r>
+            <a:r>
+              <a:rPr lang="nl-BE" dirty="0" smtClean="0"/>
+              <a:t>generatie</a:t>
+            </a:r>
+          </a:p>
+          <a:p>
+            <a:pPr>
               <a:buFont typeface="Arial" panose="020B0604020202020204" pitchFamily="34" charset="0"/>
               <a:buChar char="•"/>
             </a:pPr>
             <a:r>
               <a:rPr lang="nl-BE" dirty="0" smtClean="0"/>
-              <a:t>Oplossing generatie</a:t>
-            </a:r>
-          </a:p>
-          <a:p>
-            <a:pPr lvl="1">
+              <a:t>  Feedback generatie</a:t>
+            </a:r>
+          </a:p>
+          <a:p>
+            <a:pPr>
               <a:buFont typeface="Arial" panose="020B0604020202020204" pitchFamily="34" charset="0"/>
               <a:buChar char="•"/>
             </a:pPr>
             <a:r>
               <a:rPr lang="nl-BE" dirty="0" smtClean="0"/>
-              <a:t>Feedback </a:t>
-            </a:r>
-            <a:r>
-              <a:rPr lang="nl-BE" dirty="0"/>
-              <a:t>generatie</a:t>
-            </a:r>
+              <a:t>  Toepassing</a:t>
+            </a:r>
+            <a:endParaRPr lang="nl-BE" dirty="0">
+              <a:solidFill>
+                <a:srgbClr val="FF0000"/>
+              </a:solidFill>
+            </a:endParaRPr>
+          </a:p>
+          <a:p>
+            <a:pPr>
+              <a:buFont typeface="Arial" panose="020B0604020202020204" pitchFamily="34" charset="0"/>
+              <a:buChar char="•"/>
+            </a:pPr>
+            <a:endParaRPr lang="nl-BE" dirty="0"/>
           </a:p>
           <a:p>
             <a:pPr>
@@ -7395,7 +7481,12 @@
             <p:ph sz="half" idx="2"/>
           </p:nvPr>
         </p:nvSpPr>
-        <p:spPr/>
+        <p:spPr>
+          <a:xfrm>
+            <a:off x="1097280" y="2582333"/>
+            <a:ext cx="4937760" cy="2395109"/>
+          </a:xfrm>
+        </p:spPr>
         <p:txBody>
           <a:bodyPr/>
           <a:lstStyle/>
@@ -7426,9 +7517,75 @@
             </a:pPr>
             <a:r>
               <a:rPr lang="nl-BE" dirty="0" smtClean="0"/>
-              <a:t>  Bewijs en Constructie problemen</a:t>
-            </a:r>
-            <a:endParaRPr lang="en-US" dirty="0"/>
+              <a:t>  Bewijs en Constructie </a:t>
+            </a:r>
+            <a:r>
+              <a:rPr lang="nl-BE" dirty="0" smtClean="0"/>
+              <a:t>problemen</a:t>
+            </a:r>
+          </a:p>
+          <a:p>
+            <a:pPr>
+              <a:buFont typeface="Arial" panose="020B0604020202020204" pitchFamily="34" charset="0"/>
+              <a:buChar char="•"/>
+            </a:pPr>
+            <a:r>
+              <a:rPr lang="nl-BE" dirty="0"/>
+              <a:t> </a:t>
+            </a:r>
+            <a:r>
+              <a:rPr lang="nl-BE" dirty="0" smtClean="0"/>
+              <a:t> Hier ligt onze focus</a:t>
+            </a:r>
+            <a:r>
+              <a:rPr lang="en-US" dirty="0"/>
+              <a:t> </a:t>
+            </a:r>
+            <a:r>
+              <a:rPr lang="en-US" dirty="0" smtClean="0">
+                <a:solidFill>
+                  <a:srgbClr val="FF0000"/>
+                </a:solidFill>
+              </a:rPr>
+              <a:t>(&lt;- </a:t>
+            </a:r>
+            <a:r>
+              <a:rPr lang="en-US" dirty="0" err="1" smtClean="0">
+                <a:solidFill>
+                  <a:srgbClr val="FF0000"/>
+                </a:solidFill>
+              </a:rPr>
+              <a:t>Hier</a:t>
+            </a:r>
+            <a:r>
+              <a:rPr lang="en-US" dirty="0" smtClean="0">
+                <a:solidFill>
+                  <a:srgbClr val="FF0000"/>
+                </a:solidFill>
+              </a:rPr>
+              <a:t> </a:t>
+            </a:r>
+            <a:r>
+              <a:rPr lang="en-US" dirty="0" err="1" smtClean="0">
+                <a:solidFill>
+                  <a:srgbClr val="FF0000"/>
+                </a:solidFill>
+              </a:rPr>
+              <a:t>zetten</a:t>
+            </a:r>
+            <a:r>
+              <a:rPr lang="en-US" dirty="0" smtClean="0">
+                <a:solidFill>
+                  <a:srgbClr val="FF0000"/>
+                </a:solidFill>
+              </a:rPr>
+              <a:t>?)</a:t>
+            </a:r>
+            <a:endParaRPr lang="nl-BE" dirty="0" smtClean="0">
+              <a:solidFill>
+                <a:srgbClr val="FF0000"/>
+              </a:solidFill>
+            </a:endParaRPr>
           </a:p>
         </p:txBody>
       </p:sp>
@@ -7465,7 +7622,12 @@
             <p:ph sz="quarter" idx="4"/>
           </p:nvPr>
         </p:nvSpPr>
-        <p:spPr/>
+        <p:spPr>
+          <a:xfrm>
+            <a:off x="6217920" y="2582334"/>
+            <a:ext cx="4937760" cy="1868896"/>
+          </a:xfrm>
+        </p:spPr>
         <p:txBody>
           <a:bodyPr/>
           <a:lstStyle/>
@@ -7541,7 +7703,46 @@
           <a:p>
             <a:r>
               <a:rPr lang="nl-BE" dirty="0" smtClean="0"/>
-              <a:t>Voorbeeld: probleem generatie</a:t>
+              <a:t>Probleem generatie</a:t>
+            </a:r>
+            <a:endParaRPr lang="en-US" dirty="0">
+              <a:solidFill>
+                <a:srgbClr val="FF0000"/>
+              </a:solidFill>
+            </a:endParaRPr>
+          </a:p>
+        </p:txBody>
+      </p:sp>
+      <p:sp>
+        <p:nvSpPr>
+          <p:cNvPr id="3" name="Content Placeholder 2"/>
+          <p:cNvSpPr>
+            <a:spLocks noGrp="1"/>
+          </p:cNvSpPr>
+          <p:nvPr>
+            <p:ph idx="1"/>
+          </p:nvPr>
+        </p:nvSpPr>
+        <p:spPr/>
+        <p:txBody>
+          <a:bodyPr/>
+          <a:lstStyle/>
+          <a:p>
+            <a:pPr>
+              <a:buFont typeface="Arial" panose="020B0604020202020204" pitchFamily="34" charset="0"/>
+              <a:buChar char="•"/>
+            </a:pPr>
+            <a:r>
+              <a:rPr lang="nl-BE" dirty="0" smtClean="0"/>
+              <a:t>  Genereren </a:t>
+            </a:r>
+            <a:r>
+              <a:rPr lang="nl-BE" dirty="0" err="1" smtClean="0"/>
+              <a:t>adhv</a:t>
+            </a:r>
+            <a:r>
+              <a:rPr lang="nl-BE" dirty="0"/>
+              <a:t> </a:t>
             </a:r>
             <a:r>
               <a:rPr lang="nl-BE" dirty="0" smtClean="0">
@@ -7549,31 +7750,120 @@
                   <a:srgbClr val="FF0000"/>
                 </a:solidFill>
               </a:rPr>
-              <a:t>(&lt;- betere titel)</a:t>
-            </a:r>
-            <a:endParaRPr lang="en-US" dirty="0">
-              <a:solidFill>
-                <a:srgbClr val="FF0000"/>
-              </a:solidFill>
-            </a:endParaRPr>
-          </a:p>
-        </p:txBody>
-      </p:sp>
-      <p:sp>
-        <p:nvSpPr>
-          <p:cNvPr id="3" name="Content Placeholder 2"/>
-          <p:cNvSpPr>
-            <a:spLocks noGrp="1"/>
-          </p:cNvSpPr>
-          <p:nvPr>
-            <p:ph idx="1"/>
-          </p:nvPr>
-        </p:nvSpPr>
-        <p:spPr/>
-        <p:txBody>
-          <a:bodyPr/>
-          <a:lstStyle/>
-          <a:p>
+              <a:t>(&lt;- afkorting?) </a:t>
+            </a:r>
+            <a:r>
+              <a:rPr lang="nl-BE" dirty="0" smtClean="0"/>
+              <a:t>voorbeeld problemen</a:t>
+            </a:r>
+          </a:p>
+          <a:p>
+            <a:pPr>
+              <a:buFont typeface="Arial" panose="020B0604020202020204" pitchFamily="34" charset="0"/>
+              <a:buChar char="•"/>
+            </a:pPr>
+            <a:r>
+              <a:rPr lang="nl-BE" dirty="0" smtClean="0"/>
+              <a:t>  Voordelen</a:t>
+            </a:r>
+          </a:p>
+          <a:p>
+            <a:pPr lvl="1">
+              <a:buFont typeface="Arial" panose="020B0604020202020204" pitchFamily="34" charset="0"/>
+              <a:buChar char="•"/>
+            </a:pPr>
+            <a:r>
+              <a:rPr lang="nl-BE" dirty="0" smtClean="0"/>
+              <a:t>Moeilijkheidsgraad duidelijk bepalen</a:t>
+            </a:r>
+          </a:p>
+          <a:p>
+            <a:pPr lvl="1">
+              <a:buFont typeface="Arial" panose="020B0604020202020204" pitchFamily="34" charset="0"/>
+              <a:buChar char="•"/>
+            </a:pPr>
+            <a:r>
+              <a:rPr lang="nl-BE" dirty="0" smtClean="0"/>
+              <a:t>Voorkomen spieken</a:t>
+            </a:r>
+          </a:p>
+          <a:p>
+            <a:pPr lvl="1">
+              <a:buFont typeface="Arial" panose="020B0604020202020204" pitchFamily="34" charset="0"/>
+              <a:buChar char="•"/>
+            </a:pPr>
+            <a:r>
+              <a:rPr lang="nl-BE" dirty="0" smtClean="0"/>
+              <a:t>Copy right problemen vermijden</a:t>
+            </a:r>
+          </a:p>
+          <a:p>
+            <a:pPr>
+              <a:buFont typeface="Arial" panose="020B0604020202020204" pitchFamily="34" charset="0"/>
+              <a:buChar char="•"/>
+            </a:pPr>
+            <a:r>
+              <a:rPr lang="nl-BE" dirty="0"/>
+              <a:t> </a:t>
+            </a:r>
+            <a:r>
+              <a:rPr lang="nl-BE" dirty="0" smtClean="0"/>
+              <a:t> 2 principes conceptuele probleem generatie</a:t>
+            </a:r>
+          </a:p>
+          <a:p>
+            <a:pPr lvl="1">
+              <a:buFont typeface="Arial" panose="020B0604020202020204" pitchFamily="34" charset="0"/>
+              <a:buChar char="•"/>
+            </a:pPr>
+            <a:r>
+              <a:rPr lang="nl-BE" dirty="0" err="1" smtClean="0"/>
+              <a:t>Examble</a:t>
+            </a:r>
+            <a:r>
+              <a:rPr lang="nl-BE" dirty="0" err="1"/>
+              <a:t>-</a:t>
+            </a:r>
+            <a:r>
+              <a:rPr lang="nl-BE" dirty="0" err="1" smtClean="0"/>
+              <a:t>based</a:t>
+            </a:r>
+            <a:r>
+              <a:rPr lang="nl-BE" dirty="0" smtClean="0"/>
+              <a:t> template generatie</a:t>
+            </a:r>
+          </a:p>
+          <a:p>
+            <a:pPr lvl="1">
+              <a:buFont typeface="Arial" panose="020B0604020202020204" pitchFamily="34" charset="0"/>
+              <a:buChar char="•"/>
+            </a:pPr>
+            <a:r>
+              <a:rPr lang="nl-BE" dirty="0" smtClean="0"/>
+              <a:t>Probleem genereren </a:t>
+            </a:r>
+            <a:r>
+              <a:rPr lang="nl-BE" dirty="0" err="1" smtClean="0"/>
+              <a:t>dmv</a:t>
+            </a:r>
+            <a:r>
+              <a:rPr lang="nl-BE" dirty="0">
+                <a:solidFill>
+                  <a:srgbClr val="FF0000"/>
+                </a:solidFill>
+              </a:rPr>
+              <a:t> (&lt;- afkorting?)</a:t>
+            </a:r>
+            <a:r>
+              <a:rPr lang="nl-BE" dirty="0" smtClean="0"/>
+              <a:t> oplossing</a:t>
+            </a:r>
+          </a:p>
+          <a:p>
+            <a:pPr lvl="1">
+              <a:buFont typeface="Arial" panose="020B0604020202020204" pitchFamily="34" charset="0"/>
+              <a:buChar char="•"/>
+            </a:pPr>
             <a:endParaRPr lang="en-US" dirty="0"/>
           </a:p>
         </p:txBody>
@@ -7624,45 +7914,136 @@
           <a:lstStyle/>
           <a:p>
             <a:r>
-              <a:rPr lang="nl-BE" dirty="0" smtClean="0"/>
-              <a:t>Voorbeeld</a:t>
-            </a:r>
-            <a:r>
-              <a:rPr lang="nl-BE" dirty="0">
+              <a:rPr lang="nl-BE" dirty="0"/>
+              <a:t>O</a:t>
+            </a:r>
+            <a:r>
+              <a:rPr lang="nl-BE" dirty="0" smtClean="0"/>
+              <a:t>plossing </a:t>
+            </a:r>
+            <a:r>
+              <a:rPr lang="nl-BE" dirty="0" smtClean="0"/>
+              <a:t>generatie</a:t>
+            </a:r>
+            <a:endParaRPr lang="en-US" dirty="0"/>
+          </a:p>
+        </p:txBody>
+      </p:sp>
+      <p:sp>
+        <p:nvSpPr>
+          <p:cNvPr id="3" name="Content Placeholder 2"/>
+          <p:cNvSpPr>
+            <a:spLocks noGrp="1"/>
+          </p:cNvSpPr>
+          <p:nvPr>
+            <p:ph idx="1"/>
+          </p:nvPr>
+        </p:nvSpPr>
+        <p:spPr/>
+        <p:txBody>
+          <a:bodyPr>
+            <a:normAutofit/>
+          </a:bodyPr>
+          <a:lstStyle/>
+          <a:p>
+            <a:pPr>
+              <a:buFont typeface="Arial" panose="020B0604020202020204" pitchFamily="34" charset="0"/>
+              <a:buChar char="•"/>
+            </a:pPr>
+            <a:r>
+              <a:rPr lang="nl-BE" dirty="0" smtClean="0"/>
+              <a:t>  Automatisch generen oplossing</a:t>
+            </a:r>
+          </a:p>
+          <a:p>
+            <a:pPr>
+              <a:buFont typeface="Arial" panose="020B0604020202020204" pitchFamily="34" charset="0"/>
+              <a:buChar char="•"/>
+            </a:pPr>
+            <a:r>
+              <a:rPr lang="nl-BE" dirty="0" smtClean="0"/>
+              <a:t>  Belang</a:t>
+            </a:r>
+          </a:p>
+          <a:p>
+            <a:pPr lvl="1">
+              <a:buFont typeface="Arial" panose="020B0604020202020204" pitchFamily="34" charset="0"/>
+              <a:buChar char="•"/>
+            </a:pPr>
+            <a:r>
+              <a:rPr lang="nl-BE" dirty="0" smtClean="0"/>
+              <a:t>Voorbeeld oplossing</a:t>
+            </a:r>
+          </a:p>
+          <a:p>
+            <a:pPr lvl="1">
+              <a:buFont typeface="Arial" panose="020B0604020202020204" pitchFamily="34" charset="0"/>
+              <a:buChar char="•"/>
+            </a:pPr>
+            <a:r>
+              <a:rPr lang="nl-BE" dirty="0" smtClean="0"/>
+              <a:t>Oplossing op basis van deeloplossing</a:t>
+            </a:r>
+          </a:p>
+          <a:p>
+            <a:pPr lvl="1">
+              <a:buFont typeface="Arial" panose="020B0604020202020204" pitchFamily="34" charset="0"/>
+              <a:buChar char="•"/>
+            </a:pPr>
+            <a:r>
+              <a:rPr lang="nl-BE" dirty="0" smtClean="0"/>
+              <a:t>Hints</a:t>
+            </a:r>
+          </a:p>
+          <a:p>
+            <a:pPr>
+              <a:buFont typeface="Arial" panose="020B0604020202020204" pitchFamily="34" charset="0"/>
+              <a:buChar char="•"/>
+            </a:pPr>
+            <a:r>
+              <a:rPr lang="nl-BE" dirty="0"/>
+              <a:t> </a:t>
+            </a:r>
+            <a:r>
+              <a:rPr lang="nl-BE" dirty="0" smtClean="0"/>
+              <a:t>2 principes conceptuele oplossing generatie</a:t>
+            </a:r>
+          </a:p>
+          <a:p>
+            <a:pPr lvl="1">
+              <a:buFont typeface="Arial" panose="020B0604020202020204" pitchFamily="34" charset="0"/>
+              <a:buChar char="•"/>
+            </a:pPr>
+            <a:r>
+              <a:rPr lang="nl-BE" dirty="0" err="1" smtClean="0"/>
+              <a:t>Reasoning</a:t>
+            </a:r>
+            <a:r>
+              <a:rPr lang="nl-BE" dirty="0" smtClean="0"/>
+              <a:t> </a:t>
+            </a:r>
+            <a:r>
+              <a:rPr lang="nl-BE" dirty="0" smtClean="0">
                 <a:solidFill>
                   <a:srgbClr val="FF0000"/>
                 </a:solidFill>
               </a:rPr>
-              <a:t> (&lt;- betere titel) </a:t>
-            </a:r>
-            <a:r>
-              <a:rPr lang="nl-BE" dirty="0" smtClean="0"/>
-              <a:t>: oplossing generatie</a:t>
-            </a:r>
-            <a:endParaRPr lang="en-US" dirty="0"/>
-          </a:p>
-        </p:txBody>
-      </p:sp>
-      <p:sp>
-        <p:nvSpPr>
-          <p:cNvPr id="3" name="Content Placeholder 2"/>
-          <p:cNvSpPr>
-            <a:spLocks noGrp="1"/>
-          </p:cNvSpPr>
-          <p:nvPr>
-            <p:ph idx="1"/>
-          </p:nvPr>
-        </p:nvSpPr>
-        <p:spPr/>
-        <p:txBody>
-          <a:bodyPr/>
-          <a:lstStyle/>
-          <a:p>
-            <a:r>
-              <a:rPr lang="nl-BE" dirty="0" smtClean="0"/>
-              <a:t>Specifiek aan jou oplossing</a:t>
-            </a:r>
-            <a:endParaRPr lang="en-US" dirty="0"/>
+              <a:t>(&lt;- Vertalen) </a:t>
+            </a:r>
+            <a:r>
+              <a:rPr lang="nl-BE" dirty="0" smtClean="0"/>
+              <a:t>over voorbeelden</a:t>
+            </a:r>
+          </a:p>
+          <a:p>
+            <a:pPr lvl="1">
+              <a:buFont typeface="Arial" panose="020B0604020202020204" pitchFamily="34" charset="0"/>
+              <a:buChar char="•"/>
+            </a:pPr>
+            <a:r>
+              <a:rPr lang="nl-BE" dirty="0" smtClean="0"/>
+              <a:t>Enkel oplossingen met kleine oplossingslengte</a:t>
+            </a:r>
           </a:p>
         </p:txBody>
       </p:sp>
@@ -7720,19 +8101,7 @@
           <a:p>
             <a:r>
               <a:rPr lang="nl-BE" dirty="0" smtClean="0"/>
-              <a:t>Voorbeeld</a:t>
-            </a:r>
-            <a:r>
-              <a:rPr lang="nl-BE" dirty="0">
-                <a:solidFill>
-                  <a:srgbClr val="FF0000"/>
-                </a:solidFill>
-              </a:rPr>
-              <a:t> (&lt;- betere titel) </a:t>
-            </a:r>
-            <a:r>
-              <a:rPr lang="nl-BE" dirty="0" smtClean="0"/>
-              <a:t>: feedback generatie</a:t>
+              <a:t>Feedback generatie</a:t>
             </a:r>
             <a:endParaRPr lang="en-US" dirty="0"/>
           </a:p>
@@ -7753,6 +8122,119 @@
           <a:bodyPr/>
           <a:lstStyle/>
           <a:p>
+            <a:pPr>
+              <a:buFont typeface="Arial" panose="020B0604020202020204" pitchFamily="34" charset="0"/>
+              <a:buChar char="•"/>
+            </a:pPr>
+            <a:r>
+              <a:rPr lang="nl-BE" dirty="0" smtClean="0"/>
+              <a:t>  </a:t>
+            </a:r>
+            <a:r>
+              <a:rPr lang="nl-BE" dirty="0" smtClean="0"/>
+              <a:t>Controleren c</a:t>
+            </a:r>
+            <a:r>
+              <a:rPr lang="nl-BE" dirty="0" smtClean="0"/>
+              <a:t>orrectheid oplossing</a:t>
+            </a:r>
+          </a:p>
+          <a:p>
+            <a:pPr lvl="1">
+              <a:buFont typeface="Arial" panose="020B0604020202020204" pitchFamily="34" charset="0"/>
+              <a:buChar char="•"/>
+            </a:pPr>
+            <a:r>
+              <a:rPr lang="nl-BE" dirty="0" smtClean="0"/>
+              <a:t>Waarom incorrect</a:t>
+            </a:r>
+          </a:p>
+          <a:p>
+            <a:pPr lvl="1">
+              <a:buFont typeface="Arial" panose="020B0604020202020204" pitchFamily="34" charset="0"/>
+              <a:buChar char="•"/>
+            </a:pPr>
+            <a:r>
+              <a:rPr lang="nl-BE" dirty="0" smtClean="0"/>
+              <a:t>Waar en hoe fout verbeteren</a:t>
+            </a:r>
+            <a:endParaRPr lang="nl-BE" dirty="0" smtClean="0"/>
+          </a:p>
+          <a:p>
+            <a:pPr>
+              <a:buFont typeface="Arial" panose="020B0604020202020204" pitchFamily="34" charset="0"/>
+              <a:buChar char="•"/>
+            </a:pPr>
+            <a:r>
+              <a:rPr lang="nl-BE" dirty="0"/>
+              <a:t> </a:t>
+            </a:r>
+            <a:r>
+              <a:rPr lang="nl-BE" dirty="0" smtClean="0"/>
+              <a:t> Hint voor verbeteren</a:t>
+            </a:r>
+          </a:p>
+          <a:p>
+            <a:pPr>
+              <a:buFont typeface="Arial" panose="020B0604020202020204" pitchFamily="34" charset="0"/>
+              <a:buChar char="•"/>
+            </a:pPr>
+            <a:r>
+              <a:rPr lang="nl-BE" dirty="0"/>
+              <a:t> </a:t>
+            </a:r>
+            <a:r>
+              <a:rPr lang="nl-BE" dirty="0" smtClean="0"/>
+              <a:t> Iedereen gelijke graad</a:t>
+            </a:r>
+          </a:p>
+          <a:p>
+            <a:pPr>
+              <a:buFont typeface="Arial" panose="020B0604020202020204" pitchFamily="34" charset="0"/>
+              <a:buChar char="•"/>
+            </a:pPr>
+            <a:r>
+              <a:rPr lang="nl-BE" dirty="0"/>
+              <a:t> </a:t>
+            </a:r>
+            <a:r>
+              <a:rPr lang="nl-BE" dirty="0" smtClean="0"/>
+              <a:t> Handmatig analyseren fouten tijdrovend</a:t>
+            </a:r>
+          </a:p>
+          <a:p>
+            <a:pPr>
+              <a:buFont typeface="Arial" panose="020B0604020202020204" pitchFamily="34" charset="0"/>
+              <a:buChar char="•"/>
+            </a:pPr>
+            <a:r>
+              <a:rPr lang="nl-BE" dirty="0"/>
+              <a:t> </a:t>
+            </a:r>
+            <a:r>
+              <a:rPr lang="nl-BE" dirty="0" smtClean="0"/>
+              <a:t> 2 principes feedback conceptuele problemen</a:t>
+            </a:r>
+          </a:p>
+          <a:p>
+            <a:pPr lvl="1">
+              <a:buFont typeface="Arial" panose="020B0604020202020204" pitchFamily="34" charset="0"/>
+              <a:buChar char="•"/>
+            </a:pPr>
+            <a:r>
+              <a:rPr lang="nl-BE" dirty="0" smtClean="0"/>
+              <a:t>Aanpassingsafstand</a:t>
+            </a:r>
+          </a:p>
+          <a:p>
+            <a:pPr lvl="1">
+              <a:buFont typeface="Arial" panose="020B0604020202020204" pitchFamily="34" charset="0"/>
+              <a:buChar char="•"/>
+            </a:pPr>
+            <a:r>
+              <a:rPr lang="nl-BE" dirty="0" smtClean="0"/>
+              <a:t>Tegenvoorbeeld</a:t>
+            </a:r>
             <a:endParaRPr lang="en-US" dirty="0"/>
           </a:p>
         </p:txBody>
@@ -7811,18 +8293,14 @@
           <a:p>
             <a:r>
               <a:rPr lang="nl-BE" dirty="0" smtClean="0"/>
-              <a:t>Overzicht: </a:t>
+              <a:t>Toepassing: </a:t>
             </a:r>
             <a:br>
               <a:rPr lang="nl-BE" dirty="0" smtClean="0"/>
             </a:br>
             <a:r>
               <a:rPr lang="nl-BE" dirty="0" smtClean="0"/>
-              <a:t>Spreadsheet </a:t>
-            </a:r>
-            <a:r>
-              <a:rPr lang="nl-BE" dirty="0"/>
-              <a:t>tabel transformaties</a:t>
+              <a:t>Voorbereiden examen</a:t>
             </a:r>
             <a:endParaRPr lang="en-US" dirty="0"/>
           </a:p>
@@ -7849,7 +8327,17 @@
             </a:pPr>
             <a:r>
               <a:rPr lang="nl-BE" dirty="0" smtClean="0"/>
-              <a:t>  Concept oplossing generatie</a:t>
+              <a:t>  Automatisch generatie probleem </a:t>
+            </a:r>
+          </a:p>
+          <a:p>
+            <a:pPr lvl="1">
+              <a:buFont typeface="Arial" panose="020B0604020202020204" pitchFamily="34" charset="0"/>
+              <a:buChar char="•"/>
+            </a:pPr>
+            <a:r>
+              <a:rPr lang="nl-BE" dirty="0" smtClean="0"/>
+              <a:t>Moeilijkheidsgraad kiezen</a:t>
             </a:r>
           </a:p>
           <a:p>
@@ -7863,16 +8351,29 @@
             </a:r>
             <a:r>
               <a:rPr lang="nl-BE" dirty="0" smtClean="0"/>
-              <a:t> Domein kennis</a:t>
-            </a:r>
-            <a:r>
-              <a:rPr lang="nl-BE" dirty="0" smtClean="0">
-                <a:solidFill>
-                  <a:srgbClr val="FF0000"/>
-                </a:solidFill>
-              </a:rPr>
-              <a:t>(&lt;- vertalen?)</a:t>
-            </a:r>
+              <a:t> Oplossing</a:t>
+            </a:r>
+          </a:p>
+          <a:p>
+            <a:pPr lvl="1">
+              <a:buFont typeface="Arial" panose="020B0604020202020204" pitchFamily="34" charset="0"/>
+              <a:buChar char="•"/>
+            </a:pPr>
+            <a:r>
+              <a:rPr lang="nl-BE" dirty="0" smtClean="0"/>
+              <a:t>Verdergaand eigen deeloplossing</a:t>
+            </a:r>
+          </a:p>
+          <a:p>
+            <a:pPr lvl="1">
+              <a:buFont typeface="Arial" panose="020B0604020202020204" pitchFamily="34" charset="0"/>
+              <a:buChar char="•"/>
+            </a:pPr>
+            <a:r>
+              <a:rPr lang="nl-BE" dirty="0" smtClean="0"/>
+              <a:t>Hints</a:t>
+            </a:r>
+            <a:endParaRPr lang="nl-BE" dirty="0" smtClean="0"/>
           </a:p>
           <a:p>
             <a:pPr>
@@ -7885,31 +8386,27 @@
             </a:r>
             <a:r>
               <a:rPr lang="nl-BE" dirty="0" smtClean="0"/>
-              <a:t> Programming </a:t>
-            </a:r>
-            <a:r>
-              <a:rPr lang="nl-BE" dirty="0" err="1" smtClean="0"/>
-              <a:t>by</a:t>
-            </a:r>
-            <a:r>
-              <a:rPr lang="nl-BE" dirty="0" smtClean="0"/>
-              <a:t> </a:t>
-            </a:r>
-            <a:r>
-              <a:rPr lang="nl-BE" dirty="0" err="1" smtClean="0"/>
-              <a:t>example</a:t>
-            </a:r>
-            <a:r>
-              <a:rPr lang="nl-BE" dirty="0" smtClean="0"/>
-              <a:t> </a:t>
-            </a:r>
-            <a:r>
-              <a:rPr lang="nl-BE" dirty="0">
-                <a:solidFill>
-                  <a:srgbClr val="FF0000"/>
-                </a:solidFill>
-              </a:rPr>
-              <a:t>(&lt;- vertalen?)</a:t>
+              <a:t> Feedback</a:t>
+            </a:r>
+          </a:p>
+          <a:p>
+            <a:pPr lvl="1">
+              <a:buFont typeface="Arial" panose="020B0604020202020204" pitchFamily="34" charset="0"/>
+              <a:buChar char="•"/>
+            </a:pPr>
+            <a:r>
+              <a:rPr lang="nl-BE" dirty="0" smtClean="0"/>
+              <a:t>Score</a:t>
+            </a:r>
+          </a:p>
+          <a:p>
+            <a:pPr lvl="1">
+              <a:buFont typeface="Arial" panose="020B0604020202020204" pitchFamily="34" charset="0"/>
+              <a:buChar char="•"/>
+            </a:pPr>
+            <a:r>
+              <a:rPr lang="nl-BE" dirty="0" smtClean="0"/>
+              <a:t>Helpen verbeteren</a:t>
             </a:r>
             <a:endParaRPr lang="en-US" dirty="0"/>
           </a:p>
@@ -7918,7 +8415,7 @@
     </p:spTree>
     <p:extLst>
       <p:ext uri="{BB962C8B-B14F-4D97-AF65-F5344CB8AC3E}">
-        <p14:creationId xmlns:p14="http://schemas.microsoft.com/office/powerpoint/2010/main" val="848964369"/>
+        <p14:creationId xmlns:p14="http://schemas.microsoft.com/office/powerpoint/2010/main" val="174650717"/>
       </p:ext>
     </p:extLst>
   </p:cSld>

</xml_diff>

<commit_message>
Updated powerpoint - Spreadsheet Tabel Transformations
</commit_message>
<xml_diff>
--- a/Opdracht 2/Literatuurstudie.pptx
+++ b/Opdracht 2/Literatuurstudie.pptx
@@ -15,9 +15,9 @@
     <p:sldId id="265" r:id="rId9"/>
     <p:sldId id="266" r:id="rId10"/>
     <p:sldId id="267" r:id="rId11"/>
-    <p:sldId id="268" r:id="rId12"/>
-    <p:sldId id="269" r:id="rId13"/>
-    <p:sldId id="271" r:id="rId14"/>
+    <p:sldId id="271" r:id="rId12"/>
+    <p:sldId id="268" r:id="rId13"/>
+    <p:sldId id="269" r:id="rId14"/>
     <p:sldId id="272" r:id="rId15"/>
     <p:sldId id="270" r:id="rId16"/>
     <p:sldId id="273" r:id="rId17"/>
@@ -132,7 +132,7 @@
   </p:defaultTextStyle>
   <p:extLst>
     <p:ext uri="{EFAFB233-063F-42B5-8137-9DF3F51BA10A}">
-      <p15:sldGuideLst xmlns:p15="http://schemas.microsoft.com/office/powerpoint/2012/main"/>
+      <p15:sldGuideLst xmlns:p15="http://schemas.microsoft.com/office/powerpoint/2012/main" xmlns=""/>
     </p:ext>
   </p:extLst>
 </p:presentation>
@@ -364,7 +364,7 @@
           <a:p>
             <a:fld id="{19DCFD5E-870D-4395-9E30-B29FE39655A2}" type="datetimeFigureOut">
               <a:rPr lang="nl-BE" smtClean="0"/>
-              <a:t>21/10/2014</a:t>
+              <a:t>22/10/14</a:t>
             </a:fld>
             <a:endParaRPr lang="nl-BE"/>
           </a:p>
@@ -572,7 +572,7 @@
           <a:p>
             <a:fld id="{19DCFD5E-870D-4395-9E30-B29FE39655A2}" type="datetimeFigureOut">
               <a:rPr lang="nl-BE" smtClean="0"/>
-              <a:t>21/10/2014</a:t>
+              <a:t>22/10/14</a:t>
             </a:fld>
             <a:endParaRPr lang="nl-BE"/>
           </a:p>
@@ -828,7 +828,7 @@
           <a:p>
             <a:fld id="{19DCFD5E-870D-4395-9E30-B29FE39655A2}" type="datetimeFigureOut">
               <a:rPr lang="nl-BE" smtClean="0"/>
-              <a:t>21/10/2014</a:t>
+              <a:t>22/10/14</a:t>
             </a:fld>
             <a:endParaRPr lang="nl-BE"/>
           </a:p>
@@ -1002,7 +1002,7 @@
           <a:p>
             <a:fld id="{19DCFD5E-870D-4395-9E30-B29FE39655A2}" type="datetimeFigureOut">
               <a:rPr lang="nl-BE" smtClean="0"/>
-              <a:t>21/10/2014</a:t>
+              <a:t>22/10/14</a:t>
             </a:fld>
             <a:endParaRPr lang="nl-BE"/>
           </a:p>
@@ -1345,7 +1345,7 @@
           <a:p>
             <a:fld id="{19DCFD5E-870D-4395-9E30-B29FE39655A2}" type="datetimeFigureOut">
               <a:rPr lang="nl-BE" smtClean="0"/>
-              <a:t>21/10/2014</a:t>
+              <a:t>22/10/14</a:t>
             </a:fld>
             <a:endParaRPr lang="nl-BE"/>
           </a:p>
@@ -1620,7 +1620,7 @@
           <a:p>
             <a:fld id="{19DCFD5E-870D-4395-9E30-B29FE39655A2}" type="datetimeFigureOut">
               <a:rPr lang="nl-BE" smtClean="0"/>
-              <a:t>21/10/2014</a:t>
+              <a:t>22/10/14</a:t>
             </a:fld>
             <a:endParaRPr lang="nl-BE"/>
           </a:p>
@@ -1999,7 +1999,7 @@
           <a:p>
             <a:fld id="{19DCFD5E-870D-4395-9E30-B29FE39655A2}" type="datetimeFigureOut">
               <a:rPr lang="nl-BE" smtClean="0"/>
-              <a:t>21/10/2014</a:t>
+              <a:t>22/10/14</a:t>
             </a:fld>
             <a:endParaRPr lang="nl-BE"/>
           </a:p>
@@ -2117,7 +2117,7 @@
           <a:p>
             <a:fld id="{19DCFD5E-870D-4395-9E30-B29FE39655A2}" type="datetimeFigureOut">
               <a:rPr lang="nl-BE" smtClean="0"/>
-              <a:t>21/10/2014</a:t>
+              <a:t>22/10/14</a:t>
             </a:fld>
             <a:endParaRPr lang="nl-BE"/>
           </a:p>
@@ -2288,7 +2288,7 @@
           <a:p>
             <a:fld id="{19DCFD5E-870D-4395-9E30-B29FE39655A2}" type="datetimeFigureOut">
               <a:rPr lang="nl-BE" smtClean="0"/>
-              <a:t>21/10/2014</a:t>
+              <a:t>22/10/14</a:t>
             </a:fld>
             <a:endParaRPr lang="nl-BE"/>
           </a:p>
@@ -2642,7 +2642,7 @@
           <a:p>
             <a:fld id="{19DCFD5E-870D-4395-9E30-B29FE39655A2}" type="datetimeFigureOut">
               <a:rPr lang="nl-BE" smtClean="0"/>
-              <a:t>21/10/2014</a:t>
+              <a:t>22/10/14</a:t>
             </a:fld>
             <a:endParaRPr lang="nl-BE"/>
           </a:p>
@@ -3024,7 +3024,7 @@
           <a:p>
             <a:fld id="{19DCFD5E-870D-4395-9E30-B29FE39655A2}" type="datetimeFigureOut">
               <a:rPr lang="nl-BE" smtClean="0"/>
-              <a:t>21/10/2014</a:t>
+              <a:t>22/10/14</a:t>
             </a:fld>
             <a:endParaRPr lang="nl-BE"/>
           </a:p>
@@ -3311,7 +3311,7 @@
           <a:p>
             <a:fld id="{19DCFD5E-870D-4395-9E30-B29FE39655A2}" type="datetimeFigureOut">
               <a:rPr lang="nl-BE" smtClean="0"/>
-              <a:t>21/10/2014</a:t>
+              <a:t>22/10/14</a:t>
             </a:fld>
             <a:endParaRPr lang="nl-BE"/>
           </a:p>
@@ -3961,24 +3961,135 @@
           </a:p>
         </p:txBody>
       </p:sp>
-      <p:sp>
-        <p:nvSpPr>
-          <p:cNvPr id="3" name="Content Placeholder 2"/>
-          <p:cNvSpPr>
-            <a:spLocks noGrp="1"/>
-          </p:cNvSpPr>
-          <p:nvPr>
-            <p:ph idx="1"/>
-          </p:nvPr>
-        </p:nvSpPr>
-        <p:spPr/>
-        <p:txBody>
-          <a:bodyPr/>
-          <a:lstStyle/>
-          <a:p>
-            <a:endParaRPr lang="en-US"/>
-          </a:p>
-        </p:txBody>
+      <p:pic>
+        <p:nvPicPr>
+          <p:cNvPr id="5" name="Picture 4" descr="spreadsheet 2.png"/>
+          <p:cNvPicPr>
+            <a:picLocks noChangeAspect="1"/>
+          </p:cNvPicPr>
+          <p:nvPr/>
+        </p:nvPicPr>
+        <p:blipFill>
+          <a:blip r:embed="rId2">
+            <a:extLst>
+              <a:ext uri="{BEBA8EAE-BF5A-486C-A8C5-ECC9F3942E4B}">
+                <a14:imgProps xmlns:a14="http://schemas.microsoft.com/office/drawing/2010/main">
+                  <a14:imgLayer r:embed="rId3">
+                    <a14:imgEffect>
+                      <a14:backgroundRemoval t="0" b="96206" l="3268" r="94935">
+                        <a14:foregroundMark x1="21078" y1="19512" x2="29248" y2="24932"/>
+                        <a14:foregroundMark x1="31373" y1="74255" x2="74346" y2="91057"/>
+                        <a14:foregroundMark x1="26961" y1="88347" x2="33007" y2="90244"/>
+                        <a14:foregroundMark x1="3758" y1="13279" x2="92484" y2="82114"/>
+                      </a14:backgroundRemoval>
+                    </a14:imgEffect>
+                  </a14:imgLayer>
+                </a14:imgProps>
+              </a:ext>
+              <a:ext uri="{28A0092B-C50C-407E-A947-70E740481C1C}">
+                <a14:useLocalDpi xmlns:a14="http://schemas.microsoft.com/office/drawing/2010/main" val="0"/>
+              </a:ext>
+            </a:extLst>
+          </a:blip>
+          <a:stretch>
+            <a:fillRect/>
+          </a:stretch>
+        </p:blipFill>
+        <p:spPr>
+          <a:xfrm>
+            <a:off x="6570655" y="2893422"/>
+            <a:ext cx="5491746" cy="3311200"/>
+          </a:xfrm>
+          <a:prstGeom prst="rect">
+            <a:avLst/>
+          </a:prstGeom>
+        </p:spPr>
+      </p:pic>
+      <p:pic>
+        <p:nvPicPr>
+          <p:cNvPr id="4" name="Picture 3" descr="spreadsheet 1.png"/>
+          <p:cNvPicPr>
+            <a:picLocks noChangeAspect="1"/>
+          </p:cNvPicPr>
+          <p:nvPr/>
+        </p:nvPicPr>
+        <p:blipFill>
+          <a:blip r:embed="rId4">
+            <a:extLst>
+              <a:ext uri="{28A0092B-C50C-407E-A947-70E740481C1C}">
+                <a14:useLocalDpi xmlns:a14="http://schemas.microsoft.com/office/drawing/2010/main" val="0"/>
+              </a:ext>
+            </a:extLst>
+          </a:blip>
+          <a:stretch>
+            <a:fillRect/>
+          </a:stretch>
+        </p:blipFill>
+        <p:spPr>
+          <a:xfrm>
+            <a:off x="0" y="1836688"/>
+            <a:ext cx="6752094" cy="1941303"/>
+          </a:xfrm>
+          <a:prstGeom prst="rect">
+            <a:avLst/>
+          </a:prstGeom>
+        </p:spPr>
+      </p:pic>
+      <p:sp>
+        <p:nvSpPr>
+          <p:cNvPr id="7" name="Bent-Up Arrow 6"/>
+          <p:cNvSpPr/>
+          <p:nvPr/>
+        </p:nvSpPr>
+        <p:spPr>
+          <a:xfrm rot="5400000">
+            <a:off x="4436881" y="3824107"/>
+            <a:ext cx="1400175" cy="1594049"/>
+          </a:xfrm>
+          <a:prstGeom prst="bentUpArrow">
+            <a:avLst>
+              <a:gd name="adj1" fmla="val 32840"/>
+              <a:gd name="adj2" fmla="val 25000"/>
+              <a:gd name="adj3" fmla="val 35780"/>
+            </a:avLst>
+          </a:prstGeom>
+        </p:spPr>
+        <p:style>
+          <a:lnRef idx="0">
+            <a:schemeClr val="lt1">
+              <a:hueOff val="0"/>
+              <a:satOff val="0"/>
+              <a:lumOff val="0"/>
+              <a:alphaOff val="0"/>
+            </a:schemeClr>
+          </a:lnRef>
+          <a:fillRef idx="1">
+            <a:schemeClr val="accent1">
+              <a:tint val="50000"/>
+              <a:hueOff val="0"/>
+              <a:satOff val="0"/>
+              <a:lumOff val="0"/>
+              <a:alphaOff val="0"/>
+            </a:schemeClr>
+          </a:fillRef>
+          <a:effectRef idx="2">
+            <a:schemeClr val="accent1">
+              <a:tint val="50000"/>
+              <a:hueOff val="0"/>
+              <a:satOff val="0"/>
+              <a:lumOff val="0"/>
+              <a:alphaOff val="0"/>
+            </a:schemeClr>
+          </a:effectRef>
+          <a:fontRef idx="minor">
+            <a:schemeClr val="lt1">
+              <a:hueOff val="0"/>
+              <a:satOff val="0"/>
+              <a:lumOff val="0"/>
+              <a:alphaOff val="0"/>
+            </a:schemeClr>
+          </a:fontRef>
+        </p:style>
       </p:sp>
     </p:spTree>
     <p:extLst>
@@ -4026,60 +4137,47 @@
           <a:lstStyle/>
           <a:p>
             <a:r>
-              <a:rPr lang="nl-BE" dirty="0" smtClean="0"/>
-              <a:t>Domein kennis </a:t>
-            </a:r>
-            <a:r>
-              <a:rPr lang="nl-BE" dirty="0" smtClean="0">
-                <a:solidFill>
-                  <a:srgbClr val="FF0000"/>
-                </a:solidFill>
-              </a:rPr>
-              <a:t>(&lt;- </a:t>
-            </a:r>
-            <a:r>
-              <a:rPr lang="nl-BE" dirty="0">
-                <a:solidFill>
-                  <a:srgbClr val="FF0000"/>
-                </a:solidFill>
-              </a:rPr>
-              <a:t>vertalen</a:t>
-            </a:r>
-            <a:r>
-              <a:rPr lang="nl-BE" dirty="0" smtClean="0">
-                <a:solidFill>
-                  <a:srgbClr val="FF0000"/>
-                </a:solidFill>
-              </a:rPr>
-              <a:t>?)</a:t>
+              <a:rPr lang="en-US" dirty="0" err="1" smtClean="0"/>
+              <a:t>Structuur</a:t>
             </a:r>
             <a:endParaRPr lang="en-US" dirty="0"/>
           </a:p>
         </p:txBody>
       </p:sp>
-      <p:sp>
-        <p:nvSpPr>
-          <p:cNvPr id="3" name="Content Placeholder 2"/>
-          <p:cNvSpPr>
-            <a:spLocks noGrp="1"/>
-          </p:cNvSpPr>
-          <p:nvPr>
-            <p:ph idx="1"/>
-          </p:nvPr>
-        </p:nvSpPr>
-        <p:spPr/>
-        <p:txBody>
-          <a:bodyPr/>
-          <a:lstStyle/>
-          <a:p>
-            <a:endParaRPr lang="en-US"/>
-          </a:p>
-        </p:txBody>
-      </p:sp>
+      <p:pic>
+        <p:nvPicPr>
+          <p:cNvPr id="4" name="Picture 3" descr="Syntaxis.png"/>
+          <p:cNvPicPr>
+            <a:picLocks noChangeAspect="1"/>
+          </p:cNvPicPr>
+          <p:nvPr/>
+        </p:nvPicPr>
+        <p:blipFill>
+          <a:blip r:embed="rId2">
+            <a:extLst>
+              <a:ext uri="{28A0092B-C50C-407E-A947-70E740481C1C}">
+                <a14:useLocalDpi xmlns:a14="http://schemas.microsoft.com/office/drawing/2010/main" val="0"/>
+              </a:ext>
+            </a:extLst>
+          </a:blip>
+          <a:stretch>
+            <a:fillRect/>
+          </a:stretch>
+        </p:blipFill>
+        <p:spPr>
+          <a:xfrm>
+            <a:off x="2060619" y="1747973"/>
+            <a:ext cx="7737045" cy="4526918"/>
+          </a:xfrm>
+          <a:prstGeom prst="rect">
+            <a:avLst/>
+          </a:prstGeom>
+        </p:spPr>
+      </p:pic>
     </p:spTree>
     <p:extLst>
       <p:ext uri="{BB962C8B-B14F-4D97-AF65-F5344CB8AC3E}">
-        <p14:creationId xmlns:p14="http://schemas.microsoft.com/office/powerpoint/2010/main" val="401413552"/>
+        <p14:creationId xmlns:p14="http://schemas.microsoft.com/office/powerpoint/2010/main" val="174650717"/>
       </p:ext>
     </p:extLst>
   </p:cSld>
@@ -4122,24 +4220,16 @@
           <a:lstStyle/>
           <a:p>
             <a:r>
-              <a:rPr lang="nl-BE" dirty="0"/>
-              <a:t>Programming </a:t>
-            </a:r>
-            <a:r>
-              <a:rPr lang="nl-BE" dirty="0" err="1"/>
-              <a:t>by</a:t>
-            </a:r>
-            <a:r>
-              <a:rPr lang="nl-BE" dirty="0"/>
-              <a:t> </a:t>
-            </a:r>
-            <a:r>
-              <a:rPr lang="nl-BE" dirty="0" err="1"/>
-              <a:t>example</a:t>
-            </a:r>
-            <a:r>
-              <a:rPr lang="nl-BE" dirty="0"/>
-              <a:t> </a:t>
+              <a:rPr lang="nl-BE" dirty="0" smtClean="0"/>
+              <a:t>Domein kennis </a:t>
+            </a:r>
+            <a:r>
+              <a:rPr lang="nl-BE" dirty="0" smtClean="0">
+                <a:solidFill>
+                  <a:srgbClr val="FF0000"/>
+                </a:solidFill>
+              </a:rPr>
+              <a:t>(&lt;- </a:t>
             </a:r>
             <a:r>
               <a:rPr lang="nl-BE" dirty="0">
@@ -4147,7 +4237,7 @@
                   <a:srgbClr val="FF0000"/>
                 </a:solidFill>
               </a:rPr>
-              <a:t>(&lt;- vertalen</a:t>
+              <a:t>vertalen</a:t>
             </a:r>
             <a:r>
               <a:rPr lang="nl-BE" dirty="0" smtClean="0">
@@ -4161,29 +4251,70 @@
           </a:p>
         </p:txBody>
       </p:sp>
-      <p:sp>
-        <p:nvSpPr>
-          <p:cNvPr id="3" name="Content Placeholder 2"/>
-          <p:cNvSpPr>
-            <a:spLocks noGrp="1"/>
-          </p:cNvSpPr>
-          <p:nvPr>
-            <p:ph idx="1"/>
-          </p:nvPr>
-        </p:nvSpPr>
-        <p:spPr/>
-        <p:txBody>
-          <a:bodyPr/>
-          <a:lstStyle/>
-          <a:p>
-            <a:endParaRPr lang="en-US" dirty="0"/>
-          </a:p>
-        </p:txBody>
-      </p:sp>
+      <p:pic>
+        <p:nvPicPr>
+          <p:cNvPr id="6" name="Picture 5" descr="semantiek 2.png"/>
+          <p:cNvPicPr>
+            <a:picLocks noChangeAspect="1"/>
+          </p:cNvPicPr>
+          <p:nvPr/>
+        </p:nvPicPr>
+        <p:blipFill>
+          <a:blip r:embed="rId2">
+            <a:extLst>
+              <a:ext uri="{28A0092B-C50C-407E-A947-70E740481C1C}">
+                <a14:useLocalDpi xmlns:a14="http://schemas.microsoft.com/office/drawing/2010/main" val="0"/>
+              </a:ext>
+            </a:extLst>
+          </a:blip>
+          <a:stretch>
+            <a:fillRect/>
+          </a:stretch>
+        </p:blipFill>
+        <p:spPr>
+          <a:xfrm>
+            <a:off x="6078180" y="1799109"/>
+            <a:ext cx="6113820" cy="3698728"/>
+          </a:xfrm>
+          <a:prstGeom prst="rect">
+            <a:avLst/>
+          </a:prstGeom>
+        </p:spPr>
+      </p:pic>
+      <p:pic>
+        <p:nvPicPr>
+          <p:cNvPr id="7" name="Picture 6" descr="semantiek 1.png"/>
+          <p:cNvPicPr>
+            <a:picLocks noChangeAspect="1"/>
+          </p:cNvPicPr>
+          <p:nvPr/>
+        </p:nvPicPr>
+        <p:blipFill>
+          <a:blip r:embed="rId3">
+            <a:extLst>
+              <a:ext uri="{28A0092B-C50C-407E-A947-70E740481C1C}">
+                <a14:useLocalDpi xmlns:a14="http://schemas.microsoft.com/office/drawing/2010/main" val="0"/>
+              </a:ext>
+            </a:extLst>
+          </a:blip>
+          <a:stretch>
+            <a:fillRect/>
+          </a:stretch>
+        </p:blipFill>
+        <p:spPr>
+          <a:xfrm>
+            <a:off x="118652" y="1749325"/>
+            <a:ext cx="5859463" cy="3667102"/>
+          </a:xfrm>
+          <a:prstGeom prst="rect">
+            <a:avLst/>
+          </a:prstGeom>
+        </p:spPr>
+      </p:pic>
     </p:spTree>
     <p:extLst>
       <p:ext uri="{BB962C8B-B14F-4D97-AF65-F5344CB8AC3E}">
-        <p14:creationId xmlns:p14="http://schemas.microsoft.com/office/powerpoint/2010/main" val="239212845"/>
+        <p14:creationId xmlns:p14="http://schemas.microsoft.com/office/powerpoint/2010/main" val="401413552"/>
       </p:ext>
     </p:extLst>
   </p:cSld>
@@ -4225,7 +4356,27 @@
           <a:bodyPr/>
           <a:lstStyle/>
           <a:p>
-            <a:endParaRPr lang="en-US"/>
+            <a:r>
+              <a:rPr lang="nl-BE" dirty="0" smtClean="0"/>
+              <a:t>End-User Programming </a:t>
+            </a:r>
+            <a:r>
+              <a:rPr lang="nl-BE" dirty="0">
+                <a:solidFill>
+                  <a:srgbClr val="FF0000"/>
+                </a:solidFill>
+              </a:rPr>
+              <a:t>(&lt;- vertalen</a:t>
+            </a:r>
+            <a:r>
+              <a:rPr lang="nl-BE" dirty="0" smtClean="0">
+                <a:solidFill>
+                  <a:srgbClr val="FF0000"/>
+                </a:solidFill>
+              </a:rPr>
+              <a:t>?)</a:t>
+            </a:r>
+            <a:endParaRPr lang="en-US" dirty="0"/>
           </a:p>
         </p:txBody>
       </p:sp>
@@ -4244,14 +4395,66 @@
           <a:bodyPr/>
           <a:lstStyle/>
           <a:p>
-            <a:endParaRPr lang="en-US"/>
+            <a:pPr marL="0" indent="0">
+              <a:buNone/>
+            </a:pPr>
+            <a:r>
+              <a:rPr lang="en-US" dirty="0" err="1" smtClean="0"/>
+              <a:t>Repetitieve</a:t>
+            </a:r>
+            <a:r>
+              <a:rPr lang="en-US" dirty="0" smtClean="0"/>
+              <a:t> taken</a:t>
+            </a:r>
+          </a:p>
+          <a:p>
+            <a:pPr marL="0" indent="0">
+              <a:buNone/>
+            </a:pPr>
+            <a:r>
+              <a:rPr lang="en-US" dirty="0" err="1" smtClean="0"/>
+              <a:t>Weinig</a:t>
+            </a:r>
+            <a:r>
+              <a:rPr lang="en-US" dirty="0" smtClean="0"/>
+              <a:t> tot </a:t>
+            </a:r>
+            <a:r>
+              <a:rPr lang="en-US" dirty="0" err="1" smtClean="0"/>
+              <a:t>geen</a:t>
+            </a:r>
+            <a:r>
+              <a:rPr lang="en-US" dirty="0" smtClean="0"/>
+              <a:t> </a:t>
+            </a:r>
+            <a:r>
+              <a:rPr lang="en-US" dirty="0" err="1" smtClean="0"/>
+              <a:t>programmeer</a:t>
+            </a:r>
+            <a:r>
+              <a:rPr lang="en-US" dirty="0" err="1" smtClean="0"/>
+              <a:t>kennis</a:t>
+            </a:r>
+            <a:endParaRPr lang="en-US" dirty="0" smtClean="0"/>
+          </a:p>
+          <a:p>
+            <a:pPr marL="0" indent="0">
+              <a:buNone/>
+            </a:pPr>
+            <a:endParaRPr lang="en-US" dirty="0" smtClean="0"/>
+          </a:p>
+          <a:p>
+            <a:pPr marL="0" indent="0">
+              <a:buNone/>
+            </a:pPr>
+            <a:endParaRPr lang="en-US" dirty="0"/>
           </a:p>
         </p:txBody>
       </p:sp>
     </p:spTree>
     <p:extLst>
       <p:ext uri="{BB962C8B-B14F-4D97-AF65-F5344CB8AC3E}">
-        <p14:creationId xmlns:p14="http://schemas.microsoft.com/office/powerpoint/2010/main" val="174650717"/>
+        <p14:creationId xmlns:p14="http://schemas.microsoft.com/office/powerpoint/2010/main" val="239212845"/>
       </p:ext>
     </p:extLst>
   </p:cSld>
@@ -4346,29 +4549,6 @@
           <a:chExt cx="0" cy="0"/>
         </a:xfrm>
       </p:grpSpPr>
-      <p:sp>
-        <p:nvSpPr>
-          <p:cNvPr id="2" name="Title 1"/>
-          <p:cNvSpPr>
-            <a:spLocks noGrp="1"/>
-          </p:cNvSpPr>
-          <p:nvPr>
-            <p:ph type="title"/>
-          </p:nvPr>
-        </p:nvSpPr>
-        <p:spPr/>
-        <p:txBody>
-          <a:bodyPr/>
-          <a:lstStyle/>
-          <a:p>
-            <a:r>
-              <a:rPr lang="nl-BE" dirty="0" smtClean="0"/>
-              <a:t>Ons doel</a:t>
-            </a:r>
-            <a:endParaRPr lang="en-US" dirty="0"/>
-          </a:p>
-        </p:txBody>
-      </p:sp>
       <mc:AlternateContent xmlns:mc="http://schemas.openxmlformats.org/markup-compatibility/2006">
         <mc:Choice xmlns:a14="http://schemas.microsoft.com/office/drawing/2010/main" Requires="a14">
           <p:sp>
@@ -4383,7 +4563,7 @@
             </p:nvSpPr>
             <p:spPr>
               <a:xfrm>
-                <a:off x="1097280" y="1845734"/>
+                <a:off x="1136159" y="1755028"/>
                 <a:ext cx="10058400" cy="4023360"/>
               </a:xfrm>
             </p:spPr>
@@ -4450,7 +4630,7 @@
                   <a:t>					         Gevonden vergelijking: </a:t>
                 </a:r>
                 <a14:m>
-                  <m:oMath xmlns:m="http://schemas.openxmlformats.org/officeDocument/2006/math">
+                  <m:oMath xmlns:m="http://schemas.openxmlformats.org/officeDocument/2006/math" xmlns="">
                     <m:sSup>
                       <m:sSupPr>
                         <m:ctrlPr>
@@ -4526,13 +4706,13 @@
             </p:nvSpPr>
             <p:spPr>
               <a:xfrm>
-                <a:off x="1097280" y="1845734"/>
+                <a:off x="1136159" y="1755028"/>
                 <a:ext cx="10058400" cy="4023360"/>
               </a:xfrm>
-              <a:blipFill rotWithShape="0">
+              <a:blipFill rotWithShape="1">
                 <a:blip r:embed="rId2"/>
                 <a:stretch>
-                  <a:fillRect l="-1455" t="-1667"/>
+                  <a:fillRect l="-242"/>
                 </a:stretch>
               </a:blipFill>
             </p:spPr>
@@ -4551,1202 +4731,29 @@
           </p:sp>
         </mc:Fallback>
       </mc:AlternateContent>
-      <p:graphicFrame>
-        <p:nvGraphicFramePr>
-          <p:cNvPr id="6" name="Table 5"/>
-          <p:cNvGraphicFramePr>
-            <a:graphicFrameLocks noGrp="1"/>
-          </p:cNvGraphicFramePr>
-          <p:nvPr>
-            <p:extLst>
-              <p:ext uri="{D42A27DB-BD31-4B8C-83A1-F6EECF244321}">
-                <p14:modId xmlns:p14="http://schemas.microsoft.com/office/powerpoint/2010/main" val="4091522225"/>
-              </p:ext>
-            </p:extLst>
-          </p:nvPr>
-        </p:nvGraphicFramePr>
-        <p:xfrm>
-          <a:off x="1476842" y="3332301"/>
-          <a:ext cx="3016682" cy="1686822"/>
-        </p:xfrm>
-        <a:graphic>
-          <a:graphicData uri="http://schemas.openxmlformats.org/drawingml/2006/table">
-            <a:tbl>
-              <a:tblPr>
-                <a:tableStyleId>{5940675A-B579-460E-94D1-54222C63F5DA}</a:tableStyleId>
-              </a:tblPr>
-              <a:tblGrid>
-                <a:gridCol w="800004"/>
-                <a:gridCol w="800004"/>
-                <a:gridCol w="800004"/>
-                <a:gridCol w="616670"/>
-              </a:tblGrid>
-              <a:tr h="290832">
-                <a:tc>
-                  <a:txBody>
-                    <a:bodyPr/>
-                    <a:lstStyle/>
-                    <a:p>
-                      <a:pPr algn="ctr" fontAlgn="ctr"/>
-                      <a:r>
-                        <a:rPr lang="en-US" sz="1100" u="none" strike="noStrike" dirty="0">
-                          <a:effectLst/>
-                        </a:rPr>
-                        <a:t>X1</a:t>
-                      </a:r>
-                      <a:endParaRPr lang="en-US" sz="1100" b="1" i="0" u="none" strike="noStrike" dirty="0">
-                        <a:solidFill>
-                          <a:srgbClr val="000000"/>
-                        </a:solidFill>
-                        <a:effectLst/>
-                        <a:latin typeface="Calibri" panose="020F0502020204030204" pitchFamily="34" charset="0"/>
-                      </a:endParaRPr>
-                    </a:p>
-                  </a:txBody>
-                  <a:tcPr marL="7620" marR="7620" marT="7620" marB="0" anchor="ctr"/>
-                </a:tc>
-                <a:tc>
-                  <a:txBody>
-                    <a:bodyPr/>
-                    <a:lstStyle/>
-                    <a:p>
-                      <a:pPr algn="ctr" fontAlgn="ctr"/>
-                      <a:r>
-                        <a:rPr lang="en-US" sz="1100" u="none" strike="noStrike">
-                          <a:effectLst/>
-                        </a:rPr>
-                        <a:t>X2</a:t>
-                      </a:r>
-                      <a:endParaRPr lang="en-US" sz="1100" b="1" i="0" u="none" strike="noStrike">
-                        <a:solidFill>
-                          <a:srgbClr val="000000"/>
-                        </a:solidFill>
-                        <a:effectLst/>
-                        <a:latin typeface="Calibri" panose="020F0502020204030204" pitchFamily="34" charset="0"/>
-                      </a:endParaRPr>
-                    </a:p>
-                  </a:txBody>
-                  <a:tcPr marL="7620" marR="7620" marT="7620" marB="0" anchor="ctr"/>
-                </a:tc>
-                <a:tc>
-                  <a:txBody>
-                    <a:bodyPr/>
-                    <a:lstStyle/>
-                    <a:p>
-                      <a:pPr algn="ctr" fontAlgn="ctr"/>
-                      <a:r>
-                        <a:rPr lang="en-US" sz="1100" u="none" strike="noStrike" dirty="0">
-                          <a:effectLst/>
-                        </a:rPr>
-                        <a:t>X3</a:t>
-                      </a:r>
-                      <a:endParaRPr lang="en-US" sz="1100" b="1" i="0" u="none" strike="noStrike" dirty="0">
-                        <a:solidFill>
-                          <a:srgbClr val="000000"/>
-                        </a:solidFill>
-                        <a:effectLst/>
-                        <a:latin typeface="Calibri" panose="020F0502020204030204" pitchFamily="34" charset="0"/>
-                      </a:endParaRPr>
-                    </a:p>
-                  </a:txBody>
-                  <a:tcPr marL="7620" marR="7620" marT="7620" marB="0" anchor="ctr"/>
-                </a:tc>
-                <a:tc>
-                  <a:txBody>
-                    <a:bodyPr/>
-                    <a:lstStyle/>
-                    <a:p>
-                      <a:pPr algn="ctr" fontAlgn="ctr"/>
-                      <a:r>
-                        <a:rPr lang="en-US" sz="1100" u="none" strike="noStrike">
-                          <a:effectLst/>
-                        </a:rPr>
-                        <a:t>Y</a:t>
-                      </a:r>
-                      <a:endParaRPr lang="en-US" sz="1100" b="1" i="0" u="none" strike="noStrike">
-                        <a:solidFill>
-                          <a:srgbClr val="000000"/>
-                        </a:solidFill>
-                        <a:effectLst/>
-                        <a:latin typeface="Calibri" panose="020F0502020204030204" pitchFamily="34" charset="0"/>
-                      </a:endParaRPr>
-                    </a:p>
-                  </a:txBody>
-                  <a:tcPr marL="7620" marR="7620" marT="7620" marB="0" anchor="ctr"/>
-                </a:tc>
-              </a:tr>
-              <a:tr h="279198">
-                <a:tc>
-                  <a:txBody>
-                    <a:bodyPr/>
-                    <a:lstStyle/>
-                    <a:p>
-                      <a:pPr algn="r" fontAlgn="ctr"/>
-                      <a:r>
-                        <a:rPr lang="en-US" sz="1100" u="none" strike="noStrike">
-                          <a:effectLst/>
-                        </a:rPr>
-                        <a:t>1</a:t>
-                      </a:r>
-                      <a:endParaRPr lang="en-US" sz="1100" b="0" i="0" u="none" strike="noStrike">
-                        <a:solidFill>
-                          <a:srgbClr val="000000"/>
-                        </a:solidFill>
-                        <a:effectLst/>
-                        <a:latin typeface="Calibri" panose="020F0502020204030204" pitchFamily="34" charset="0"/>
-                      </a:endParaRPr>
-                    </a:p>
-                  </a:txBody>
-                  <a:tcPr marL="7620" marR="7620" marT="7620" marB="0" anchor="ctr"/>
-                </a:tc>
-                <a:tc>
-                  <a:txBody>
-                    <a:bodyPr/>
-                    <a:lstStyle/>
-                    <a:p>
-                      <a:pPr algn="r" fontAlgn="ctr"/>
-                      <a:r>
-                        <a:rPr lang="en-US" sz="1100" u="none" strike="noStrike" dirty="0">
-                          <a:effectLst/>
-                        </a:rPr>
-                        <a:t>2</a:t>
-                      </a:r>
-                      <a:endParaRPr lang="en-US" sz="1100" b="0" i="0" u="none" strike="noStrike" dirty="0">
-                        <a:solidFill>
-                          <a:srgbClr val="000000"/>
-                        </a:solidFill>
-                        <a:effectLst/>
-                        <a:latin typeface="Calibri" panose="020F0502020204030204" pitchFamily="34" charset="0"/>
-                      </a:endParaRPr>
-                    </a:p>
-                  </a:txBody>
-                  <a:tcPr marL="7620" marR="7620" marT="7620" marB="0" anchor="ctr"/>
-                </a:tc>
-                <a:tc>
-                  <a:txBody>
-                    <a:bodyPr/>
-                    <a:lstStyle/>
-                    <a:p>
-                      <a:pPr algn="r" fontAlgn="ctr"/>
-                      <a:r>
-                        <a:rPr lang="en-US" sz="1100" u="none" strike="noStrike">
-                          <a:effectLst/>
-                        </a:rPr>
-                        <a:t>2</a:t>
-                      </a:r>
-                      <a:endParaRPr lang="en-US" sz="1100" b="0" i="0" u="none" strike="noStrike">
-                        <a:solidFill>
-                          <a:srgbClr val="000000"/>
-                        </a:solidFill>
-                        <a:effectLst/>
-                        <a:latin typeface="Calibri" panose="020F0502020204030204" pitchFamily="34" charset="0"/>
-                      </a:endParaRPr>
-                    </a:p>
-                  </a:txBody>
-                  <a:tcPr marL="7620" marR="7620" marT="7620" marB="0" anchor="ctr"/>
-                </a:tc>
-                <a:tc>
-                  <a:txBody>
-                    <a:bodyPr/>
-                    <a:lstStyle/>
-                    <a:p>
-                      <a:pPr algn="r" fontAlgn="ctr"/>
-                      <a:r>
-                        <a:rPr lang="en-US" sz="1100" u="none" strike="noStrike">
-                          <a:effectLst/>
-                        </a:rPr>
-                        <a:t>9</a:t>
-                      </a:r>
-                      <a:endParaRPr lang="en-US" sz="1100" b="0" i="0" u="none" strike="noStrike">
-                        <a:solidFill>
-                          <a:srgbClr val="000000"/>
-                        </a:solidFill>
-                        <a:effectLst/>
-                        <a:latin typeface="Calibri" panose="020F0502020204030204" pitchFamily="34" charset="0"/>
-                      </a:endParaRPr>
-                    </a:p>
-                  </a:txBody>
-                  <a:tcPr marL="7620" marR="7620" marT="7620" marB="0" anchor="ctr"/>
-                </a:tc>
-              </a:tr>
-              <a:tr h="279198">
-                <a:tc>
-                  <a:txBody>
-                    <a:bodyPr/>
-                    <a:lstStyle/>
-                    <a:p>
-                      <a:pPr algn="r" fontAlgn="ctr"/>
-                      <a:r>
-                        <a:rPr lang="en-US" sz="1100" u="none" strike="noStrike">
-                          <a:effectLst/>
-                        </a:rPr>
-                        <a:t>4</a:t>
-                      </a:r>
-                      <a:endParaRPr lang="en-US" sz="1100" b="0" i="0" u="none" strike="noStrike">
-                        <a:solidFill>
-                          <a:srgbClr val="000000"/>
-                        </a:solidFill>
-                        <a:effectLst/>
-                        <a:latin typeface="Calibri" panose="020F0502020204030204" pitchFamily="34" charset="0"/>
-                      </a:endParaRPr>
-                    </a:p>
-                  </a:txBody>
-                  <a:tcPr marL="7620" marR="7620" marT="7620" marB="0" anchor="ctr"/>
-                </a:tc>
-                <a:tc>
-                  <a:txBody>
-                    <a:bodyPr/>
-                    <a:lstStyle/>
-                    <a:p>
-                      <a:pPr algn="r" fontAlgn="ctr"/>
-                      <a:r>
-                        <a:rPr lang="en-US" sz="1100" u="none" strike="noStrike">
-                          <a:effectLst/>
-                        </a:rPr>
-                        <a:t>3</a:t>
-                      </a:r>
-                      <a:endParaRPr lang="en-US" sz="1100" b="0" i="0" u="none" strike="noStrike">
-                        <a:solidFill>
-                          <a:srgbClr val="000000"/>
-                        </a:solidFill>
-                        <a:effectLst/>
-                        <a:latin typeface="Calibri" panose="020F0502020204030204" pitchFamily="34" charset="0"/>
-                      </a:endParaRPr>
-                    </a:p>
-                  </a:txBody>
-                  <a:tcPr marL="7620" marR="7620" marT="7620" marB="0" anchor="ctr"/>
-                </a:tc>
-                <a:tc>
-                  <a:txBody>
-                    <a:bodyPr/>
-                    <a:lstStyle/>
-                    <a:p>
-                      <a:pPr algn="r" fontAlgn="ctr"/>
-                      <a:r>
-                        <a:rPr lang="en-US" sz="1100" u="none" strike="noStrike">
-                          <a:effectLst/>
-                        </a:rPr>
-                        <a:t>3</a:t>
-                      </a:r>
-                      <a:endParaRPr lang="en-US" sz="1100" b="0" i="0" u="none" strike="noStrike">
-                        <a:solidFill>
-                          <a:srgbClr val="000000"/>
-                        </a:solidFill>
-                        <a:effectLst/>
-                        <a:latin typeface="Calibri" panose="020F0502020204030204" pitchFamily="34" charset="0"/>
-                      </a:endParaRPr>
-                    </a:p>
-                  </a:txBody>
-                  <a:tcPr marL="7620" marR="7620" marT="7620" marB="0" anchor="ctr"/>
-                </a:tc>
-                <a:tc>
-                  <a:txBody>
-                    <a:bodyPr/>
-                    <a:lstStyle/>
-                    <a:p>
-                      <a:pPr algn="l" fontAlgn="ctr"/>
-                      <a:r>
-                        <a:rPr lang="en-US" sz="1100" u="none" strike="noStrike">
-                          <a:effectLst/>
-                        </a:rPr>
-                        <a:t> </a:t>
-                      </a:r>
-                      <a:endParaRPr lang="en-US" sz="1100" b="0" i="0" u="none" strike="noStrike">
-                        <a:solidFill>
-                          <a:srgbClr val="000000"/>
-                        </a:solidFill>
-                        <a:effectLst/>
-                        <a:latin typeface="Calibri" panose="020F0502020204030204" pitchFamily="34" charset="0"/>
-                      </a:endParaRPr>
-                    </a:p>
-                  </a:txBody>
-                  <a:tcPr marL="7620" marR="7620" marT="7620" marB="0" anchor="ctr"/>
-                </a:tc>
-              </a:tr>
-              <a:tr h="279198">
-                <a:tc>
-                  <a:txBody>
-                    <a:bodyPr/>
-                    <a:lstStyle/>
-                    <a:p>
-                      <a:pPr algn="r" fontAlgn="ctr"/>
-                      <a:r>
-                        <a:rPr lang="en-US" sz="1100" u="none" strike="noStrike">
-                          <a:effectLst/>
-                        </a:rPr>
-                        <a:t>1</a:t>
-                      </a:r>
-                      <a:endParaRPr lang="en-US" sz="1100" b="0" i="0" u="none" strike="noStrike">
-                        <a:solidFill>
-                          <a:srgbClr val="000000"/>
-                        </a:solidFill>
-                        <a:effectLst/>
-                        <a:latin typeface="Calibri" panose="020F0502020204030204" pitchFamily="34" charset="0"/>
-                      </a:endParaRPr>
-                    </a:p>
-                  </a:txBody>
-                  <a:tcPr marL="7620" marR="7620" marT="7620" marB="0" anchor="ctr"/>
-                </a:tc>
-                <a:tc>
-                  <a:txBody>
-                    <a:bodyPr/>
-                    <a:lstStyle/>
-                    <a:p>
-                      <a:pPr algn="r" fontAlgn="ctr"/>
-                      <a:r>
-                        <a:rPr lang="en-US" sz="1100" u="none" strike="noStrike">
-                          <a:effectLst/>
-                        </a:rPr>
-                        <a:t>8</a:t>
-                      </a:r>
-                      <a:endParaRPr lang="en-US" sz="1100" b="0" i="0" u="none" strike="noStrike">
-                        <a:solidFill>
-                          <a:srgbClr val="000000"/>
-                        </a:solidFill>
-                        <a:effectLst/>
-                        <a:latin typeface="Calibri" panose="020F0502020204030204" pitchFamily="34" charset="0"/>
-                      </a:endParaRPr>
-                    </a:p>
-                  </a:txBody>
-                  <a:tcPr marL="7620" marR="7620" marT="7620" marB="0" anchor="ctr"/>
-                </a:tc>
-                <a:tc>
-                  <a:txBody>
-                    <a:bodyPr/>
-                    <a:lstStyle/>
-                    <a:p>
-                      <a:pPr algn="r" fontAlgn="ctr"/>
-                      <a:r>
-                        <a:rPr lang="en-US" sz="1100" u="none" strike="noStrike">
-                          <a:effectLst/>
-                        </a:rPr>
-                        <a:t>2</a:t>
-                      </a:r>
-                      <a:endParaRPr lang="en-US" sz="1100" b="0" i="0" u="none" strike="noStrike">
-                        <a:solidFill>
-                          <a:srgbClr val="000000"/>
-                        </a:solidFill>
-                        <a:effectLst/>
-                        <a:latin typeface="Calibri" panose="020F0502020204030204" pitchFamily="34" charset="0"/>
-                      </a:endParaRPr>
-                    </a:p>
-                  </a:txBody>
-                  <a:tcPr marL="7620" marR="7620" marT="7620" marB="0" anchor="ctr"/>
-                </a:tc>
-                <a:tc>
-                  <a:txBody>
-                    <a:bodyPr/>
-                    <a:lstStyle/>
-                    <a:p>
-                      <a:pPr algn="l" fontAlgn="ctr"/>
-                      <a:r>
-                        <a:rPr lang="en-US" sz="1100" u="none" strike="noStrike">
-                          <a:effectLst/>
-                        </a:rPr>
-                        <a:t> </a:t>
-                      </a:r>
-                      <a:endParaRPr lang="en-US" sz="1100" b="0" i="0" u="none" strike="noStrike">
-                        <a:solidFill>
-                          <a:srgbClr val="000000"/>
-                        </a:solidFill>
-                        <a:effectLst/>
-                        <a:latin typeface="Calibri" panose="020F0502020204030204" pitchFamily="34" charset="0"/>
-                      </a:endParaRPr>
-                    </a:p>
-                  </a:txBody>
-                  <a:tcPr marL="7620" marR="7620" marT="7620" marB="0" anchor="ctr"/>
-                </a:tc>
-              </a:tr>
-              <a:tr h="279198">
-                <a:tc>
-                  <a:txBody>
-                    <a:bodyPr/>
-                    <a:lstStyle/>
-                    <a:p>
-                      <a:pPr algn="r" fontAlgn="ctr"/>
-                      <a:r>
-                        <a:rPr lang="en-US" sz="1100" u="none" strike="noStrike">
-                          <a:effectLst/>
-                        </a:rPr>
-                        <a:t>8</a:t>
-                      </a:r>
-                      <a:endParaRPr lang="en-US" sz="1100" b="0" i="0" u="none" strike="noStrike">
-                        <a:solidFill>
-                          <a:srgbClr val="000000"/>
-                        </a:solidFill>
-                        <a:effectLst/>
-                        <a:latin typeface="Calibri" panose="020F0502020204030204" pitchFamily="34" charset="0"/>
-                      </a:endParaRPr>
-                    </a:p>
-                  </a:txBody>
-                  <a:tcPr marL="7620" marR="7620" marT="7620" marB="0" anchor="ctr"/>
-                </a:tc>
-                <a:tc>
-                  <a:txBody>
-                    <a:bodyPr/>
-                    <a:lstStyle/>
-                    <a:p>
-                      <a:pPr algn="r" fontAlgn="ctr"/>
-                      <a:r>
-                        <a:rPr lang="en-US" sz="1100" u="none" strike="noStrike">
-                          <a:effectLst/>
-                        </a:rPr>
-                        <a:t>9</a:t>
-                      </a:r>
-                      <a:endParaRPr lang="en-US" sz="1100" b="0" i="0" u="none" strike="noStrike">
-                        <a:solidFill>
-                          <a:srgbClr val="000000"/>
-                        </a:solidFill>
-                        <a:effectLst/>
-                        <a:latin typeface="Calibri" panose="020F0502020204030204" pitchFamily="34" charset="0"/>
-                      </a:endParaRPr>
-                    </a:p>
-                  </a:txBody>
-                  <a:tcPr marL="7620" marR="7620" marT="7620" marB="0" anchor="ctr"/>
-                </a:tc>
-                <a:tc>
-                  <a:txBody>
-                    <a:bodyPr/>
-                    <a:lstStyle/>
-                    <a:p>
-                      <a:pPr algn="r" fontAlgn="ctr"/>
-                      <a:r>
-                        <a:rPr lang="en-US" sz="1100" u="none" strike="noStrike">
-                          <a:effectLst/>
-                        </a:rPr>
-                        <a:t>2</a:t>
-                      </a:r>
-                      <a:endParaRPr lang="en-US" sz="1100" b="0" i="0" u="none" strike="noStrike">
-                        <a:solidFill>
-                          <a:srgbClr val="000000"/>
-                        </a:solidFill>
-                        <a:effectLst/>
-                        <a:latin typeface="Calibri" panose="020F0502020204030204" pitchFamily="34" charset="0"/>
-                      </a:endParaRPr>
-                    </a:p>
-                  </a:txBody>
-                  <a:tcPr marL="7620" marR="7620" marT="7620" marB="0" anchor="ctr"/>
-                </a:tc>
-                <a:tc>
-                  <a:txBody>
-                    <a:bodyPr/>
-                    <a:lstStyle/>
-                    <a:p>
-                      <a:pPr algn="l" fontAlgn="ctr"/>
-                      <a:r>
-                        <a:rPr lang="en-US" sz="1100" u="none" strike="noStrike">
-                          <a:effectLst/>
-                        </a:rPr>
-                        <a:t> </a:t>
-                      </a:r>
-                      <a:endParaRPr lang="en-US" sz="1100" b="0" i="0" u="none" strike="noStrike">
-                        <a:solidFill>
-                          <a:srgbClr val="000000"/>
-                        </a:solidFill>
-                        <a:effectLst/>
-                        <a:latin typeface="Calibri" panose="020F0502020204030204" pitchFamily="34" charset="0"/>
-                      </a:endParaRPr>
-                    </a:p>
-                  </a:txBody>
-                  <a:tcPr marL="7620" marR="7620" marT="7620" marB="0" anchor="ctr"/>
-                </a:tc>
-              </a:tr>
-              <a:tr h="279198">
-                <a:tc>
-                  <a:txBody>
-                    <a:bodyPr/>
-                    <a:lstStyle/>
-                    <a:p>
-                      <a:pPr algn="r" fontAlgn="ctr"/>
-                      <a:r>
-                        <a:rPr lang="en-US" sz="1100" u="none" strike="noStrike">
-                          <a:effectLst/>
-                        </a:rPr>
-                        <a:t>2</a:t>
-                      </a:r>
-                      <a:endParaRPr lang="en-US" sz="1100" b="0" i="0" u="none" strike="noStrike">
-                        <a:solidFill>
-                          <a:srgbClr val="000000"/>
-                        </a:solidFill>
-                        <a:effectLst/>
-                        <a:latin typeface="Calibri" panose="020F0502020204030204" pitchFamily="34" charset="0"/>
-                      </a:endParaRPr>
-                    </a:p>
-                  </a:txBody>
-                  <a:tcPr marL="7620" marR="7620" marT="7620" marB="0" anchor="ctr"/>
-                </a:tc>
-                <a:tc>
-                  <a:txBody>
-                    <a:bodyPr/>
-                    <a:lstStyle/>
-                    <a:p>
-                      <a:pPr algn="r" fontAlgn="ctr"/>
-                      <a:r>
-                        <a:rPr lang="en-US" sz="1100" u="none" strike="noStrike">
-                          <a:effectLst/>
-                        </a:rPr>
-                        <a:t>2</a:t>
-                      </a:r>
-                      <a:endParaRPr lang="en-US" sz="1100" b="0" i="0" u="none" strike="noStrike">
-                        <a:solidFill>
-                          <a:srgbClr val="000000"/>
-                        </a:solidFill>
-                        <a:effectLst/>
-                        <a:latin typeface="Calibri" panose="020F0502020204030204" pitchFamily="34" charset="0"/>
-                      </a:endParaRPr>
-                    </a:p>
-                  </a:txBody>
-                  <a:tcPr marL="7620" marR="7620" marT="7620" marB="0" anchor="ctr"/>
-                </a:tc>
-                <a:tc>
-                  <a:txBody>
-                    <a:bodyPr/>
-                    <a:lstStyle/>
-                    <a:p>
-                      <a:pPr algn="r" fontAlgn="ctr"/>
-                      <a:r>
-                        <a:rPr lang="en-US" sz="1100" u="none" strike="noStrike">
-                          <a:effectLst/>
-                        </a:rPr>
-                        <a:t>2</a:t>
-                      </a:r>
-                      <a:endParaRPr lang="en-US" sz="1100" b="0" i="0" u="none" strike="noStrike">
-                        <a:solidFill>
-                          <a:srgbClr val="000000"/>
-                        </a:solidFill>
-                        <a:effectLst/>
-                        <a:latin typeface="Calibri" panose="020F0502020204030204" pitchFamily="34" charset="0"/>
-                      </a:endParaRPr>
-                    </a:p>
-                  </a:txBody>
-                  <a:tcPr marL="7620" marR="7620" marT="7620" marB="0" anchor="ctr"/>
-                </a:tc>
-                <a:tc>
-                  <a:txBody>
-                    <a:bodyPr/>
-                    <a:lstStyle/>
-                    <a:p>
-                      <a:pPr algn="l" fontAlgn="ctr"/>
-                      <a:r>
-                        <a:rPr lang="en-US" sz="1100" u="none" strike="noStrike" dirty="0">
-                          <a:effectLst/>
-                        </a:rPr>
-                        <a:t> </a:t>
-                      </a:r>
-                      <a:endParaRPr lang="en-US" sz="1100" b="0" i="0" u="none" strike="noStrike" dirty="0">
-                        <a:solidFill>
-                          <a:srgbClr val="000000"/>
-                        </a:solidFill>
-                        <a:effectLst/>
-                        <a:latin typeface="Calibri" panose="020F0502020204030204" pitchFamily="34" charset="0"/>
-                      </a:endParaRPr>
-                    </a:p>
-                  </a:txBody>
-                  <a:tcPr marL="7620" marR="7620" marT="7620" marB="0" anchor="ctr"/>
-                </a:tc>
-              </a:tr>
-            </a:tbl>
-          </a:graphicData>
-        </a:graphic>
-      </p:graphicFrame>
-      <p:graphicFrame>
-        <p:nvGraphicFramePr>
-          <p:cNvPr id="7" name="Table 6"/>
-          <p:cNvGraphicFramePr>
-            <a:graphicFrameLocks noGrp="1"/>
-          </p:cNvGraphicFramePr>
-          <p:nvPr>
-            <p:extLst>
-              <p:ext uri="{D42A27DB-BD31-4B8C-83A1-F6EECF244321}">
-                <p14:modId xmlns:p14="http://schemas.microsoft.com/office/powerpoint/2010/main" val="1757144472"/>
-              </p:ext>
-            </p:extLst>
-          </p:nvPr>
-        </p:nvGraphicFramePr>
-        <p:xfrm>
-          <a:off x="6126480" y="3340924"/>
-          <a:ext cx="2868884" cy="1678199"/>
-        </p:xfrm>
-        <a:graphic>
-          <a:graphicData uri="http://schemas.openxmlformats.org/drawingml/2006/table">
-            <a:tbl>
-              <a:tblPr>
-                <a:tableStyleId>{5C22544A-7EE6-4342-B048-85BDC9FD1C3A}</a:tableStyleId>
-              </a:tblPr>
-              <a:tblGrid>
-                <a:gridCol w="760809"/>
-                <a:gridCol w="760809"/>
-                <a:gridCol w="760809"/>
-                <a:gridCol w="586457"/>
-              </a:tblGrid>
-              <a:tr h="289344">
-                <a:tc>
-                  <a:txBody>
-                    <a:bodyPr/>
-                    <a:lstStyle/>
-                    <a:p>
-                      <a:pPr algn="ctr" fontAlgn="ctr"/>
-                      <a:r>
-                        <a:rPr lang="en-US" sz="1100" u="none" strike="noStrike" dirty="0">
-                          <a:effectLst/>
-                        </a:rPr>
-                        <a:t>X1</a:t>
-                      </a:r>
-                      <a:endParaRPr lang="en-US" sz="1100" b="1" i="0" u="none" strike="noStrike" dirty="0">
-                        <a:solidFill>
-                          <a:srgbClr val="000000"/>
-                        </a:solidFill>
-                        <a:effectLst/>
-                        <a:latin typeface="Calibri" panose="020F0502020204030204" pitchFamily="34" charset="0"/>
-                      </a:endParaRPr>
-                    </a:p>
-                  </a:txBody>
-                  <a:tcPr marL="7620" marR="7620" marT="7620" marB="0" anchor="ctr"/>
-                </a:tc>
-                <a:tc>
-                  <a:txBody>
-                    <a:bodyPr/>
-                    <a:lstStyle/>
-                    <a:p>
-                      <a:pPr algn="ctr" fontAlgn="ctr"/>
-                      <a:r>
-                        <a:rPr lang="en-US" sz="1100" u="none" strike="noStrike">
-                          <a:effectLst/>
-                        </a:rPr>
-                        <a:t>X2</a:t>
-                      </a:r>
-                      <a:endParaRPr lang="en-US" sz="1100" b="1" i="0" u="none" strike="noStrike">
-                        <a:solidFill>
-                          <a:srgbClr val="000000"/>
-                        </a:solidFill>
-                        <a:effectLst/>
-                        <a:latin typeface="Calibri" panose="020F0502020204030204" pitchFamily="34" charset="0"/>
-                      </a:endParaRPr>
-                    </a:p>
-                  </a:txBody>
-                  <a:tcPr marL="7620" marR="7620" marT="7620" marB="0" anchor="ctr"/>
-                </a:tc>
-                <a:tc>
-                  <a:txBody>
-                    <a:bodyPr/>
-                    <a:lstStyle/>
-                    <a:p>
-                      <a:pPr algn="ctr" fontAlgn="ctr"/>
-                      <a:r>
-                        <a:rPr lang="en-US" sz="1100" u="none" strike="noStrike" dirty="0">
-                          <a:effectLst/>
-                        </a:rPr>
-                        <a:t>X3</a:t>
-                      </a:r>
-                      <a:endParaRPr lang="en-US" sz="1100" b="1" i="0" u="none" strike="noStrike" dirty="0">
-                        <a:solidFill>
-                          <a:srgbClr val="000000"/>
-                        </a:solidFill>
-                        <a:effectLst/>
-                        <a:latin typeface="Calibri" panose="020F0502020204030204" pitchFamily="34" charset="0"/>
-                      </a:endParaRPr>
-                    </a:p>
-                  </a:txBody>
-                  <a:tcPr marL="7620" marR="7620" marT="7620" marB="0" anchor="ctr"/>
-                </a:tc>
-                <a:tc>
-                  <a:txBody>
-                    <a:bodyPr/>
-                    <a:lstStyle/>
-                    <a:p>
-                      <a:pPr algn="ctr" fontAlgn="ctr"/>
-                      <a:r>
-                        <a:rPr lang="en-US" sz="1100" u="none" strike="noStrike">
-                          <a:effectLst/>
-                        </a:rPr>
-                        <a:t>Y</a:t>
-                      </a:r>
-                      <a:endParaRPr lang="en-US" sz="1100" b="1" i="0" u="none" strike="noStrike">
-                        <a:solidFill>
-                          <a:srgbClr val="000000"/>
-                        </a:solidFill>
-                        <a:effectLst/>
-                        <a:latin typeface="Calibri" panose="020F0502020204030204" pitchFamily="34" charset="0"/>
-                      </a:endParaRPr>
-                    </a:p>
-                  </a:txBody>
-                  <a:tcPr marL="7620" marR="7620" marT="7620" marB="0" anchor="ctr"/>
-                </a:tc>
-              </a:tr>
-              <a:tr h="277771">
-                <a:tc>
-                  <a:txBody>
-                    <a:bodyPr/>
-                    <a:lstStyle/>
-                    <a:p>
-                      <a:pPr algn="r" fontAlgn="ctr"/>
-                      <a:r>
-                        <a:rPr lang="en-US" sz="1100" u="none" strike="noStrike">
-                          <a:effectLst/>
-                        </a:rPr>
-                        <a:t>1</a:t>
-                      </a:r>
-                      <a:endParaRPr lang="en-US" sz="1100" b="0" i="0" u="none" strike="noStrike">
-                        <a:solidFill>
-                          <a:srgbClr val="000000"/>
-                        </a:solidFill>
-                        <a:effectLst/>
-                        <a:latin typeface="Calibri" panose="020F0502020204030204" pitchFamily="34" charset="0"/>
-                      </a:endParaRPr>
-                    </a:p>
-                  </a:txBody>
-                  <a:tcPr marL="7620" marR="7620" marT="7620" marB="0" anchor="ctr"/>
-                </a:tc>
-                <a:tc>
-                  <a:txBody>
-                    <a:bodyPr/>
-                    <a:lstStyle/>
-                    <a:p>
-                      <a:pPr algn="r" fontAlgn="ctr"/>
-                      <a:r>
-                        <a:rPr lang="en-US" sz="1100" u="none" strike="noStrike">
-                          <a:effectLst/>
-                        </a:rPr>
-                        <a:t>2</a:t>
-                      </a:r>
-                      <a:endParaRPr lang="en-US" sz="1100" b="0" i="0" u="none" strike="noStrike">
-                        <a:solidFill>
-                          <a:srgbClr val="000000"/>
-                        </a:solidFill>
-                        <a:effectLst/>
-                        <a:latin typeface="Calibri" panose="020F0502020204030204" pitchFamily="34" charset="0"/>
-                      </a:endParaRPr>
-                    </a:p>
-                  </a:txBody>
-                  <a:tcPr marL="7620" marR="7620" marT="7620" marB="0" anchor="ctr"/>
-                </a:tc>
-                <a:tc>
-                  <a:txBody>
-                    <a:bodyPr/>
-                    <a:lstStyle/>
-                    <a:p>
-                      <a:pPr algn="r" fontAlgn="ctr"/>
-                      <a:r>
-                        <a:rPr lang="en-US" sz="1100" u="none" strike="noStrike">
-                          <a:effectLst/>
-                        </a:rPr>
-                        <a:t>2</a:t>
-                      </a:r>
-                      <a:endParaRPr lang="en-US" sz="1100" b="0" i="0" u="none" strike="noStrike">
-                        <a:solidFill>
-                          <a:srgbClr val="000000"/>
-                        </a:solidFill>
-                        <a:effectLst/>
-                        <a:latin typeface="Calibri" panose="020F0502020204030204" pitchFamily="34" charset="0"/>
-                      </a:endParaRPr>
-                    </a:p>
-                  </a:txBody>
-                  <a:tcPr marL="7620" marR="7620" marT="7620" marB="0" anchor="ctr"/>
-                </a:tc>
-                <a:tc>
-                  <a:txBody>
-                    <a:bodyPr/>
-                    <a:lstStyle/>
-                    <a:p>
-                      <a:pPr algn="r" fontAlgn="ctr"/>
-                      <a:r>
-                        <a:rPr lang="en-US" sz="1100" u="none" strike="noStrike">
-                          <a:effectLst/>
-                        </a:rPr>
-                        <a:t>9</a:t>
-                      </a:r>
-                      <a:endParaRPr lang="en-US" sz="1100" b="0" i="0" u="none" strike="noStrike">
-                        <a:solidFill>
-                          <a:srgbClr val="000000"/>
-                        </a:solidFill>
-                        <a:effectLst/>
-                        <a:latin typeface="Calibri" panose="020F0502020204030204" pitchFamily="34" charset="0"/>
-                      </a:endParaRPr>
-                    </a:p>
-                  </a:txBody>
-                  <a:tcPr marL="7620" marR="7620" marT="7620" marB="0" anchor="ctr"/>
-                </a:tc>
-              </a:tr>
-              <a:tr h="277771">
-                <a:tc>
-                  <a:txBody>
-                    <a:bodyPr/>
-                    <a:lstStyle/>
-                    <a:p>
-                      <a:pPr algn="r" fontAlgn="ctr"/>
-                      <a:r>
-                        <a:rPr lang="en-US" sz="1100" u="none" strike="noStrike">
-                          <a:effectLst/>
-                        </a:rPr>
-                        <a:t>4</a:t>
-                      </a:r>
-                      <a:endParaRPr lang="en-US" sz="1100" b="0" i="0" u="none" strike="noStrike">
-                        <a:solidFill>
-                          <a:srgbClr val="000000"/>
-                        </a:solidFill>
-                        <a:effectLst/>
-                        <a:latin typeface="Calibri" panose="020F0502020204030204" pitchFamily="34" charset="0"/>
-                      </a:endParaRPr>
-                    </a:p>
-                  </a:txBody>
-                  <a:tcPr marL="7620" marR="7620" marT="7620" marB="0" anchor="ctr"/>
-                </a:tc>
-                <a:tc>
-                  <a:txBody>
-                    <a:bodyPr/>
-                    <a:lstStyle/>
-                    <a:p>
-                      <a:pPr algn="r" fontAlgn="ctr"/>
-                      <a:r>
-                        <a:rPr lang="en-US" sz="1100" u="none" strike="noStrike">
-                          <a:effectLst/>
-                        </a:rPr>
-                        <a:t>3</a:t>
-                      </a:r>
-                      <a:endParaRPr lang="en-US" sz="1100" b="0" i="0" u="none" strike="noStrike">
-                        <a:solidFill>
-                          <a:srgbClr val="000000"/>
-                        </a:solidFill>
-                        <a:effectLst/>
-                        <a:latin typeface="Calibri" panose="020F0502020204030204" pitchFamily="34" charset="0"/>
-                      </a:endParaRPr>
-                    </a:p>
-                  </a:txBody>
-                  <a:tcPr marL="7620" marR="7620" marT="7620" marB="0" anchor="ctr"/>
-                </a:tc>
-                <a:tc>
-                  <a:txBody>
-                    <a:bodyPr/>
-                    <a:lstStyle/>
-                    <a:p>
-                      <a:pPr algn="r" fontAlgn="ctr"/>
-                      <a:r>
-                        <a:rPr lang="en-US" sz="1100" u="none" strike="noStrike">
-                          <a:effectLst/>
-                        </a:rPr>
-                        <a:t>3</a:t>
-                      </a:r>
-                      <a:endParaRPr lang="en-US" sz="1100" b="0" i="0" u="none" strike="noStrike">
-                        <a:solidFill>
-                          <a:srgbClr val="000000"/>
-                        </a:solidFill>
-                        <a:effectLst/>
-                        <a:latin typeface="Calibri" panose="020F0502020204030204" pitchFamily="34" charset="0"/>
-                      </a:endParaRPr>
-                    </a:p>
-                  </a:txBody>
-                  <a:tcPr marL="7620" marR="7620" marT="7620" marB="0" anchor="ctr"/>
-                </a:tc>
-                <a:tc>
-                  <a:txBody>
-                    <a:bodyPr/>
-                    <a:lstStyle/>
-                    <a:p>
-                      <a:pPr algn="r" fontAlgn="ctr"/>
-                      <a:r>
-                        <a:rPr lang="en-US" sz="1100" u="none" strike="noStrike">
-                          <a:effectLst/>
-                        </a:rPr>
-                        <a:t>343</a:t>
-                      </a:r>
-                      <a:endParaRPr lang="en-US" sz="1100" b="0" i="0" u="none" strike="noStrike">
-                        <a:solidFill>
-                          <a:srgbClr val="000000"/>
-                        </a:solidFill>
-                        <a:effectLst/>
-                        <a:latin typeface="Calibri" panose="020F0502020204030204" pitchFamily="34" charset="0"/>
-                      </a:endParaRPr>
-                    </a:p>
-                  </a:txBody>
-                  <a:tcPr marL="7620" marR="7620" marT="7620" marB="0" anchor="ctr"/>
-                </a:tc>
-              </a:tr>
-              <a:tr h="277771">
-                <a:tc>
-                  <a:txBody>
-                    <a:bodyPr/>
-                    <a:lstStyle/>
-                    <a:p>
-                      <a:pPr algn="r" fontAlgn="ctr"/>
-                      <a:r>
-                        <a:rPr lang="en-US" sz="1100" u="none" strike="noStrike">
-                          <a:effectLst/>
-                        </a:rPr>
-                        <a:t>1</a:t>
-                      </a:r>
-                      <a:endParaRPr lang="en-US" sz="1100" b="0" i="0" u="none" strike="noStrike">
-                        <a:solidFill>
-                          <a:srgbClr val="000000"/>
-                        </a:solidFill>
-                        <a:effectLst/>
-                        <a:latin typeface="Calibri" panose="020F0502020204030204" pitchFamily="34" charset="0"/>
-                      </a:endParaRPr>
-                    </a:p>
-                  </a:txBody>
-                  <a:tcPr marL="7620" marR="7620" marT="7620" marB="0" anchor="ctr"/>
-                </a:tc>
-                <a:tc>
-                  <a:txBody>
-                    <a:bodyPr/>
-                    <a:lstStyle/>
-                    <a:p>
-                      <a:pPr algn="r" fontAlgn="ctr"/>
-                      <a:r>
-                        <a:rPr lang="en-US" sz="1100" u="none" strike="noStrike">
-                          <a:effectLst/>
-                        </a:rPr>
-                        <a:t>8</a:t>
-                      </a:r>
-                      <a:endParaRPr lang="en-US" sz="1100" b="0" i="0" u="none" strike="noStrike">
-                        <a:solidFill>
-                          <a:srgbClr val="000000"/>
-                        </a:solidFill>
-                        <a:effectLst/>
-                        <a:latin typeface="Calibri" panose="020F0502020204030204" pitchFamily="34" charset="0"/>
-                      </a:endParaRPr>
-                    </a:p>
-                  </a:txBody>
-                  <a:tcPr marL="7620" marR="7620" marT="7620" marB="0" anchor="ctr"/>
-                </a:tc>
-                <a:tc>
-                  <a:txBody>
-                    <a:bodyPr/>
-                    <a:lstStyle/>
-                    <a:p>
-                      <a:pPr algn="r" fontAlgn="ctr"/>
-                      <a:r>
-                        <a:rPr lang="en-US" sz="1100" u="none" strike="noStrike">
-                          <a:effectLst/>
-                        </a:rPr>
-                        <a:t>2</a:t>
-                      </a:r>
-                      <a:endParaRPr lang="en-US" sz="1100" b="0" i="0" u="none" strike="noStrike">
-                        <a:solidFill>
-                          <a:srgbClr val="000000"/>
-                        </a:solidFill>
-                        <a:effectLst/>
-                        <a:latin typeface="Calibri" panose="020F0502020204030204" pitchFamily="34" charset="0"/>
-                      </a:endParaRPr>
-                    </a:p>
-                  </a:txBody>
-                  <a:tcPr marL="7620" marR="7620" marT="7620" marB="0" anchor="ctr"/>
-                </a:tc>
-                <a:tc>
-                  <a:txBody>
-                    <a:bodyPr/>
-                    <a:lstStyle/>
-                    <a:p>
-                      <a:pPr algn="r" fontAlgn="ctr"/>
-                      <a:r>
-                        <a:rPr lang="en-US" sz="1100" u="none" strike="noStrike">
-                          <a:effectLst/>
-                        </a:rPr>
-                        <a:t>81</a:t>
-                      </a:r>
-                      <a:endParaRPr lang="en-US" sz="1100" b="0" i="0" u="none" strike="noStrike">
-                        <a:solidFill>
-                          <a:srgbClr val="000000"/>
-                        </a:solidFill>
-                        <a:effectLst/>
-                        <a:latin typeface="Calibri" panose="020F0502020204030204" pitchFamily="34" charset="0"/>
-                      </a:endParaRPr>
-                    </a:p>
-                  </a:txBody>
-                  <a:tcPr marL="7620" marR="7620" marT="7620" marB="0" anchor="ctr"/>
-                </a:tc>
-              </a:tr>
-              <a:tr h="277771">
-                <a:tc>
-                  <a:txBody>
-                    <a:bodyPr/>
-                    <a:lstStyle/>
-                    <a:p>
-                      <a:pPr algn="r" fontAlgn="ctr"/>
-                      <a:r>
-                        <a:rPr lang="en-US" sz="1100" u="none" strike="noStrike">
-                          <a:effectLst/>
-                        </a:rPr>
-                        <a:t>8</a:t>
-                      </a:r>
-                      <a:endParaRPr lang="en-US" sz="1100" b="0" i="0" u="none" strike="noStrike">
-                        <a:solidFill>
-                          <a:srgbClr val="000000"/>
-                        </a:solidFill>
-                        <a:effectLst/>
-                        <a:latin typeface="Calibri" panose="020F0502020204030204" pitchFamily="34" charset="0"/>
-                      </a:endParaRPr>
-                    </a:p>
-                  </a:txBody>
-                  <a:tcPr marL="7620" marR="7620" marT="7620" marB="0" anchor="ctr"/>
-                </a:tc>
-                <a:tc>
-                  <a:txBody>
-                    <a:bodyPr/>
-                    <a:lstStyle/>
-                    <a:p>
-                      <a:pPr algn="r" fontAlgn="ctr"/>
-                      <a:r>
-                        <a:rPr lang="en-US" sz="1100" u="none" strike="noStrike">
-                          <a:effectLst/>
-                        </a:rPr>
-                        <a:t>9</a:t>
-                      </a:r>
-                      <a:endParaRPr lang="en-US" sz="1100" b="0" i="0" u="none" strike="noStrike">
-                        <a:solidFill>
-                          <a:srgbClr val="000000"/>
-                        </a:solidFill>
-                        <a:effectLst/>
-                        <a:latin typeface="Calibri" panose="020F0502020204030204" pitchFamily="34" charset="0"/>
-                      </a:endParaRPr>
-                    </a:p>
-                  </a:txBody>
-                  <a:tcPr marL="7620" marR="7620" marT="7620" marB="0" anchor="ctr"/>
-                </a:tc>
-                <a:tc>
-                  <a:txBody>
-                    <a:bodyPr/>
-                    <a:lstStyle/>
-                    <a:p>
-                      <a:pPr algn="r" fontAlgn="ctr"/>
-                      <a:r>
-                        <a:rPr lang="en-US" sz="1100" u="none" strike="noStrike">
-                          <a:effectLst/>
-                        </a:rPr>
-                        <a:t>2</a:t>
-                      </a:r>
-                      <a:endParaRPr lang="en-US" sz="1100" b="0" i="0" u="none" strike="noStrike">
-                        <a:solidFill>
-                          <a:srgbClr val="000000"/>
-                        </a:solidFill>
-                        <a:effectLst/>
-                        <a:latin typeface="Calibri" panose="020F0502020204030204" pitchFamily="34" charset="0"/>
-                      </a:endParaRPr>
-                    </a:p>
-                  </a:txBody>
-                  <a:tcPr marL="7620" marR="7620" marT="7620" marB="0" anchor="ctr"/>
-                </a:tc>
-                <a:tc>
-                  <a:txBody>
-                    <a:bodyPr/>
-                    <a:lstStyle/>
-                    <a:p>
-                      <a:pPr algn="r" fontAlgn="ctr"/>
-                      <a:r>
-                        <a:rPr lang="en-US" sz="1100" u="none" strike="noStrike">
-                          <a:effectLst/>
-                        </a:rPr>
-                        <a:t>289</a:t>
-                      </a:r>
-                      <a:endParaRPr lang="en-US" sz="1100" b="0" i="0" u="none" strike="noStrike">
-                        <a:solidFill>
-                          <a:srgbClr val="000000"/>
-                        </a:solidFill>
-                        <a:effectLst/>
-                        <a:latin typeface="Calibri" panose="020F0502020204030204" pitchFamily="34" charset="0"/>
-                      </a:endParaRPr>
-                    </a:p>
-                  </a:txBody>
-                  <a:tcPr marL="7620" marR="7620" marT="7620" marB="0" anchor="ctr"/>
-                </a:tc>
-              </a:tr>
-              <a:tr h="277771">
-                <a:tc>
-                  <a:txBody>
-                    <a:bodyPr/>
-                    <a:lstStyle/>
-                    <a:p>
-                      <a:pPr algn="r" fontAlgn="ctr"/>
-                      <a:r>
-                        <a:rPr lang="en-US" sz="1100" u="none" strike="noStrike">
-                          <a:effectLst/>
-                        </a:rPr>
-                        <a:t>2</a:t>
-                      </a:r>
-                      <a:endParaRPr lang="en-US" sz="1100" b="0" i="0" u="none" strike="noStrike">
-                        <a:solidFill>
-                          <a:srgbClr val="000000"/>
-                        </a:solidFill>
-                        <a:effectLst/>
-                        <a:latin typeface="Calibri" panose="020F0502020204030204" pitchFamily="34" charset="0"/>
-                      </a:endParaRPr>
-                    </a:p>
-                  </a:txBody>
-                  <a:tcPr marL="7620" marR="7620" marT="7620" marB="0" anchor="ctr"/>
-                </a:tc>
-                <a:tc>
-                  <a:txBody>
-                    <a:bodyPr/>
-                    <a:lstStyle/>
-                    <a:p>
-                      <a:pPr algn="r" fontAlgn="ctr"/>
-                      <a:r>
-                        <a:rPr lang="en-US" sz="1100" u="none" strike="noStrike">
-                          <a:effectLst/>
-                        </a:rPr>
-                        <a:t>2</a:t>
-                      </a:r>
-                      <a:endParaRPr lang="en-US" sz="1100" b="0" i="0" u="none" strike="noStrike">
-                        <a:solidFill>
-                          <a:srgbClr val="000000"/>
-                        </a:solidFill>
-                        <a:effectLst/>
-                        <a:latin typeface="Calibri" panose="020F0502020204030204" pitchFamily="34" charset="0"/>
-                      </a:endParaRPr>
-                    </a:p>
-                  </a:txBody>
-                  <a:tcPr marL="7620" marR="7620" marT="7620" marB="0" anchor="ctr"/>
-                </a:tc>
-                <a:tc>
-                  <a:txBody>
-                    <a:bodyPr/>
-                    <a:lstStyle/>
-                    <a:p>
-                      <a:pPr algn="r" fontAlgn="ctr"/>
-                      <a:r>
-                        <a:rPr lang="en-US" sz="1100" u="none" strike="noStrike">
-                          <a:effectLst/>
-                        </a:rPr>
-                        <a:t>2</a:t>
-                      </a:r>
-                      <a:endParaRPr lang="en-US" sz="1100" b="0" i="0" u="none" strike="noStrike">
-                        <a:solidFill>
-                          <a:srgbClr val="000000"/>
-                        </a:solidFill>
-                        <a:effectLst/>
-                        <a:latin typeface="Calibri" panose="020F0502020204030204" pitchFamily="34" charset="0"/>
-                      </a:endParaRPr>
-                    </a:p>
-                  </a:txBody>
-                  <a:tcPr marL="7620" marR="7620" marT="7620" marB="0" anchor="ctr"/>
-                </a:tc>
-                <a:tc>
-                  <a:txBody>
-                    <a:bodyPr/>
-                    <a:lstStyle/>
-                    <a:p>
-                      <a:pPr algn="r" fontAlgn="ctr"/>
-                      <a:r>
-                        <a:rPr lang="en-US" sz="1100" u="none" strike="noStrike" dirty="0">
-                          <a:effectLst/>
-                        </a:rPr>
-                        <a:t>16</a:t>
-                      </a:r>
-                      <a:endParaRPr lang="en-US" sz="1100" b="0" i="0" u="none" strike="noStrike" dirty="0">
-                        <a:solidFill>
-                          <a:srgbClr val="000000"/>
-                        </a:solidFill>
-                        <a:effectLst/>
-                        <a:latin typeface="Calibri" panose="020F0502020204030204" pitchFamily="34" charset="0"/>
-                      </a:endParaRPr>
-                    </a:p>
-                  </a:txBody>
-                  <a:tcPr marL="7620" marR="7620" marT="7620" marB="0" anchor="ctr"/>
-                </a:tc>
-              </a:tr>
-            </a:tbl>
-          </a:graphicData>
-        </a:graphic>
-      </p:graphicFrame>
+      <p:sp>
+        <p:nvSpPr>
+          <p:cNvPr id="2" name="Title 1"/>
+          <p:cNvSpPr>
+            <a:spLocks noGrp="1"/>
+          </p:cNvSpPr>
+          <p:nvPr>
+            <p:ph type="title"/>
+          </p:nvPr>
+        </p:nvSpPr>
+        <p:spPr/>
+        <p:txBody>
+          <a:bodyPr/>
+          <a:lstStyle/>
+          <a:p>
+            <a:r>
+              <a:rPr lang="nl-BE" dirty="0" smtClean="0"/>
+              <a:t>Ons doel</a:t>
+            </a:r>
+            <a:endParaRPr lang="en-US" dirty="0"/>
+          </a:p>
+        </p:txBody>
+      </p:sp>
       <p:pic>
         <p:nvPicPr>
           <p:cNvPr id="8" name="Picture 7"/>
@@ -5769,7 +4776,7 @@
         </p:blipFill>
         <p:spPr>
           <a:xfrm>
-            <a:off x="5174829" y="3974414"/>
+            <a:off x="5265549" y="3961456"/>
             <a:ext cx="289585" cy="304826"/>
           </a:xfrm>
           <a:prstGeom prst="rect">
@@ -5785,7 +4792,7 @@
         </p:nvCxnSpPr>
         <p:spPr>
           <a:xfrm flipV="1">
-            <a:off x="4689894" y="3857414"/>
+            <a:off x="4780613" y="3857414"/>
             <a:ext cx="1259456" cy="8626"/>
           </a:xfrm>
           <a:prstGeom prst="straightConnector1">
@@ -5810,6 +4817,1194 @@
           </a:fontRef>
         </p:style>
       </p:cxnSp>
+      <p:graphicFrame>
+        <p:nvGraphicFramePr>
+          <p:cNvPr id="4" name="Table 3"/>
+          <p:cNvGraphicFramePr>
+            <a:graphicFrameLocks noGrp="1"/>
+          </p:cNvGraphicFramePr>
+          <p:nvPr>
+            <p:extLst>
+              <p:ext uri="{D42A27DB-BD31-4B8C-83A1-F6EECF244321}">
+                <p14:modId xmlns:p14="http://schemas.microsoft.com/office/powerpoint/2010/main" val="3188795779"/>
+              </p:ext>
+            </p:extLst>
+          </p:nvPr>
+        </p:nvGraphicFramePr>
+        <p:xfrm>
+          <a:off x="492472" y="3187659"/>
+          <a:ext cx="4276760" cy="2452302"/>
+        </p:xfrm>
+        <a:graphic>
+          <a:graphicData uri="http://schemas.openxmlformats.org/drawingml/2006/table">
+            <a:tbl>
+              <a:tblPr firstRow="1" bandRow="1">
+                <a:tableStyleId>{72833802-FEF1-4C79-8D5D-14CF1EAF98D9}</a:tableStyleId>
+              </a:tblPr>
+              <a:tblGrid>
+                <a:gridCol w="1069190"/>
+                <a:gridCol w="1069190"/>
+                <a:gridCol w="1069190"/>
+                <a:gridCol w="1069190"/>
+              </a:tblGrid>
+              <a:tr h="408717">
+                <a:tc>
+                  <a:txBody>
+                    <a:bodyPr/>
+                    <a:lstStyle/>
+                    <a:p>
+                      <a:pPr algn="ctr"/>
+                      <a:r>
+                        <a:rPr lang="en-US" dirty="0" smtClean="0"/>
+                        <a:t>X1</a:t>
+                      </a:r>
+                      <a:endParaRPr lang="en-US" dirty="0"/>
+                    </a:p>
+                  </a:txBody>
+                  <a:tcPr>
+                    <a:lnB w="38100" cap="flat" cmpd="sng" algn="ctr">
+                      <a:solidFill>
+                        <a:srgbClr val="000000"/>
+                      </a:solidFill>
+                      <a:prstDash val="solid"/>
+                      <a:round/>
+                      <a:headEnd type="none" w="med" len="med"/>
+                      <a:tailEnd type="none" w="med" len="med"/>
+                    </a:lnB>
+                  </a:tcPr>
+                </a:tc>
+                <a:tc>
+                  <a:txBody>
+                    <a:bodyPr/>
+                    <a:lstStyle/>
+                    <a:p>
+                      <a:pPr algn="ctr"/>
+                      <a:r>
+                        <a:rPr lang="en-US" dirty="0" smtClean="0"/>
+                        <a:t>X2</a:t>
+                      </a:r>
+                      <a:endParaRPr lang="en-US" dirty="0"/>
+                    </a:p>
+                  </a:txBody>
+                  <a:tcPr>
+                    <a:lnB w="38100" cap="flat" cmpd="sng" algn="ctr">
+                      <a:solidFill>
+                        <a:srgbClr val="000000"/>
+                      </a:solidFill>
+                      <a:prstDash val="solid"/>
+                      <a:round/>
+                      <a:headEnd type="none" w="med" len="med"/>
+                      <a:tailEnd type="none" w="med" len="med"/>
+                    </a:lnB>
+                  </a:tcPr>
+                </a:tc>
+                <a:tc>
+                  <a:txBody>
+                    <a:bodyPr/>
+                    <a:lstStyle/>
+                    <a:p>
+                      <a:pPr algn="ctr"/>
+                      <a:r>
+                        <a:rPr lang="en-US" dirty="0" smtClean="0"/>
+                        <a:t>X3</a:t>
+                      </a:r>
+                      <a:endParaRPr lang="en-US" dirty="0"/>
+                    </a:p>
+                  </a:txBody>
+                  <a:tcPr>
+                    <a:lnR w="38100" cap="flat" cmpd="sng" algn="ctr">
+                      <a:solidFill>
+                        <a:srgbClr val="000000"/>
+                      </a:solidFill>
+                      <a:prstDash val="solid"/>
+                      <a:round/>
+                      <a:headEnd type="none" w="med" len="med"/>
+                      <a:tailEnd type="none" w="med" len="med"/>
+                    </a:lnR>
+                    <a:lnB w="38100" cap="flat" cmpd="sng" algn="ctr">
+                      <a:solidFill>
+                        <a:srgbClr val="000000"/>
+                      </a:solidFill>
+                      <a:prstDash val="solid"/>
+                      <a:round/>
+                      <a:headEnd type="none" w="med" len="med"/>
+                      <a:tailEnd type="none" w="med" len="med"/>
+                    </a:lnB>
+                  </a:tcPr>
+                </a:tc>
+                <a:tc>
+                  <a:txBody>
+                    <a:bodyPr/>
+                    <a:lstStyle/>
+                    <a:p>
+                      <a:pPr algn="ctr"/>
+                      <a:r>
+                        <a:rPr lang="en-US" dirty="0" smtClean="0"/>
+                        <a:t>Y</a:t>
+                      </a:r>
+                      <a:endParaRPr lang="en-US" dirty="0"/>
+                    </a:p>
+                  </a:txBody>
+                  <a:tcPr>
+                    <a:lnL w="38100" cap="flat" cmpd="sng" algn="ctr">
+                      <a:solidFill>
+                        <a:srgbClr val="000000"/>
+                      </a:solidFill>
+                      <a:prstDash val="solid"/>
+                      <a:round/>
+                      <a:headEnd type="none" w="med" len="med"/>
+                      <a:tailEnd type="none" w="med" len="med"/>
+                    </a:lnL>
+                    <a:lnB w="38100" cap="flat" cmpd="sng" algn="ctr">
+                      <a:solidFill>
+                        <a:srgbClr val="000000"/>
+                      </a:solidFill>
+                      <a:prstDash val="solid"/>
+                      <a:round/>
+                      <a:headEnd type="none" w="med" len="med"/>
+                      <a:tailEnd type="none" w="med" len="med"/>
+                    </a:lnB>
+                  </a:tcPr>
+                </a:tc>
+              </a:tr>
+              <a:tr h="408717">
+                <a:tc>
+                  <a:txBody>
+                    <a:bodyPr/>
+                    <a:lstStyle/>
+                    <a:p>
+                      <a:pPr algn="ctr"/>
+                      <a:r>
+                        <a:rPr lang="en-US" dirty="0" smtClean="0"/>
+                        <a:t>1</a:t>
+                      </a:r>
+                      <a:endParaRPr lang="en-US" dirty="0"/>
+                    </a:p>
+                  </a:txBody>
+                  <a:tcPr>
+                    <a:lnT w="38100" cap="flat" cmpd="sng" algn="ctr">
+                      <a:solidFill>
+                        <a:srgbClr val="000000"/>
+                      </a:solidFill>
+                      <a:prstDash val="solid"/>
+                      <a:round/>
+                      <a:headEnd type="none" w="med" len="med"/>
+                      <a:tailEnd type="none" w="med" len="med"/>
+                    </a:lnT>
+                  </a:tcPr>
+                </a:tc>
+                <a:tc>
+                  <a:txBody>
+                    <a:bodyPr/>
+                    <a:lstStyle/>
+                    <a:p>
+                      <a:pPr algn="ctr"/>
+                      <a:r>
+                        <a:rPr lang="en-US" dirty="0" smtClean="0"/>
+                        <a:t>2</a:t>
+                      </a:r>
+                      <a:endParaRPr lang="en-US" dirty="0"/>
+                    </a:p>
+                  </a:txBody>
+                  <a:tcPr>
+                    <a:lnT w="38100" cap="flat" cmpd="sng" algn="ctr">
+                      <a:solidFill>
+                        <a:srgbClr val="000000"/>
+                      </a:solidFill>
+                      <a:prstDash val="solid"/>
+                      <a:round/>
+                      <a:headEnd type="none" w="med" len="med"/>
+                      <a:tailEnd type="none" w="med" len="med"/>
+                    </a:lnT>
+                  </a:tcPr>
+                </a:tc>
+                <a:tc>
+                  <a:txBody>
+                    <a:bodyPr/>
+                    <a:lstStyle/>
+                    <a:p>
+                      <a:pPr algn="ctr"/>
+                      <a:r>
+                        <a:rPr lang="en-US" dirty="0" smtClean="0"/>
+                        <a:t>2</a:t>
+                      </a:r>
+                      <a:endParaRPr lang="en-US" dirty="0"/>
+                    </a:p>
+                  </a:txBody>
+                  <a:tcPr>
+                    <a:lnR w="38100" cap="flat" cmpd="sng" algn="ctr">
+                      <a:solidFill>
+                        <a:srgbClr val="000000"/>
+                      </a:solidFill>
+                      <a:prstDash val="solid"/>
+                      <a:round/>
+                      <a:headEnd type="none" w="med" len="med"/>
+                      <a:tailEnd type="none" w="med" len="med"/>
+                    </a:lnR>
+                    <a:lnT w="38100" cap="flat" cmpd="sng" algn="ctr">
+                      <a:solidFill>
+                        <a:srgbClr val="000000"/>
+                      </a:solidFill>
+                      <a:prstDash val="solid"/>
+                      <a:round/>
+                      <a:headEnd type="none" w="med" len="med"/>
+                      <a:tailEnd type="none" w="med" len="med"/>
+                    </a:lnT>
+                  </a:tcPr>
+                </a:tc>
+                <a:tc>
+                  <a:txBody>
+                    <a:bodyPr/>
+                    <a:lstStyle/>
+                    <a:p>
+                      <a:pPr algn="ctr"/>
+                      <a:r>
+                        <a:rPr lang="en-US" dirty="0" smtClean="0"/>
+                        <a:t>9</a:t>
+                      </a:r>
+                      <a:endParaRPr lang="en-US" dirty="0"/>
+                    </a:p>
+                  </a:txBody>
+                  <a:tcPr>
+                    <a:lnL w="38100" cap="flat" cmpd="sng" algn="ctr">
+                      <a:solidFill>
+                        <a:srgbClr val="000000"/>
+                      </a:solidFill>
+                      <a:prstDash val="solid"/>
+                      <a:round/>
+                      <a:headEnd type="none" w="med" len="med"/>
+                      <a:tailEnd type="none" w="med" len="med"/>
+                    </a:lnL>
+                    <a:lnT w="38100" cap="flat" cmpd="sng" algn="ctr">
+                      <a:solidFill>
+                        <a:srgbClr val="000000"/>
+                      </a:solidFill>
+                      <a:prstDash val="solid"/>
+                      <a:round/>
+                      <a:headEnd type="none" w="med" len="med"/>
+                      <a:tailEnd type="none" w="med" len="med"/>
+                    </a:lnT>
+                  </a:tcPr>
+                </a:tc>
+              </a:tr>
+              <a:tr h="408717">
+                <a:tc>
+                  <a:txBody>
+                    <a:bodyPr/>
+                    <a:lstStyle/>
+                    <a:p>
+                      <a:pPr algn="ctr"/>
+                      <a:r>
+                        <a:rPr lang="en-US" dirty="0" smtClean="0"/>
+                        <a:t>4</a:t>
+                      </a:r>
+                      <a:endParaRPr lang="en-US" dirty="0"/>
+                    </a:p>
+                  </a:txBody>
+                  <a:tcPr/>
+                </a:tc>
+                <a:tc>
+                  <a:txBody>
+                    <a:bodyPr/>
+                    <a:lstStyle/>
+                    <a:p>
+                      <a:pPr algn="ctr"/>
+                      <a:r>
+                        <a:rPr lang="en-US" dirty="0" smtClean="0"/>
+                        <a:t>3</a:t>
+                      </a:r>
+                      <a:endParaRPr lang="en-US" dirty="0"/>
+                    </a:p>
+                  </a:txBody>
+                  <a:tcPr/>
+                </a:tc>
+                <a:tc>
+                  <a:txBody>
+                    <a:bodyPr/>
+                    <a:lstStyle/>
+                    <a:p>
+                      <a:pPr algn="ctr"/>
+                      <a:r>
+                        <a:rPr lang="en-US" dirty="0" smtClean="0"/>
+                        <a:t>3</a:t>
+                      </a:r>
+                      <a:endParaRPr lang="en-US" dirty="0"/>
+                    </a:p>
+                  </a:txBody>
+                  <a:tcPr>
+                    <a:lnR w="38100" cap="flat" cmpd="sng" algn="ctr">
+                      <a:solidFill>
+                        <a:srgbClr val="000000"/>
+                      </a:solidFill>
+                      <a:prstDash val="solid"/>
+                      <a:round/>
+                      <a:headEnd type="none" w="med" len="med"/>
+                      <a:tailEnd type="none" w="med" len="med"/>
+                    </a:lnR>
+                  </a:tcPr>
+                </a:tc>
+                <a:tc>
+                  <a:txBody>
+                    <a:bodyPr/>
+                    <a:lstStyle/>
+                    <a:p>
+                      <a:pPr algn="ctr"/>
+                      <a:endParaRPr lang="en-US" dirty="0"/>
+                    </a:p>
+                  </a:txBody>
+                  <a:tcPr>
+                    <a:lnL w="38100" cap="flat" cmpd="sng" algn="ctr">
+                      <a:solidFill>
+                        <a:srgbClr val="000000"/>
+                      </a:solidFill>
+                      <a:prstDash val="solid"/>
+                      <a:round/>
+                      <a:headEnd type="none" w="med" len="med"/>
+                      <a:tailEnd type="none" w="med" len="med"/>
+                    </a:lnL>
+                  </a:tcPr>
+                </a:tc>
+              </a:tr>
+              <a:tr h="408717">
+                <a:tc>
+                  <a:txBody>
+                    <a:bodyPr/>
+                    <a:lstStyle/>
+                    <a:p>
+                      <a:pPr algn="ctr"/>
+                      <a:r>
+                        <a:rPr lang="en-US" dirty="0" smtClean="0"/>
+                        <a:t>1</a:t>
+                      </a:r>
+                      <a:endParaRPr lang="en-US" dirty="0"/>
+                    </a:p>
+                  </a:txBody>
+                  <a:tcPr/>
+                </a:tc>
+                <a:tc>
+                  <a:txBody>
+                    <a:bodyPr/>
+                    <a:lstStyle/>
+                    <a:p>
+                      <a:pPr algn="ctr"/>
+                      <a:r>
+                        <a:rPr lang="en-US" dirty="0" smtClean="0"/>
+                        <a:t>8</a:t>
+                      </a:r>
+                      <a:endParaRPr lang="en-US" dirty="0"/>
+                    </a:p>
+                  </a:txBody>
+                  <a:tcPr/>
+                </a:tc>
+                <a:tc>
+                  <a:txBody>
+                    <a:bodyPr/>
+                    <a:lstStyle/>
+                    <a:p>
+                      <a:pPr algn="ctr"/>
+                      <a:r>
+                        <a:rPr lang="en-US" dirty="0" smtClean="0"/>
+                        <a:t>2</a:t>
+                      </a:r>
+                      <a:endParaRPr lang="en-US" dirty="0"/>
+                    </a:p>
+                  </a:txBody>
+                  <a:tcPr>
+                    <a:lnR w="38100" cap="flat" cmpd="sng" algn="ctr">
+                      <a:solidFill>
+                        <a:srgbClr val="000000"/>
+                      </a:solidFill>
+                      <a:prstDash val="solid"/>
+                      <a:round/>
+                      <a:headEnd type="none" w="med" len="med"/>
+                      <a:tailEnd type="none" w="med" len="med"/>
+                    </a:lnR>
+                  </a:tcPr>
+                </a:tc>
+                <a:tc>
+                  <a:txBody>
+                    <a:bodyPr/>
+                    <a:lstStyle/>
+                    <a:p>
+                      <a:pPr algn="ctr"/>
+                      <a:endParaRPr lang="en-US" dirty="0"/>
+                    </a:p>
+                  </a:txBody>
+                  <a:tcPr>
+                    <a:lnL w="38100" cap="flat" cmpd="sng" algn="ctr">
+                      <a:solidFill>
+                        <a:srgbClr val="000000"/>
+                      </a:solidFill>
+                      <a:prstDash val="solid"/>
+                      <a:round/>
+                      <a:headEnd type="none" w="med" len="med"/>
+                      <a:tailEnd type="none" w="med" len="med"/>
+                    </a:lnL>
+                  </a:tcPr>
+                </a:tc>
+              </a:tr>
+              <a:tr h="408717">
+                <a:tc>
+                  <a:txBody>
+                    <a:bodyPr/>
+                    <a:lstStyle/>
+                    <a:p>
+                      <a:pPr algn="ctr"/>
+                      <a:r>
+                        <a:rPr lang="en-US" dirty="0" smtClean="0"/>
+                        <a:t>8</a:t>
+                      </a:r>
+                      <a:endParaRPr lang="en-US" dirty="0"/>
+                    </a:p>
+                  </a:txBody>
+                  <a:tcPr/>
+                </a:tc>
+                <a:tc>
+                  <a:txBody>
+                    <a:bodyPr/>
+                    <a:lstStyle/>
+                    <a:p>
+                      <a:pPr algn="ctr"/>
+                      <a:r>
+                        <a:rPr lang="en-US" dirty="0" smtClean="0"/>
+                        <a:t>9</a:t>
+                      </a:r>
+                      <a:endParaRPr lang="en-US" dirty="0"/>
+                    </a:p>
+                  </a:txBody>
+                  <a:tcPr/>
+                </a:tc>
+                <a:tc>
+                  <a:txBody>
+                    <a:bodyPr/>
+                    <a:lstStyle/>
+                    <a:p>
+                      <a:pPr algn="ctr"/>
+                      <a:r>
+                        <a:rPr lang="en-US" dirty="0" smtClean="0"/>
+                        <a:t>2</a:t>
+                      </a:r>
+                      <a:endParaRPr lang="en-US" dirty="0"/>
+                    </a:p>
+                  </a:txBody>
+                  <a:tcPr>
+                    <a:lnR w="38100" cap="flat" cmpd="sng" algn="ctr">
+                      <a:solidFill>
+                        <a:srgbClr val="000000"/>
+                      </a:solidFill>
+                      <a:prstDash val="solid"/>
+                      <a:round/>
+                      <a:headEnd type="none" w="med" len="med"/>
+                      <a:tailEnd type="none" w="med" len="med"/>
+                    </a:lnR>
+                  </a:tcPr>
+                </a:tc>
+                <a:tc>
+                  <a:txBody>
+                    <a:bodyPr/>
+                    <a:lstStyle/>
+                    <a:p>
+                      <a:pPr algn="ctr"/>
+                      <a:endParaRPr lang="en-US" dirty="0"/>
+                    </a:p>
+                  </a:txBody>
+                  <a:tcPr>
+                    <a:lnL w="38100" cap="flat" cmpd="sng" algn="ctr">
+                      <a:solidFill>
+                        <a:srgbClr val="000000"/>
+                      </a:solidFill>
+                      <a:prstDash val="solid"/>
+                      <a:round/>
+                      <a:headEnd type="none" w="med" len="med"/>
+                      <a:tailEnd type="none" w="med" len="med"/>
+                    </a:lnL>
+                  </a:tcPr>
+                </a:tc>
+              </a:tr>
+              <a:tr h="408717">
+                <a:tc>
+                  <a:txBody>
+                    <a:bodyPr/>
+                    <a:lstStyle/>
+                    <a:p>
+                      <a:pPr algn="ctr"/>
+                      <a:r>
+                        <a:rPr lang="en-US" dirty="0" smtClean="0"/>
+                        <a:t>2</a:t>
+                      </a:r>
+                      <a:endParaRPr lang="en-US" dirty="0"/>
+                    </a:p>
+                  </a:txBody>
+                  <a:tcPr/>
+                </a:tc>
+                <a:tc>
+                  <a:txBody>
+                    <a:bodyPr/>
+                    <a:lstStyle/>
+                    <a:p>
+                      <a:pPr algn="ctr"/>
+                      <a:r>
+                        <a:rPr lang="en-US" dirty="0" smtClean="0"/>
+                        <a:t>2</a:t>
+                      </a:r>
+                      <a:endParaRPr lang="en-US" dirty="0"/>
+                    </a:p>
+                  </a:txBody>
+                  <a:tcPr/>
+                </a:tc>
+                <a:tc>
+                  <a:txBody>
+                    <a:bodyPr/>
+                    <a:lstStyle/>
+                    <a:p>
+                      <a:pPr algn="ctr"/>
+                      <a:r>
+                        <a:rPr lang="en-US" dirty="0" smtClean="0"/>
+                        <a:t>2</a:t>
+                      </a:r>
+                      <a:endParaRPr lang="en-US" dirty="0"/>
+                    </a:p>
+                  </a:txBody>
+                  <a:tcPr>
+                    <a:lnR w="38100" cap="flat" cmpd="sng" algn="ctr">
+                      <a:solidFill>
+                        <a:srgbClr val="000000"/>
+                      </a:solidFill>
+                      <a:prstDash val="solid"/>
+                      <a:round/>
+                      <a:headEnd type="none" w="med" len="med"/>
+                      <a:tailEnd type="none" w="med" len="med"/>
+                    </a:lnR>
+                  </a:tcPr>
+                </a:tc>
+                <a:tc>
+                  <a:txBody>
+                    <a:bodyPr/>
+                    <a:lstStyle/>
+                    <a:p>
+                      <a:pPr algn="ctr"/>
+                      <a:endParaRPr lang="en-US" dirty="0"/>
+                    </a:p>
+                  </a:txBody>
+                  <a:tcPr>
+                    <a:lnL w="38100" cap="flat" cmpd="sng" algn="ctr">
+                      <a:solidFill>
+                        <a:srgbClr val="000000"/>
+                      </a:solidFill>
+                      <a:prstDash val="solid"/>
+                      <a:round/>
+                      <a:headEnd type="none" w="med" len="med"/>
+                      <a:tailEnd type="none" w="med" len="med"/>
+                    </a:lnL>
+                  </a:tcPr>
+                </a:tc>
+              </a:tr>
+            </a:tbl>
+          </a:graphicData>
+        </a:graphic>
+      </p:graphicFrame>
+      <p:graphicFrame>
+        <p:nvGraphicFramePr>
+          <p:cNvPr id="9" name="Table 8"/>
+          <p:cNvGraphicFramePr>
+            <a:graphicFrameLocks noGrp="1"/>
+          </p:cNvGraphicFramePr>
+          <p:nvPr>
+            <p:extLst>
+              <p:ext uri="{D42A27DB-BD31-4B8C-83A1-F6EECF244321}">
+                <p14:modId xmlns:p14="http://schemas.microsoft.com/office/powerpoint/2010/main" val="888372690"/>
+              </p:ext>
+            </p:extLst>
+          </p:nvPr>
+        </p:nvGraphicFramePr>
+        <p:xfrm>
+          <a:off x="6139858" y="3184563"/>
+          <a:ext cx="4276760" cy="2452302"/>
+        </p:xfrm>
+        <a:graphic>
+          <a:graphicData uri="http://schemas.openxmlformats.org/drawingml/2006/table">
+            <a:tbl>
+              <a:tblPr firstRow="1" bandRow="1">
+                <a:tableStyleId>{72833802-FEF1-4C79-8D5D-14CF1EAF98D9}</a:tableStyleId>
+              </a:tblPr>
+              <a:tblGrid>
+                <a:gridCol w="1069190"/>
+                <a:gridCol w="1069190"/>
+                <a:gridCol w="1069190"/>
+                <a:gridCol w="1069190"/>
+              </a:tblGrid>
+              <a:tr h="408717">
+                <a:tc>
+                  <a:txBody>
+                    <a:bodyPr/>
+                    <a:lstStyle/>
+                    <a:p>
+                      <a:pPr algn="ctr"/>
+                      <a:r>
+                        <a:rPr lang="en-US" dirty="0" smtClean="0"/>
+                        <a:t>X1</a:t>
+                      </a:r>
+                      <a:endParaRPr lang="en-US" dirty="0"/>
+                    </a:p>
+                  </a:txBody>
+                  <a:tcPr>
+                    <a:lnB w="38100" cap="flat" cmpd="sng" algn="ctr">
+                      <a:solidFill>
+                        <a:srgbClr val="000000"/>
+                      </a:solidFill>
+                      <a:prstDash val="solid"/>
+                      <a:round/>
+                      <a:headEnd type="none" w="med" len="med"/>
+                      <a:tailEnd type="none" w="med" len="med"/>
+                    </a:lnB>
+                  </a:tcPr>
+                </a:tc>
+                <a:tc>
+                  <a:txBody>
+                    <a:bodyPr/>
+                    <a:lstStyle/>
+                    <a:p>
+                      <a:pPr algn="ctr"/>
+                      <a:r>
+                        <a:rPr lang="en-US" dirty="0" smtClean="0"/>
+                        <a:t>X2</a:t>
+                      </a:r>
+                      <a:endParaRPr lang="en-US" dirty="0"/>
+                    </a:p>
+                  </a:txBody>
+                  <a:tcPr>
+                    <a:lnB w="38100" cap="flat" cmpd="sng" algn="ctr">
+                      <a:solidFill>
+                        <a:srgbClr val="000000"/>
+                      </a:solidFill>
+                      <a:prstDash val="solid"/>
+                      <a:round/>
+                      <a:headEnd type="none" w="med" len="med"/>
+                      <a:tailEnd type="none" w="med" len="med"/>
+                    </a:lnB>
+                  </a:tcPr>
+                </a:tc>
+                <a:tc>
+                  <a:txBody>
+                    <a:bodyPr/>
+                    <a:lstStyle/>
+                    <a:p>
+                      <a:pPr algn="ctr"/>
+                      <a:r>
+                        <a:rPr lang="en-US" dirty="0" smtClean="0"/>
+                        <a:t>X3</a:t>
+                      </a:r>
+                      <a:endParaRPr lang="en-US" dirty="0"/>
+                    </a:p>
+                  </a:txBody>
+                  <a:tcPr>
+                    <a:lnR w="38100" cap="flat" cmpd="sng" algn="ctr">
+                      <a:solidFill>
+                        <a:srgbClr val="000000"/>
+                      </a:solidFill>
+                      <a:prstDash val="solid"/>
+                      <a:round/>
+                      <a:headEnd type="none" w="med" len="med"/>
+                      <a:tailEnd type="none" w="med" len="med"/>
+                    </a:lnR>
+                    <a:lnB w="38100" cap="flat" cmpd="sng" algn="ctr">
+                      <a:solidFill>
+                        <a:srgbClr val="000000"/>
+                      </a:solidFill>
+                      <a:prstDash val="solid"/>
+                      <a:round/>
+                      <a:headEnd type="none" w="med" len="med"/>
+                      <a:tailEnd type="none" w="med" len="med"/>
+                    </a:lnB>
+                  </a:tcPr>
+                </a:tc>
+                <a:tc>
+                  <a:txBody>
+                    <a:bodyPr/>
+                    <a:lstStyle/>
+                    <a:p>
+                      <a:pPr algn="ctr"/>
+                      <a:r>
+                        <a:rPr lang="en-US" dirty="0" smtClean="0"/>
+                        <a:t>Y</a:t>
+                      </a:r>
+                      <a:endParaRPr lang="en-US" dirty="0"/>
+                    </a:p>
+                  </a:txBody>
+                  <a:tcPr>
+                    <a:lnL w="38100" cap="flat" cmpd="sng" algn="ctr">
+                      <a:solidFill>
+                        <a:srgbClr val="000000"/>
+                      </a:solidFill>
+                      <a:prstDash val="solid"/>
+                      <a:round/>
+                      <a:headEnd type="none" w="med" len="med"/>
+                      <a:tailEnd type="none" w="med" len="med"/>
+                    </a:lnL>
+                    <a:lnB w="38100" cap="flat" cmpd="sng" algn="ctr">
+                      <a:solidFill>
+                        <a:srgbClr val="000000"/>
+                      </a:solidFill>
+                      <a:prstDash val="solid"/>
+                      <a:round/>
+                      <a:headEnd type="none" w="med" len="med"/>
+                      <a:tailEnd type="none" w="med" len="med"/>
+                    </a:lnB>
+                  </a:tcPr>
+                </a:tc>
+              </a:tr>
+              <a:tr h="408717">
+                <a:tc>
+                  <a:txBody>
+                    <a:bodyPr/>
+                    <a:lstStyle/>
+                    <a:p>
+                      <a:pPr algn="ctr"/>
+                      <a:r>
+                        <a:rPr lang="en-US" dirty="0" smtClean="0"/>
+                        <a:t>1</a:t>
+                      </a:r>
+                      <a:endParaRPr lang="en-US" dirty="0"/>
+                    </a:p>
+                  </a:txBody>
+                  <a:tcPr>
+                    <a:lnT w="38100" cap="flat" cmpd="sng" algn="ctr">
+                      <a:solidFill>
+                        <a:srgbClr val="000000"/>
+                      </a:solidFill>
+                      <a:prstDash val="solid"/>
+                      <a:round/>
+                      <a:headEnd type="none" w="med" len="med"/>
+                      <a:tailEnd type="none" w="med" len="med"/>
+                    </a:lnT>
+                  </a:tcPr>
+                </a:tc>
+                <a:tc>
+                  <a:txBody>
+                    <a:bodyPr/>
+                    <a:lstStyle/>
+                    <a:p>
+                      <a:pPr algn="ctr"/>
+                      <a:r>
+                        <a:rPr lang="en-US" dirty="0" smtClean="0"/>
+                        <a:t>2</a:t>
+                      </a:r>
+                      <a:endParaRPr lang="en-US" dirty="0"/>
+                    </a:p>
+                  </a:txBody>
+                  <a:tcPr>
+                    <a:lnT w="38100" cap="flat" cmpd="sng" algn="ctr">
+                      <a:solidFill>
+                        <a:srgbClr val="000000"/>
+                      </a:solidFill>
+                      <a:prstDash val="solid"/>
+                      <a:round/>
+                      <a:headEnd type="none" w="med" len="med"/>
+                      <a:tailEnd type="none" w="med" len="med"/>
+                    </a:lnT>
+                  </a:tcPr>
+                </a:tc>
+                <a:tc>
+                  <a:txBody>
+                    <a:bodyPr/>
+                    <a:lstStyle/>
+                    <a:p>
+                      <a:pPr algn="ctr"/>
+                      <a:r>
+                        <a:rPr lang="en-US" dirty="0" smtClean="0"/>
+                        <a:t>2</a:t>
+                      </a:r>
+                      <a:endParaRPr lang="en-US" dirty="0"/>
+                    </a:p>
+                  </a:txBody>
+                  <a:tcPr>
+                    <a:lnR w="38100" cap="flat" cmpd="sng" algn="ctr">
+                      <a:solidFill>
+                        <a:srgbClr val="000000"/>
+                      </a:solidFill>
+                      <a:prstDash val="solid"/>
+                      <a:round/>
+                      <a:headEnd type="none" w="med" len="med"/>
+                      <a:tailEnd type="none" w="med" len="med"/>
+                    </a:lnR>
+                    <a:lnT w="38100" cap="flat" cmpd="sng" algn="ctr">
+                      <a:solidFill>
+                        <a:srgbClr val="000000"/>
+                      </a:solidFill>
+                      <a:prstDash val="solid"/>
+                      <a:round/>
+                      <a:headEnd type="none" w="med" len="med"/>
+                      <a:tailEnd type="none" w="med" len="med"/>
+                    </a:lnT>
+                  </a:tcPr>
+                </a:tc>
+                <a:tc>
+                  <a:txBody>
+                    <a:bodyPr/>
+                    <a:lstStyle/>
+                    <a:p>
+                      <a:pPr algn="ctr"/>
+                      <a:r>
+                        <a:rPr lang="en-US" dirty="0" smtClean="0"/>
+                        <a:t>9</a:t>
+                      </a:r>
+                      <a:endParaRPr lang="en-US" dirty="0"/>
+                    </a:p>
+                  </a:txBody>
+                  <a:tcPr>
+                    <a:lnL w="38100" cap="flat" cmpd="sng" algn="ctr">
+                      <a:solidFill>
+                        <a:srgbClr val="000000"/>
+                      </a:solidFill>
+                      <a:prstDash val="solid"/>
+                      <a:round/>
+                      <a:headEnd type="none" w="med" len="med"/>
+                      <a:tailEnd type="none" w="med" len="med"/>
+                    </a:lnL>
+                    <a:lnT w="38100" cap="flat" cmpd="sng" algn="ctr">
+                      <a:solidFill>
+                        <a:srgbClr val="000000"/>
+                      </a:solidFill>
+                      <a:prstDash val="solid"/>
+                      <a:round/>
+                      <a:headEnd type="none" w="med" len="med"/>
+                      <a:tailEnd type="none" w="med" len="med"/>
+                    </a:lnT>
+                  </a:tcPr>
+                </a:tc>
+              </a:tr>
+              <a:tr h="408717">
+                <a:tc>
+                  <a:txBody>
+                    <a:bodyPr/>
+                    <a:lstStyle/>
+                    <a:p>
+                      <a:pPr algn="ctr"/>
+                      <a:r>
+                        <a:rPr lang="en-US" dirty="0" smtClean="0"/>
+                        <a:t>4</a:t>
+                      </a:r>
+                      <a:endParaRPr lang="en-US" dirty="0"/>
+                    </a:p>
+                  </a:txBody>
+                  <a:tcPr/>
+                </a:tc>
+                <a:tc>
+                  <a:txBody>
+                    <a:bodyPr/>
+                    <a:lstStyle/>
+                    <a:p>
+                      <a:pPr algn="ctr"/>
+                      <a:r>
+                        <a:rPr lang="en-US" dirty="0" smtClean="0"/>
+                        <a:t>3</a:t>
+                      </a:r>
+                      <a:endParaRPr lang="en-US" dirty="0"/>
+                    </a:p>
+                  </a:txBody>
+                  <a:tcPr/>
+                </a:tc>
+                <a:tc>
+                  <a:txBody>
+                    <a:bodyPr/>
+                    <a:lstStyle/>
+                    <a:p>
+                      <a:pPr algn="ctr"/>
+                      <a:r>
+                        <a:rPr lang="en-US" dirty="0" smtClean="0"/>
+                        <a:t>3</a:t>
+                      </a:r>
+                      <a:endParaRPr lang="en-US" dirty="0"/>
+                    </a:p>
+                  </a:txBody>
+                  <a:tcPr>
+                    <a:lnR w="38100" cap="flat" cmpd="sng" algn="ctr">
+                      <a:solidFill>
+                        <a:srgbClr val="000000"/>
+                      </a:solidFill>
+                      <a:prstDash val="solid"/>
+                      <a:round/>
+                      <a:headEnd type="none" w="med" len="med"/>
+                      <a:tailEnd type="none" w="med" len="med"/>
+                    </a:lnR>
+                  </a:tcPr>
+                </a:tc>
+                <a:tc>
+                  <a:txBody>
+                    <a:bodyPr/>
+                    <a:lstStyle/>
+                    <a:p>
+                      <a:pPr algn="ctr"/>
+                      <a:r>
+                        <a:rPr lang="en-US" dirty="0" smtClean="0"/>
+                        <a:t>343</a:t>
+                      </a:r>
+                      <a:endParaRPr lang="en-US" dirty="0"/>
+                    </a:p>
+                  </a:txBody>
+                  <a:tcPr>
+                    <a:lnL w="38100" cap="flat" cmpd="sng" algn="ctr">
+                      <a:solidFill>
+                        <a:srgbClr val="000000"/>
+                      </a:solidFill>
+                      <a:prstDash val="solid"/>
+                      <a:round/>
+                      <a:headEnd type="none" w="med" len="med"/>
+                      <a:tailEnd type="none" w="med" len="med"/>
+                    </a:lnL>
+                  </a:tcPr>
+                </a:tc>
+              </a:tr>
+              <a:tr h="408717">
+                <a:tc>
+                  <a:txBody>
+                    <a:bodyPr/>
+                    <a:lstStyle/>
+                    <a:p>
+                      <a:pPr algn="ctr"/>
+                      <a:r>
+                        <a:rPr lang="en-US" dirty="0" smtClean="0"/>
+                        <a:t>1</a:t>
+                      </a:r>
+                      <a:endParaRPr lang="en-US" dirty="0"/>
+                    </a:p>
+                  </a:txBody>
+                  <a:tcPr/>
+                </a:tc>
+                <a:tc>
+                  <a:txBody>
+                    <a:bodyPr/>
+                    <a:lstStyle/>
+                    <a:p>
+                      <a:pPr algn="ctr"/>
+                      <a:r>
+                        <a:rPr lang="en-US" dirty="0" smtClean="0"/>
+                        <a:t>8</a:t>
+                      </a:r>
+                      <a:endParaRPr lang="en-US" dirty="0"/>
+                    </a:p>
+                  </a:txBody>
+                  <a:tcPr/>
+                </a:tc>
+                <a:tc>
+                  <a:txBody>
+                    <a:bodyPr/>
+                    <a:lstStyle/>
+                    <a:p>
+                      <a:pPr algn="ctr"/>
+                      <a:r>
+                        <a:rPr lang="en-US" dirty="0" smtClean="0"/>
+                        <a:t>2</a:t>
+                      </a:r>
+                      <a:endParaRPr lang="en-US" dirty="0"/>
+                    </a:p>
+                  </a:txBody>
+                  <a:tcPr>
+                    <a:lnR w="38100" cap="flat" cmpd="sng" algn="ctr">
+                      <a:solidFill>
+                        <a:srgbClr val="000000"/>
+                      </a:solidFill>
+                      <a:prstDash val="solid"/>
+                      <a:round/>
+                      <a:headEnd type="none" w="med" len="med"/>
+                      <a:tailEnd type="none" w="med" len="med"/>
+                    </a:lnR>
+                  </a:tcPr>
+                </a:tc>
+                <a:tc>
+                  <a:txBody>
+                    <a:bodyPr/>
+                    <a:lstStyle/>
+                    <a:p>
+                      <a:pPr algn="ctr"/>
+                      <a:r>
+                        <a:rPr lang="en-US" dirty="0" smtClean="0"/>
+                        <a:t>81</a:t>
+                      </a:r>
+                      <a:endParaRPr lang="en-US" dirty="0"/>
+                    </a:p>
+                  </a:txBody>
+                  <a:tcPr>
+                    <a:lnL w="38100" cap="flat" cmpd="sng" algn="ctr">
+                      <a:solidFill>
+                        <a:srgbClr val="000000"/>
+                      </a:solidFill>
+                      <a:prstDash val="solid"/>
+                      <a:round/>
+                      <a:headEnd type="none" w="med" len="med"/>
+                      <a:tailEnd type="none" w="med" len="med"/>
+                    </a:lnL>
+                  </a:tcPr>
+                </a:tc>
+              </a:tr>
+              <a:tr h="408717">
+                <a:tc>
+                  <a:txBody>
+                    <a:bodyPr/>
+                    <a:lstStyle/>
+                    <a:p>
+                      <a:pPr algn="ctr"/>
+                      <a:r>
+                        <a:rPr lang="en-US" dirty="0" smtClean="0"/>
+                        <a:t>8</a:t>
+                      </a:r>
+                      <a:endParaRPr lang="en-US" dirty="0"/>
+                    </a:p>
+                  </a:txBody>
+                  <a:tcPr/>
+                </a:tc>
+                <a:tc>
+                  <a:txBody>
+                    <a:bodyPr/>
+                    <a:lstStyle/>
+                    <a:p>
+                      <a:pPr algn="ctr"/>
+                      <a:r>
+                        <a:rPr lang="en-US" dirty="0" smtClean="0"/>
+                        <a:t>9</a:t>
+                      </a:r>
+                      <a:endParaRPr lang="en-US" dirty="0"/>
+                    </a:p>
+                  </a:txBody>
+                  <a:tcPr/>
+                </a:tc>
+                <a:tc>
+                  <a:txBody>
+                    <a:bodyPr/>
+                    <a:lstStyle/>
+                    <a:p>
+                      <a:pPr algn="ctr"/>
+                      <a:r>
+                        <a:rPr lang="en-US" dirty="0" smtClean="0"/>
+                        <a:t>2</a:t>
+                      </a:r>
+                      <a:endParaRPr lang="en-US" dirty="0"/>
+                    </a:p>
+                  </a:txBody>
+                  <a:tcPr>
+                    <a:lnR w="38100" cap="flat" cmpd="sng" algn="ctr">
+                      <a:solidFill>
+                        <a:srgbClr val="000000"/>
+                      </a:solidFill>
+                      <a:prstDash val="solid"/>
+                      <a:round/>
+                      <a:headEnd type="none" w="med" len="med"/>
+                      <a:tailEnd type="none" w="med" len="med"/>
+                    </a:lnR>
+                  </a:tcPr>
+                </a:tc>
+                <a:tc>
+                  <a:txBody>
+                    <a:bodyPr/>
+                    <a:lstStyle/>
+                    <a:p>
+                      <a:pPr algn="ctr"/>
+                      <a:r>
+                        <a:rPr lang="en-US" dirty="0" smtClean="0"/>
+                        <a:t>289</a:t>
+                      </a:r>
+                      <a:endParaRPr lang="en-US" dirty="0"/>
+                    </a:p>
+                  </a:txBody>
+                  <a:tcPr>
+                    <a:lnL w="38100" cap="flat" cmpd="sng" algn="ctr">
+                      <a:solidFill>
+                        <a:srgbClr val="000000"/>
+                      </a:solidFill>
+                      <a:prstDash val="solid"/>
+                      <a:round/>
+                      <a:headEnd type="none" w="med" len="med"/>
+                      <a:tailEnd type="none" w="med" len="med"/>
+                    </a:lnL>
+                  </a:tcPr>
+                </a:tc>
+              </a:tr>
+              <a:tr h="408717">
+                <a:tc>
+                  <a:txBody>
+                    <a:bodyPr/>
+                    <a:lstStyle/>
+                    <a:p>
+                      <a:pPr algn="ctr"/>
+                      <a:r>
+                        <a:rPr lang="en-US" dirty="0" smtClean="0"/>
+                        <a:t>2</a:t>
+                      </a:r>
+                      <a:endParaRPr lang="en-US" dirty="0"/>
+                    </a:p>
+                  </a:txBody>
+                  <a:tcPr/>
+                </a:tc>
+                <a:tc>
+                  <a:txBody>
+                    <a:bodyPr/>
+                    <a:lstStyle/>
+                    <a:p>
+                      <a:pPr algn="ctr"/>
+                      <a:r>
+                        <a:rPr lang="en-US" dirty="0" smtClean="0"/>
+                        <a:t>2</a:t>
+                      </a:r>
+                      <a:endParaRPr lang="en-US" dirty="0"/>
+                    </a:p>
+                  </a:txBody>
+                  <a:tcPr/>
+                </a:tc>
+                <a:tc>
+                  <a:txBody>
+                    <a:bodyPr/>
+                    <a:lstStyle/>
+                    <a:p>
+                      <a:pPr algn="ctr"/>
+                      <a:r>
+                        <a:rPr lang="en-US" dirty="0" smtClean="0"/>
+                        <a:t>2</a:t>
+                      </a:r>
+                      <a:endParaRPr lang="en-US" dirty="0"/>
+                    </a:p>
+                  </a:txBody>
+                  <a:tcPr>
+                    <a:lnR w="38100" cap="flat" cmpd="sng" algn="ctr">
+                      <a:solidFill>
+                        <a:srgbClr val="000000"/>
+                      </a:solidFill>
+                      <a:prstDash val="solid"/>
+                      <a:round/>
+                      <a:headEnd type="none" w="med" len="med"/>
+                      <a:tailEnd type="none" w="med" len="med"/>
+                    </a:lnR>
+                  </a:tcPr>
+                </a:tc>
+                <a:tc>
+                  <a:txBody>
+                    <a:bodyPr/>
+                    <a:lstStyle/>
+                    <a:p>
+                      <a:pPr algn="ctr"/>
+                      <a:r>
+                        <a:rPr lang="en-US" dirty="0" smtClean="0"/>
+                        <a:t>16</a:t>
+                      </a:r>
+                      <a:endParaRPr lang="en-US" dirty="0"/>
+                    </a:p>
+                  </a:txBody>
+                  <a:tcPr>
+                    <a:lnL w="38100" cap="flat" cmpd="sng" algn="ctr">
+                      <a:solidFill>
+                        <a:srgbClr val="000000"/>
+                      </a:solidFill>
+                      <a:prstDash val="solid"/>
+                      <a:round/>
+                      <a:headEnd type="none" w="med" len="med"/>
+                      <a:tailEnd type="none" w="med" len="med"/>
+                    </a:lnL>
+                  </a:tcPr>
+                </a:tc>
+              </a:tr>
+            </a:tbl>
+          </a:graphicData>
+        </a:graphic>
+      </p:graphicFrame>
     </p:spTree>
     <p:extLst>
       <p:ext uri="{BB962C8B-B14F-4D97-AF65-F5344CB8AC3E}">
@@ -7123,13 +7318,8 @@
             </a:r>
             <a:r>
               <a:rPr lang="nl-BE" dirty="0" smtClean="0"/>
-              <a:t> </a:t>
-            </a:r>
-            <a:r>
-              <a:rPr lang="nl-BE" dirty="0" smtClean="0"/>
-              <a:t>Ons doel</a:t>
-            </a:r>
-            <a:endParaRPr lang="nl-BE" dirty="0" smtClean="0"/>
+              <a:t> Ons doel</a:t>
+            </a:r>
           </a:p>
           <a:p>
             <a:pPr>
@@ -7679,7 +7869,7 @@
   <p:timing>
     <p:tnLst>
       <p:par>
-        <p:cTn id="1" dur="indefinite" restart="never" nodeType="tmRoot"/>
+        <p:cTn xmlns:p14="http://schemas.microsoft.com/office/powerpoint/2010/main" id="1" dur="indefinite" restart="never" nodeType="tmRoot"/>
       </p:par>
     </p:tnLst>
   </p:timing>
@@ -7770,7 +7960,7 @@
   <p:timing>
     <p:tnLst>
       <p:par>
-        <p:cTn id="1" dur="indefinite" restart="never" nodeType="tmRoot"/>
+        <p:cTn xmlns:p14="http://schemas.microsoft.com/office/powerpoint/2010/main" id="1" dur="indefinite" restart="never" nodeType="tmRoot"/>
       </p:par>
     </p:tnLst>
   </p:timing>
@@ -7885,23 +8075,19 @@
             </a:r>
             <a:r>
               <a:rPr lang="nl-BE" dirty="0" smtClean="0"/>
-              <a:t> Programming </a:t>
-            </a:r>
-            <a:r>
-              <a:rPr lang="nl-BE" dirty="0" err="1" smtClean="0"/>
-              <a:t>by</a:t>
+              <a:t> </a:t>
             </a:r>
             <a:r>
               <a:rPr lang="nl-BE" dirty="0" smtClean="0"/>
-              <a:t> </a:t>
-            </a:r>
-            <a:r>
-              <a:rPr lang="nl-BE" dirty="0" err="1" smtClean="0"/>
-              <a:t>example</a:t>
-            </a:r>
-            <a:r>
-              <a:rPr lang="nl-BE" dirty="0" smtClean="0"/>
-              <a:t> </a:t>
+              <a:t>End-User programming</a:t>
+            </a:r>
+            <a:r>
+              <a:rPr lang="nl-BE" dirty="0" smtClean="0">
+                <a:solidFill>
+                  <a:srgbClr val="FF0000"/>
+                </a:solidFill>
+              </a:rPr>
+              <a:t>(</a:t>
             </a:r>
             <a:r>
               <a:rPr lang="nl-BE" dirty="0">
@@ -7909,7 +8095,7 @@
                   <a:srgbClr val="FF0000"/>
                 </a:solidFill>
               </a:rPr>
-              <a:t>(&lt;- vertalen?)</a:t>
+              <a:t>&lt;- vertalen?)</a:t>
             </a:r>
             <a:endParaRPr lang="en-US" dirty="0"/>
           </a:p>
@@ -7971,7 +8157,7 @@
     </a:clrScheme>
     <a:fontScheme name="Retrospect">
       <a:majorFont>
-        <a:latin typeface="Calibri Light" panose="020F0302020204030204"/>
+        <a:latin typeface="Calibri Light"/>
         <a:ea typeface=""/>
         <a:cs typeface=""/>
         <a:font script="Jpan" typeface="ＭＳ Ｐゴシック"/>
@@ -8006,7 +8192,7 @@
         <a:font script="Geor" typeface="Sylfaen"/>
       </a:majorFont>
       <a:minorFont>
-        <a:latin typeface="Calibri" panose="020F0502020204030204"/>
+        <a:latin typeface="Calibri"/>
         <a:ea typeface=""/>
         <a:cs typeface=""/>
         <a:font script="Jpan" typeface="ＭＳ Ｐゴシック"/>
@@ -8205,7 +8391,7 @@
   <a:extraClrSchemeLst/>
   <a:extLst>
     <a:ext uri="{05A4C25C-085E-4340-85A3-A5531E510DB2}">
-      <thm15:themeFamily xmlns:thm15="http://schemas.microsoft.com/office/thememl/2012/main" name="Retrospect" id="{5F128B03-DCCA-4EEB-AB3B-CF2899314A46}" vid="{3F1AAB62-24C6-49D2-8E01-B56FAC9A3DCD}"/>
+      <thm15:themeFamily xmlns:thm15="http://schemas.microsoft.com/office/thememl/2012/main" xmlns="" name="Retrospect" id="{5F128B03-DCCA-4EEB-AB3B-CF2899314A46}" vid="{3F1AAB62-24C6-49D2-8E01-B56FAC9A3DCD}"/>
     </a:ext>
   </a:extLst>
 </a:theme>

</xml_diff>

<commit_message>
Afwerking presentatie, was gwn nog niet gepushed
</commit_message>
<xml_diff>
--- a/Opdracht 2/Literatuurstudie.pptx
+++ b/Opdracht 2/Literatuurstudie.pptx
@@ -11,8 +11,8 @@
     <p:sldId id="256" r:id="rId2"/>
     <p:sldId id="257" r:id="rId3"/>
     <p:sldId id="294" r:id="rId4"/>
-    <p:sldId id="298" r:id="rId5"/>
-    <p:sldId id="270" r:id="rId6"/>
+    <p:sldId id="270" r:id="rId5"/>
+    <p:sldId id="298" r:id="rId6"/>
     <p:sldId id="293" r:id="rId7"/>
     <p:sldId id="286" r:id="rId8"/>
     <p:sldId id="287" r:id="rId9"/>
@@ -160,31 +160,6 @@
     </p:extLst>
   </p:cmAuthor>
 </p:cmAuthorLst>
-</file>
-
-<file path=ppt/comments/comment1.xml><?xml version="1.0" encoding="utf-8"?>
-<p:cmLst xmlns:a="http://schemas.openxmlformats.org/drawingml/2006/main" xmlns:r="http://schemas.openxmlformats.org/officeDocument/2006/relationships" xmlns:p="http://schemas.openxmlformats.org/presentationml/2006/main">
-  <p:cm authorId="1" dt="2014-10-22T15:15:14.476" idx="1">
-    <p:pos x="10" y="10"/>
-    <p:text>Applicaties toelichten tijdens presentatie!</p:text>
-    <p:extLst>
-      <p:ext uri="{C676402C-5697-4E1C-873F-D02D1690AC5C}">
-        <p15:threadingInfo xmlns:p15="http://schemas.microsoft.com/office/powerpoint/2012/main" timeZoneBias="-120"/>
-      </p:ext>
-    </p:extLst>
-  </p:cm>
-  <p:cm authorId="1" dt="2014-10-22T15:15:49.725" idx="2">
-    <p:pos x="10" y="146"/>
-    <p:text>(y)</p:text>
-    <p:extLst>
-      <p:ext uri="{C676402C-5697-4E1C-873F-D02D1690AC5C}">
-        <p15:threadingInfo xmlns:p15="http://schemas.microsoft.com/office/powerpoint/2012/main" timeZoneBias="-120">
-          <p15:parentCm authorId="1" idx="1"/>
-        </p15:threadingInfo>
-      </p:ext>
-    </p:extLst>
-  </p:cm>
-</p:cmLst>
 </file>
 
 <file path=ppt/diagrams/colors1.xml><?xml version="1.0" encoding="utf-8"?>
@@ -6547,94 +6522,6 @@
         </p:nvSpPr>
         <p:spPr/>
       </p:sp>
-      <p:sp>
-        <p:nvSpPr>
-          <p:cNvPr id="3" name="Notes Placeholder 2"/>
-          <p:cNvSpPr>
-            <a:spLocks noGrp="1"/>
-          </p:cNvSpPr>
-          <p:nvPr>
-            <p:ph type="body" idx="1"/>
-          </p:nvPr>
-        </p:nvSpPr>
-        <p:spPr/>
-        <p:txBody>
-          <a:bodyPr/>
-          <a:lstStyle/>
-          <a:p>
-            <a:r>
-              <a:rPr lang="nl-BE" dirty="0" smtClean="0"/>
-              <a:t>Figuurtje</a:t>
-            </a:r>
-            <a:endParaRPr lang="en-US" dirty="0"/>
-          </a:p>
-        </p:txBody>
-      </p:sp>
-      <p:sp>
-        <p:nvSpPr>
-          <p:cNvPr id="4" name="Slide Number Placeholder 3"/>
-          <p:cNvSpPr>
-            <a:spLocks noGrp="1"/>
-          </p:cNvSpPr>
-          <p:nvPr>
-            <p:ph type="sldNum" sz="quarter" idx="10"/>
-          </p:nvPr>
-        </p:nvSpPr>
-        <p:spPr/>
-        <p:txBody>
-          <a:bodyPr/>
-          <a:lstStyle/>
-          <a:p>
-            <a:fld id="{4E765FFB-E928-41F7-9C48-EAAB8C6B32DB}" type="slidenum">
-              <a:rPr lang="en-US" smtClean="0"/>
-              <a:t>4</a:t>
-            </a:fld>
-            <a:endParaRPr lang="en-US"/>
-          </a:p>
-        </p:txBody>
-      </p:sp>
-    </p:spTree>
-    <p:extLst>
-      <p:ext uri="{BB962C8B-B14F-4D97-AF65-F5344CB8AC3E}">
-        <p14:creationId xmlns:p14="http://schemas.microsoft.com/office/powerpoint/2010/main" val="2307986188"/>
-      </p:ext>
-    </p:extLst>
-  </p:cSld>
-  <p:clrMapOvr>
-    <a:masterClrMapping/>
-  </p:clrMapOvr>
-</p:notes>
-</file>
-
-<file path=ppt/notesSlides/notesSlide3.xml><?xml version="1.0" encoding="utf-8"?>
-<p:notes xmlns:a="http://schemas.openxmlformats.org/drawingml/2006/main" xmlns:r="http://schemas.openxmlformats.org/officeDocument/2006/relationships" xmlns:p="http://schemas.openxmlformats.org/presentationml/2006/main">
-  <p:cSld>
-    <p:spTree>
-      <p:nvGrpSpPr>
-        <p:cNvPr id="1" name=""/>
-        <p:cNvGrpSpPr/>
-        <p:nvPr/>
-      </p:nvGrpSpPr>
-      <p:grpSpPr>
-        <a:xfrm>
-          <a:off x="0" y="0"/>
-          <a:ext cx="0" cy="0"/>
-          <a:chOff x="0" y="0"/>
-          <a:chExt cx="0" cy="0"/>
-        </a:xfrm>
-      </p:grpSpPr>
-      <p:sp>
-        <p:nvSpPr>
-          <p:cNvPr id="2" name="Slide Image Placeholder 1"/>
-          <p:cNvSpPr>
-            <a:spLocks noGrp="1" noRot="1" noChangeAspect="1"/>
-          </p:cNvSpPr>
-          <p:nvPr>
-            <p:ph type="sldImg"/>
-          </p:nvPr>
-        </p:nvSpPr>
-        <p:spPr/>
-      </p:sp>
       <mc:AlternateContent xmlns:mc="http://schemas.openxmlformats.org/markup-compatibility/2006" xmlns:a14="http://schemas.microsoft.com/office/drawing/2010/main">
         <mc:Choice Requires="a14">
           <p:sp>
@@ -6819,7 +6706,7 @@
           <a:p>
             <a:fld id="{4E765FFB-E928-41F7-9C48-EAAB8C6B32DB}" type="slidenum">
               <a:rPr lang="en-US" smtClean="0"/>
-              <a:t>5</a:t>
+              <a:t>4</a:t>
             </a:fld>
             <a:endParaRPr lang="en-US"/>
           </a:p>
@@ -6829,6 +6716,94 @@
     <p:extLst>
       <p:ext uri="{BB962C8B-B14F-4D97-AF65-F5344CB8AC3E}">
         <p14:creationId xmlns:p14="http://schemas.microsoft.com/office/powerpoint/2010/main" val="2657191854"/>
+      </p:ext>
+    </p:extLst>
+  </p:cSld>
+  <p:clrMapOvr>
+    <a:masterClrMapping/>
+  </p:clrMapOvr>
+</p:notes>
+</file>
+
+<file path=ppt/notesSlides/notesSlide3.xml><?xml version="1.0" encoding="utf-8"?>
+<p:notes xmlns:a="http://schemas.openxmlformats.org/drawingml/2006/main" xmlns:r="http://schemas.openxmlformats.org/officeDocument/2006/relationships" xmlns:p="http://schemas.openxmlformats.org/presentationml/2006/main">
+  <p:cSld>
+    <p:spTree>
+      <p:nvGrpSpPr>
+        <p:cNvPr id="1" name=""/>
+        <p:cNvGrpSpPr/>
+        <p:nvPr/>
+      </p:nvGrpSpPr>
+      <p:grpSpPr>
+        <a:xfrm>
+          <a:off x="0" y="0"/>
+          <a:ext cx="0" cy="0"/>
+          <a:chOff x="0" y="0"/>
+          <a:chExt cx="0" cy="0"/>
+        </a:xfrm>
+      </p:grpSpPr>
+      <p:sp>
+        <p:nvSpPr>
+          <p:cNvPr id="2" name="Slide Image Placeholder 1"/>
+          <p:cNvSpPr>
+            <a:spLocks noGrp="1" noRot="1" noChangeAspect="1"/>
+          </p:cNvSpPr>
+          <p:nvPr>
+            <p:ph type="sldImg"/>
+          </p:nvPr>
+        </p:nvSpPr>
+        <p:spPr/>
+      </p:sp>
+      <p:sp>
+        <p:nvSpPr>
+          <p:cNvPr id="3" name="Notes Placeholder 2"/>
+          <p:cNvSpPr>
+            <a:spLocks noGrp="1"/>
+          </p:cNvSpPr>
+          <p:nvPr>
+            <p:ph type="body" idx="1"/>
+          </p:nvPr>
+        </p:nvSpPr>
+        <p:spPr/>
+        <p:txBody>
+          <a:bodyPr/>
+          <a:lstStyle/>
+          <a:p>
+            <a:r>
+              <a:rPr lang="nl-BE" dirty="0" smtClean="0"/>
+              <a:t>Figuurtje</a:t>
+            </a:r>
+            <a:endParaRPr lang="en-US" dirty="0"/>
+          </a:p>
+        </p:txBody>
+      </p:sp>
+      <p:sp>
+        <p:nvSpPr>
+          <p:cNvPr id="4" name="Slide Number Placeholder 3"/>
+          <p:cNvSpPr>
+            <a:spLocks noGrp="1"/>
+          </p:cNvSpPr>
+          <p:nvPr>
+            <p:ph type="sldNum" sz="quarter" idx="10"/>
+          </p:nvPr>
+        </p:nvSpPr>
+        <p:spPr/>
+        <p:txBody>
+          <a:bodyPr/>
+          <a:lstStyle/>
+          <a:p>
+            <a:fld id="{4E765FFB-E928-41F7-9C48-EAAB8C6B32DB}" type="slidenum">
+              <a:rPr lang="en-US" smtClean="0"/>
+              <a:t>5</a:t>
+            </a:fld>
+            <a:endParaRPr lang="en-US"/>
+          </a:p>
+        </p:txBody>
+      </p:sp>
+    </p:spTree>
+    <p:extLst>
+      <p:ext uri="{BB962C8B-B14F-4D97-AF65-F5344CB8AC3E}">
+        <p14:creationId xmlns:p14="http://schemas.microsoft.com/office/powerpoint/2010/main" val="2307986188"/>
       </p:ext>
     </p:extLst>
   </p:cSld>
@@ -12253,23 +12228,7 @@
             </a:pPr>
             <a:r>
               <a:rPr lang="en-US" sz="3600" dirty="0" err="1" smtClean="0"/>
-              <a:t>Een</a:t>
-            </a:r>
-            <a:r>
-              <a:rPr lang="en-US" sz="3600" dirty="0" smtClean="0"/>
-              <a:t> </a:t>
-            </a:r>
-            <a:r>
-              <a:rPr lang="en-US" sz="3600" dirty="0" err="1" smtClean="0"/>
-              <a:t>taal</a:t>
-            </a:r>
-            <a:r>
-              <a:rPr lang="en-US" sz="3600" dirty="0" smtClean="0"/>
-              <a:t> van </a:t>
-            </a:r>
-            <a:r>
-              <a:rPr lang="en-US" sz="3600" dirty="0" err="1" smtClean="0"/>
-              <a:t>programma’s</a:t>
+              <a:t>Programmeertaal</a:t>
             </a:r>
             <a:r>
               <a:rPr lang="en-US" sz="3600" dirty="0" smtClean="0"/>
@@ -14686,16 +14645,18 @@
                   <a:schemeClr val="tx1"/>
                 </a:solidFill>
               </a:rPr>
-              <a:t> Ons doel: Flash Fill en Equation Discovery combineren </a:t>
-            </a:r>
-          </a:p>
-          <a:p>
-            <a:pPr>
-              <a:buFont typeface="Arial"/>
-              <a:buChar char="•"/>
-            </a:pPr>
-            <a:r>
-              <a:rPr lang="nl-BE" sz="3600" dirty="0">
+              <a:t> Ons doel: Flash </a:t>
+            </a:r>
+            <a:r>
+              <a:rPr lang="nl-BE" sz="3600" dirty="0" err="1" smtClean="0">
+                <a:solidFill>
+                  <a:schemeClr val="tx1"/>
+                </a:solidFill>
+              </a:rPr>
+              <a:t>Fill</a:t>
+            </a:r>
+            <a:r>
+              <a:rPr lang="nl-BE" sz="3600" dirty="0" smtClean="0">
                 <a:solidFill>
                   <a:schemeClr val="tx1"/>
                 </a:solidFill>
@@ -14708,16 +14669,16 @@
                   <a:schemeClr val="tx1"/>
                 </a:solidFill>
               </a:rPr>
-              <a:t>Grammatica</a:t>
-            </a:r>
-          </a:p>
-          <a:p>
-            <a:pPr>
+              <a:t>voor getallen</a:t>
+            </a:r>
+          </a:p>
+          <a:p>
+            <a:pPr lvl="1">
               <a:buFont typeface="Arial"/>
               <a:buChar char="•"/>
             </a:pPr>
             <a:r>
-              <a:rPr lang="nl-BE" sz="3600" dirty="0">
+              <a:rPr lang="nl-BE" sz="3400" dirty="0">
                 <a:solidFill>
                   <a:schemeClr val="tx1"/>
                 </a:solidFill>
@@ -14725,12 +14686,106 @@
               <a:t> </a:t>
             </a:r>
             <a:r>
+              <a:rPr lang="nl-BE" sz="3400" dirty="0" smtClean="0">
+                <a:solidFill>
+                  <a:schemeClr val="tx1"/>
+                </a:solidFill>
+              </a:rPr>
+              <a:t>Domein kennis: </a:t>
+            </a:r>
+            <a:r>
+              <a:rPr lang="nl-BE" sz="3400" dirty="0" err="1">
+                <a:solidFill>
+                  <a:schemeClr val="tx1"/>
+                </a:solidFill>
+              </a:rPr>
+              <a:t>e</a:t>
+            </a:r>
+            <a:r>
+              <a:rPr lang="nl-BE" sz="3400" dirty="0" err="1" smtClean="0">
+                <a:solidFill>
+                  <a:schemeClr val="tx1"/>
+                </a:solidFill>
+              </a:rPr>
+              <a:t>quation</a:t>
+            </a:r>
+            <a:r>
+              <a:rPr lang="nl-BE" sz="3400" dirty="0" smtClean="0">
+                <a:solidFill>
+                  <a:schemeClr val="tx1"/>
+                </a:solidFill>
+              </a:rPr>
+              <a:t> </a:t>
+            </a:r>
+            <a:r>
+              <a:rPr lang="nl-BE" sz="3400" dirty="0" err="1" smtClean="0">
+                <a:solidFill>
+                  <a:schemeClr val="tx1"/>
+                </a:solidFill>
+              </a:rPr>
+              <a:t>discovery</a:t>
+            </a:r>
+            <a:endParaRPr lang="nl-BE" sz="3400" dirty="0" smtClean="0">
+              <a:solidFill>
+                <a:schemeClr val="tx1"/>
+              </a:solidFill>
+            </a:endParaRPr>
+          </a:p>
+          <a:p>
+            <a:pPr lvl="1">
+              <a:buFont typeface="Arial"/>
+              <a:buChar char="•"/>
+            </a:pPr>
+            <a:r>
+              <a:rPr lang="nl-BE" sz="3400" dirty="0">
+                <a:solidFill>
+                  <a:schemeClr val="tx1"/>
+                </a:solidFill>
+              </a:rPr>
+              <a:t> </a:t>
+            </a:r>
+            <a:r>
+              <a:rPr lang="nl-BE" sz="3200" dirty="0" smtClean="0">
+                <a:solidFill>
+                  <a:schemeClr val="tx1"/>
+                </a:solidFill>
+              </a:rPr>
+              <a:t>Grammatica</a:t>
+            </a:r>
+            <a:endParaRPr lang="nl-BE" sz="3200" dirty="0">
+              <a:solidFill>
+                <a:schemeClr val="tx1"/>
+              </a:solidFill>
+            </a:endParaRPr>
+          </a:p>
+          <a:p>
+            <a:pPr lvl="1">
+              <a:buFont typeface="Arial"/>
+              <a:buChar char="•"/>
+            </a:pPr>
+            <a:r>
+              <a:rPr lang="nl-BE" sz="3200" dirty="0" smtClean="0">
+                <a:solidFill>
+                  <a:schemeClr val="tx1"/>
+                </a:solidFill>
+              </a:rPr>
+              <a:t> </a:t>
+            </a:r>
+            <a:r>
+              <a:rPr lang="nl-BE" sz="3600" smtClean="0">
+                <a:solidFill>
+                  <a:schemeClr val="tx1"/>
+                </a:solidFill>
+              </a:rPr>
+              <a:t>Genereren </a:t>
+            </a:r>
+            <a:r>
               <a:rPr lang="nl-BE" sz="3600" dirty="0" smtClean="0">
                 <a:solidFill>
                   <a:schemeClr val="tx1"/>
                 </a:solidFill>
               </a:rPr>
-              <a:t>Genereren van verschillende opties</a:t>
+              <a:t>van verschillende opties</a:t>
             </a:r>
           </a:p>
         </p:txBody>
@@ -15360,274 +15415,6 @@
 </file>
 
 <file path=ppt/slides/slide4.xml><?xml version="1.0" encoding="utf-8"?>
-<p:sld xmlns:a="http://schemas.openxmlformats.org/drawingml/2006/main" xmlns:r="http://schemas.openxmlformats.org/officeDocument/2006/relationships" xmlns:p="http://schemas.openxmlformats.org/presentationml/2006/main">
-  <p:cSld>
-    <p:spTree>
-      <p:nvGrpSpPr>
-        <p:cNvPr id="1" name=""/>
-        <p:cNvGrpSpPr/>
-        <p:nvPr/>
-      </p:nvGrpSpPr>
-      <p:grpSpPr>
-        <a:xfrm>
-          <a:off x="0" y="0"/>
-          <a:ext cx="0" cy="0"/>
-          <a:chOff x="0" y="0"/>
-          <a:chExt cx="0" cy="0"/>
-        </a:xfrm>
-      </p:grpSpPr>
-      <p:sp>
-        <p:nvSpPr>
-          <p:cNvPr id="2" name="Title 1"/>
-          <p:cNvSpPr>
-            <a:spLocks noGrp="1"/>
-          </p:cNvSpPr>
-          <p:nvPr>
-            <p:ph type="title"/>
-          </p:nvPr>
-        </p:nvSpPr>
-        <p:spPr/>
-        <p:txBody>
-          <a:bodyPr>
-            <a:normAutofit/>
-          </a:bodyPr>
-          <a:lstStyle/>
-          <a:p>
-            <a:r>
-              <a:rPr lang="nl-BE" sz="6000" dirty="0" smtClean="0"/>
-              <a:t>End-user </a:t>
-            </a:r>
-            <a:r>
-              <a:rPr lang="nl-BE" sz="6000" dirty="0" err="1"/>
-              <a:t>p</a:t>
-            </a:r>
-            <a:r>
-              <a:rPr lang="nl-BE" sz="6000" dirty="0" err="1" smtClean="0"/>
-              <a:t>rogramming</a:t>
-            </a:r>
-            <a:endParaRPr lang="en-US" sz="6000" dirty="0"/>
-          </a:p>
-        </p:txBody>
-      </p:sp>
-      <p:graphicFrame>
-        <p:nvGraphicFramePr>
-          <p:cNvPr id="4" name="Content Placeholder 3"/>
-          <p:cNvGraphicFramePr>
-            <a:graphicFrameLocks noGrp="1"/>
-          </p:cNvGraphicFramePr>
-          <p:nvPr>
-            <p:ph idx="1"/>
-            <p:extLst/>
-          </p:nvPr>
-        </p:nvGraphicFramePr>
-        <p:xfrm>
-          <a:off x="1096963" y="1846263"/>
-          <a:ext cx="10058400" cy="4022725"/>
-        </p:xfrm>
-        <a:graphic>
-          <a:graphicData uri="http://schemas.openxmlformats.org/drawingml/2006/diagram">
-            <dgm:relIds xmlns:dgm="http://schemas.openxmlformats.org/drawingml/2006/diagram" xmlns:r="http://schemas.openxmlformats.org/officeDocument/2006/relationships" r:dm="rId3" r:lo="rId4" r:qs="rId5" r:cs="rId6"/>
-          </a:graphicData>
-        </a:graphic>
-      </p:graphicFrame>
-    </p:spTree>
-    <p:extLst>
-      <p:ext uri="{BB962C8B-B14F-4D97-AF65-F5344CB8AC3E}">
-        <p14:creationId xmlns:p14="http://schemas.microsoft.com/office/powerpoint/2010/main" val="1590073234"/>
-      </p:ext>
-    </p:extLst>
-  </p:cSld>
-  <p:clrMapOvr>
-    <a:masterClrMapping/>
-  </p:clrMapOvr>
-  <p:timing>
-    <p:tnLst>
-      <p:par>
-        <p:cTn id="1" dur="indefinite" restart="never" nodeType="tmRoot">
-          <p:childTnLst>
-            <p:seq concurrent="1" nextAc="seek">
-              <p:cTn id="2" dur="indefinite" nodeType="mainSeq">
-                <p:childTnLst>
-                  <p:par>
-                    <p:cTn id="3" fill="hold">
-                      <p:stCondLst>
-                        <p:cond delay="indefinite"/>
-                      </p:stCondLst>
-                      <p:childTnLst>
-                        <p:par>
-                          <p:cTn id="4" fill="hold">
-                            <p:stCondLst>
-                              <p:cond delay="0"/>
-                            </p:stCondLst>
-                            <p:childTnLst>
-                              <p:par>
-                                <p:cTn id="5" presetID="1" presetClass="entr" presetSubtype="0" fill="hold" grpId="0" nodeType="clickEffect">
-                                  <p:stCondLst>
-                                    <p:cond delay="0"/>
-                                  </p:stCondLst>
-                                  <p:childTnLst>
-                                    <p:set>
-                                      <p:cBhvr>
-                                        <p:cTn id="6" dur="1" fill="hold">
-                                          <p:stCondLst>
-                                            <p:cond delay="0"/>
-                                          </p:stCondLst>
-                                        </p:cTn>
-                                        <p:tgtEl>
-                                          <p:spTgt spid="4">
-                                            <p:graphicEl>
-                                              <a:dgm id="{95F427E8-B20D-1C40-B1A7-2751BED141FE}"/>
-                                            </p:graphicEl>
-                                          </p:spTgt>
-                                        </p:tgtEl>
-                                        <p:attrNameLst>
-                                          <p:attrName>style.visibility</p:attrName>
-                                        </p:attrNameLst>
-                                      </p:cBhvr>
-                                      <p:to>
-                                        <p:strVal val="visible"/>
-                                      </p:to>
-                                    </p:set>
-                                  </p:childTnLst>
-                                </p:cTn>
-                              </p:par>
-                            </p:childTnLst>
-                          </p:cTn>
-                        </p:par>
-                      </p:childTnLst>
-                    </p:cTn>
-                  </p:par>
-                  <p:par>
-                    <p:cTn id="7" fill="hold">
-                      <p:stCondLst>
-                        <p:cond delay="indefinite"/>
-                      </p:stCondLst>
-                      <p:childTnLst>
-                        <p:par>
-                          <p:cTn id="8" fill="hold">
-                            <p:stCondLst>
-                              <p:cond delay="0"/>
-                            </p:stCondLst>
-                            <p:childTnLst>
-                              <p:par>
-                                <p:cTn id="9" presetID="1" presetClass="entr" presetSubtype="0" fill="hold" grpId="0" nodeType="clickEffect">
-                                  <p:stCondLst>
-                                    <p:cond delay="0"/>
-                                  </p:stCondLst>
-                                  <p:childTnLst>
-                                    <p:set>
-                                      <p:cBhvr>
-                                        <p:cTn id="10" dur="1" fill="hold">
-                                          <p:stCondLst>
-                                            <p:cond delay="0"/>
-                                          </p:stCondLst>
-                                        </p:cTn>
-                                        <p:tgtEl>
-                                          <p:spTgt spid="4">
-                                            <p:graphicEl>
-                                              <a:dgm id="{8AA9BC7C-A858-9E48-B984-5C8762703E58}"/>
-                                            </p:graphicEl>
-                                          </p:spTgt>
-                                        </p:tgtEl>
-                                        <p:attrNameLst>
-                                          <p:attrName>style.visibility</p:attrName>
-                                        </p:attrNameLst>
-                                      </p:cBhvr>
-                                      <p:to>
-                                        <p:strVal val="visible"/>
-                                      </p:to>
-                                    </p:set>
-                                  </p:childTnLst>
-                                </p:cTn>
-                              </p:par>
-                            </p:childTnLst>
-                          </p:cTn>
-                        </p:par>
-                      </p:childTnLst>
-                    </p:cTn>
-                  </p:par>
-                  <p:par>
-                    <p:cTn id="11" fill="hold">
-                      <p:stCondLst>
-                        <p:cond delay="indefinite"/>
-                      </p:stCondLst>
-                      <p:childTnLst>
-                        <p:par>
-                          <p:cTn id="12" fill="hold">
-                            <p:stCondLst>
-                              <p:cond delay="0"/>
-                            </p:stCondLst>
-                            <p:childTnLst>
-                              <p:par>
-                                <p:cTn id="13" presetID="1" presetClass="entr" presetSubtype="0" fill="hold" grpId="0" nodeType="clickEffect">
-                                  <p:stCondLst>
-                                    <p:cond delay="0"/>
-                                  </p:stCondLst>
-                                  <p:childTnLst>
-                                    <p:set>
-                                      <p:cBhvr>
-                                        <p:cTn id="14" dur="1" fill="hold">
-                                          <p:stCondLst>
-                                            <p:cond delay="0"/>
-                                          </p:stCondLst>
-                                        </p:cTn>
-                                        <p:tgtEl>
-                                          <p:spTgt spid="4">
-                                            <p:graphicEl>
-                                              <a:dgm id="{1D981DFC-6359-9B42-A97E-EE1A67C27226}"/>
-                                            </p:graphicEl>
-                                          </p:spTgt>
-                                        </p:tgtEl>
-                                        <p:attrNameLst>
-                                          <p:attrName>style.visibility</p:attrName>
-                                        </p:attrNameLst>
-                                      </p:cBhvr>
-                                      <p:to>
-                                        <p:strVal val="visible"/>
-                                      </p:to>
-                                    </p:set>
-                                  </p:childTnLst>
-                                </p:cTn>
-                              </p:par>
-                            </p:childTnLst>
-                          </p:cTn>
-                        </p:par>
-                      </p:childTnLst>
-                    </p:cTn>
-                  </p:par>
-                </p:childTnLst>
-              </p:cTn>
-              <p:prevCondLst>
-                <p:cond evt="onPrev" delay="0">
-                  <p:tgtEl>
-                    <p:sldTgt/>
-                  </p:tgtEl>
-                </p:cond>
-              </p:prevCondLst>
-              <p:nextCondLst>
-                <p:cond evt="onNext" delay="0">
-                  <p:tgtEl>
-                    <p:sldTgt/>
-                  </p:tgtEl>
-                </p:cond>
-              </p:nextCondLst>
-            </p:seq>
-          </p:childTnLst>
-        </p:cTn>
-      </p:par>
-    </p:tnLst>
-    <p:bldLst>
-      <p:bldGraphic spid="4" grpId="0">
-        <p:bldSub>
-          <a:bldDgm bld="one"/>
-        </p:bldSub>
-      </p:bldGraphic>
-    </p:bldLst>
-  </p:timing>
-</p:sld>
-</file>
-
-<file path=ppt/slides/slide5.xml><?xml version="1.0" encoding="utf-8"?>
 <p:sld xmlns:a="http://schemas.openxmlformats.org/drawingml/2006/main" xmlns:r="http://schemas.openxmlformats.org/officeDocument/2006/relationships" xmlns:p="http://schemas.openxmlformats.org/presentationml/2006/main">
   <p:cSld>
     <p:spTree>
@@ -17226,6 +17013,274 @@
 </p:sld>
 </file>
 
+<file path=ppt/slides/slide5.xml><?xml version="1.0" encoding="utf-8"?>
+<p:sld xmlns:a="http://schemas.openxmlformats.org/drawingml/2006/main" xmlns:r="http://schemas.openxmlformats.org/officeDocument/2006/relationships" xmlns:p="http://schemas.openxmlformats.org/presentationml/2006/main">
+  <p:cSld>
+    <p:spTree>
+      <p:nvGrpSpPr>
+        <p:cNvPr id="1" name=""/>
+        <p:cNvGrpSpPr/>
+        <p:nvPr/>
+      </p:nvGrpSpPr>
+      <p:grpSpPr>
+        <a:xfrm>
+          <a:off x="0" y="0"/>
+          <a:ext cx="0" cy="0"/>
+          <a:chOff x="0" y="0"/>
+          <a:chExt cx="0" cy="0"/>
+        </a:xfrm>
+      </p:grpSpPr>
+      <p:sp>
+        <p:nvSpPr>
+          <p:cNvPr id="2" name="Title 1"/>
+          <p:cNvSpPr>
+            <a:spLocks noGrp="1"/>
+          </p:cNvSpPr>
+          <p:nvPr>
+            <p:ph type="title"/>
+          </p:nvPr>
+        </p:nvSpPr>
+        <p:spPr/>
+        <p:txBody>
+          <a:bodyPr>
+            <a:normAutofit/>
+          </a:bodyPr>
+          <a:lstStyle/>
+          <a:p>
+            <a:r>
+              <a:rPr lang="nl-BE" sz="6000" dirty="0" smtClean="0"/>
+              <a:t>End-user </a:t>
+            </a:r>
+            <a:r>
+              <a:rPr lang="nl-BE" sz="6000" dirty="0" err="1"/>
+              <a:t>p</a:t>
+            </a:r>
+            <a:r>
+              <a:rPr lang="nl-BE" sz="6000" dirty="0" err="1" smtClean="0"/>
+              <a:t>rogramming</a:t>
+            </a:r>
+            <a:endParaRPr lang="en-US" sz="6000" dirty="0"/>
+          </a:p>
+        </p:txBody>
+      </p:sp>
+      <p:graphicFrame>
+        <p:nvGraphicFramePr>
+          <p:cNvPr id="4" name="Content Placeholder 3"/>
+          <p:cNvGraphicFramePr>
+            <a:graphicFrameLocks noGrp="1"/>
+          </p:cNvGraphicFramePr>
+          <p:nvPr>
+            <p:ph idx="1"/>
+            <p:extLst/>
+          </p:nvPr>
+        </p:nvGraphicFramePr>
+        <p:xfrm>
+          <a:off x="1096963" y="1846263"/>
+          <a:ext cx="10058400" cy="4022725"/>
+        </p:xfrm>
+        <a:graphic>
+          <a:graphicData uri="http://schemas.openxmlformats.org/drawingml/2006/diagram">
+            <dgm:relIds xmlns:dgm="http://schemas.openxmlformats.org/drawingml/2006/diagram" xmlns:r="http://schemas.openxmlformats.org/officeDocument/2006/relationships" r:dm="rId3" r:lo="rId4" r:qs="rId5" r:cs="rId6"/>
+          </a:graphicData>
+        </a:graphic>
+      </p:graphicFrame>
+    </p:spTree>
+    <p:extLst>
+      <p:ext uri="{BB962C8B-B14F-4D97-AF65-F5344CB8AC3E}">
+        <p14:creationId xmlns:p14="http://schemas.microsoft.com/office/powerpoint/2010/main" val="1590073234"/>
+      </p:ext>
+    </p:extLst>
+  </p:cSld>
+  <p:clrMapOvr>
+    <a:masterClrMapping/>
+  </p:clrMapOvr>
+  <p:timing>
+    <p:tnLst>
+      <p:par>
+        <p:cTn id="1" dur="indefinite" restart="never" nodeType="tmRoot">
+          <p:childTnLst>
+            <p:seq concurrent="1" nextAc="seek">
+              <p:cTn id="2" dur="indefinite" nodeType="mainSeq">
+                <p:childTnLst>
+                  <p:par>
+                    <p:cTn id="3" fill="hold">
+                      <p:stCondLst>
+                        <p:cond delay="indefinite"/>
+                      </p:stCondLst>
+                      <p:childTnLst>
+                        <p:par>
+                          <p:cTn id="4" fill="hold">
+                            <p:stCondLst>
+                              <p:cond delay="0"/>
+                            </p:stCondLst>
+                            <p:childTnLst>
+                              <p:par>
+                                <p:cTn id="5" presetID="1" presetClass="entr" presetSubtype="0" fill="hold" grpId="0" nodeType="clickEffect">
+                                  <p:stCondLst>
+                                    <p:cond delay="0"/>
+                                  </p:stCondLst>
+                                  <p:childTnLst>
+                                    <p:set>
+                                      <p:cBhvr>
+                                        <p:cTn id="6" dur="1" fill="hold">
+                                          <p:stCondLst>
+                                            <p:cond delay="0"/>
+                                          </p:stCondLst>
+                                        </p:cTn>
+                                        <p:tgtEl>
+                                          <p:spTgt spid="4">
+                                            <p:graphicEl>
+                                              <a:dgm id="{95F427E8-B20D-1C40-B1A7-2751BED141FE}"/>
+                                            </p:graphicEl>
+                                          </p:spTgt>
+                                        </p:tgtEl>
+                                        <p:attrNameLst>
+                                          <p:attrName>style.visibility</p:attrName>
+                                        </p:attrNameLst>
+                                      </p:cBhvr>
+                                      <p:to>
+                                        <p:strVal val="visible"/>
+                                      </p:to>
+                                    </p:set>
+                                  </p:childTnLst>
+                                </p:cTn>
+                              </p:par>
+                            </p:childTnLst>
+                          </p:cTn>
+                        </p:par>
+                      </p:childTnLst>
+                    </p:cTn>
+                  </p:par>
+                  <p:par>
+                    <p:cTn id="7" fill="hold">
+                      <p:stCondLst>
+                        <p:cond delay="indefinite"/>
+                      </p:stCondLst>
+                      <p:childTnLst>
+                        <p:par>
+                          <p:cTn id="8" fill="hold">
+                            <p:stCondLst>
+                              <p:cond delay="0"/>
+                            </p:stCondLst>
+                            <p:childTnLst>
+                              <p:par>
+                                <p:cTn id="9" presetID="1" presetClass="entr" presetSubtype="0" fill="hold" grpId="0" nodeType="clickEffect">
+                                  <p:stCondLst>
+                                    <p:cond delay="0"/>
+                                  </p:stCondLst>
+                                  <p:childTnLst>
+                                    <p:set>
+                                      <p:cBhvr>
+                                        <p:cTn id="10" dur="1" fill="hold">
+                                          <p:stCondLst>
+                                            <p:cond delay="0"/>
+                                          </p:stCondLst>
+                                        </p:cTn>
+                                        <p:tgtEl>
+                                          <p:spTgt spid="4">
+                                            <p:graphicEl>
+                                              <a:dgm id="{8AA9BC7C-A858-9E48-B984-5C8762703E58}"/>
+                                            </p:graphicEl>
+                                          </p:spTgt>
+                                        </p:tgtEl>
+                                        <p:attrNameLst>
+                                          <p:attrName>style.visibility</p:attrName>
+                                        </p:attrNameLst>
+                                      </p:cBhvr>
+                                      <p:to>
+                                        <p:strVal val="visible"/>
+                                      </p:to>
+                                    </p:set>
+                                  </p:childTnLst>
+                                </p:cTn>
+                              </p:par>
+                            </p:childTnLst>
+                          </p:cTn>
+                        </p:par>
+                      </p:childTnLst>
+                    </p:cTn>
+                  </p:par>
+                  <p:par>
+                    <p:cTn id="11" fill="hold">
+                      <p:stCondLst>
+                        <p:cond delay="indefinite"/>
+                      </p:stCondLst>
+                      <p:childTnLst>
+                        <p:par>
+                          <p:cTn id="12" fill="hold">
+                            <p:stCondLst>
+                              <p:cond delay="0"/>
+                            </p:stCondLst>
+                            <p:childTnLst>
+                              <p:par>
+                                <p:cTn id="13" presetID="1" presetClass="entr" presetSubtype="0" fill="hold" grpId="0" nodeType="clickEffect">
+                                  <p:stCondLst>
+                                    <p:cond delay="0"/>
+                                  </p:stCondLst>
+                                  <p:childTnLst>
+                                    <p:set>
+                                      <p:cBhvr>
+                                        <p:cTn id="14" dur="1" fill="hold">
+                                          <p:stCondLst>
+                                            <p:cond delay="0"/>
+                                          </p:stCondLst>
+                                        </p:cTn>
+                                        <p:tgtEl>
+                                          <p:spTgt spid="4">
+                                            <p:graphicEl>
+                                              <a:dgm id="{1D981DFC-6359-9B42-A97E-EE1A67C27226}"/>
+                                            </p:graphicEl>
+                                          </p:spTgt>
+                                        </p:tgtEl>
+                                        <p:attrNameLst>
+                                          <p:attrName>style.visibility</p:attrName>
+                                        </p:attrNameLst>
+                                      </p:cBhvr>
+                                      <p:to>
+                                        <p:strVal val="visible"/>
+                                      </p:to>
+                                    </p:set>
+                                  </p:childTnLst>
+                                </p:cTn>
+                              </p:par>
+                            </p:childTnLst>
+                          </p:cTn>
+                        </p:par>
+                      </p:childTnLst>
+                    </p:cTn>
+                  </p:par>
+                </p:childTnLst>
+              </p:cTn>
+              <p:prevCondLst>
+                <p:cond evt="onPrev" delay="0">
+                  <p:tgtEl>
+                    <p:sldTgt/>
+                  </p:tgtEl>
+                </p:cond>
+              </p:prevCondLst>
+              <p:nextCondLst>
+                <p:cond evt="onNext" delay="0">
+                  <p:tgtEl>
+                    <p:sldTgt/>
+                  </p:tgtEl>
+                </p:cond>
+              </p:nextCondLst>
+            </p:seq>
+          </p:childTnLst>
+        </p:cTn>
+      </p:par>
+    </p:tnLst>
+    <p:bldLst>
+      <p:bldGraphic spid="4" grpId="0">
+        <p:bldSub>
+          <a:bldDgm bld="one"/>
+        </p:bldSub>
+      </p:bldGraphic>
+    </p:bldLst>
+  </p:timing>
+</p:sld>
+</file>
+
 <file path=ppt/slides/slide6.xml><?xml version="1.0" encoding="utf-8"?>
 <p:sld xmlns:a="http://schemas.openxmlformats.org/drawingml/2006/main" xmlns:r="http://schemas.openxmlformats.org/officeDocument/2006/relationships" xmlns:p="http://schemas.openxmlformats.org/presentationml/2006/main">
   <p:cSld>

</xml_diff>